<commit_message>
Another comment: multiple labels per image
</commit_message>
<xml_diff>
--- a/problem_statement/Challenge Problem 6.pptx
+++ b/problem_statement/Challenge Problem 6.pptx
@@ -209,7 +209,7 @@
             <a:fld id="{9E6BD383-960F-4311-92C8-B2CD992ECA1E}" type="datetimeFigureOut">
               <a:rPr lang="en-US" smtClean="0"/>
               <a:pPr/>
-              <a:t>6/11/2015</a:t>
+              <a:t>6/12/2015</a:t>
             </a:fld>
             <a:endParaRPr lang="en-US"/>
           </a:p>
@@ -378,7 +378,7 @@
     </p:spTree>
     <p:extLst>
       <p:ext uri="{BB962C8B-B14F-4D97-AF65-F5344CB8AC3E}">
-        <p14:creationId xmlns:p14="http://schemas.microsoft.com/office/powerpoint/2010/main" xmlns="" val="590526506"/>
+        <p14:creationId xmlns="" xmlns:p14="http://schemas.microsoft.com/office/powerpoint/2010/main" val="590526506"/>
       </p:ext>
     </p:extLst>
   </p:cSld>
@@ -624,6 +624,96 @@
           <a:p>
             <a:r>
               <a:rPr lang="en-US" dirty="0" smtClean="0"/>
+              <a:t>Individual</a:t>
+            </a:r>
+            <a:r>
+              <a:rPr lang="en-US" baseline="0" dirty="0" smtClean="0"/>
+              <a:t> images can have more than one label; the annotators did not assign a single “dominant” label to the image but instead recorded if any of the 24 labels were present.</a:t>
+            </a:r>
+            <a:endParaRPr lang="en-US" dirty="0"/>
+          </a:p>
+        </p:txBody>
+      </p:sp>
+      <p:sp>
+        <p:nvSpPr>
+          <p:cNvPr id="4" name="Slide Number Placeholder 3"/>
+          <p:cNvSpPr>
+            <a:spLocks noGrp="1"/>
+          </p:cNvSpPr>
+          <p:nvPr>
+            <p:ph type="sldNum" sz="quarter" idx="10"/>
+          </p:nvPr>
+        </p:nvSpPr>
+        <p:spPr/>
+        <p:txBody>
+          <a:bodyPr/>
+          <a:lstStyle/>
+          <a:p>
+            <a:fld id="{832CC242-A0D7-4B80-A96C-75E8B1ABCB20}" type="slidenum">
+              <a:rPr lang="en-US" smtClean="0"/>
+              <a:pPr/>
+              <a:t>3</a:t>
+            </a:fld>
+            <a:endParaRPr lang="en-US"/>
+          </a:p>
+        </p:txBody>
+      </p:sp>
+    </p:spTree>
+  </p:cSld>
+  <p:clrMapOvr>
+    <a:masterClrMapping/>
+  </p:clrMapOvr>
+</p:notes>
+</file>
+
+<file path=ppt/notesSlides/notesSlide3.xml><?xml version="1.0" encoding="utf-8"?>
+<p:notes xmlns:a="http://schemas.openxmlformats.org/drawingml/2006/main" xmlns:r="http://schemas.openxmlformats.org/officeDocument/2006/relationships" xmlns:p="http://schemas.openxmlformats.org/presentationml/2006/main">
+  <p:cSld>
+    <p:spTree>
+      <p:nvGrpSpPr>
+        <p:cNvPr id="1" name=""/>
+        <p:cNvGrpSpPr/>
+        <p:nvPr/>
+      </p:nvGrpSpPr>
+      <p:grpSpPr>
+        <a:xfrm>
+          <a:off x="0" y="0"/>
+          <a:ext cx="0" cy="0"/>
+          <a:chOff x="0" y="0"/>
+          <a:chExt cx="0" cy="0"/>
+        </a:xfrm>
+      </p:grpSpPr>
+      <p:sp>
+        <p:nvSpPr>
+          <p:cNvPr id="2" name="Slide Image Placeholder 1"/>
+          <p:cNvSpPr>
+            <a:spLocks noGrp="1" noRot="1" noChangeAspect="1"/>
+          </p:cNvSpPr>
+          <p:nvPr>
+            <p:ph type="sldImg"/>
+          </p:nvPr>
+        </p:nvSpPr>
+        <p:spPr/>
+      </p:sp>
+      <p:sp>
+        <p:nvSpPr>
+          <p:cNvPr id="3" name="Notes Placeholder 2"/>
+          <p:cNvSpPr>
+            <a:spLocks noGrp="1"/>
+          </p:cNvSpPr>
+          <p:nvPr>
+            <p:ph type="body" idx="1"/>
+          </p:nvPr>
+        </p:nvSpPr>
+        <p:spPr/>
+        <p:txBody>
+          <a:bodyPr>
+            <a:normAutofit/>
+          </a:bodyPr>
+          <a:lstStyle/>
+          <a:p>
+            <a:r>
+              <a:rPr lang="en-US" dirty="0" smtClean="0"/>
               <a:t>The “classifier” outputs are unrelated</a:t>
             </a:r>
             <a:r>
@@ -870,7 +960,7 @@
             <a:fld id="{F3B64B42-97C5-4E7F-A046-9ABFB24F4647}" type="datetime1">
               <a:rPr lang="en-US" smtClean="0"/>
               <a:pPr/>
-              <a:t>6/11/2015</a:t>
+              <a:t>6/12/2015</a:t>
             </a:fld>
             <a:endParaRPr lang="en-US"/>
           </a:p>
@@ -942,7 +1032,7 @@
     </p:spTree>
     <p:extLst>
       <p:ext uri="{BB962C8B-B14F-4D97-AF65-F5344CB8AC3E}">
-        <p14:creationId xmlns:p14="http://schemas.microsoft.com/office/powerpoint/2010/main" xmlns="" val="4064491439"/>
+        <p14:creationId xmlns="" xmlns:p14="http://schemas.microsoft.com/office/powerpoint/2010/main" val="4064491439"/>
       </p:ext>
     </p:extLst>
   </p:cSld>
@@ -1086,7 +1176,7 @@
             <a:fld id="{8FA0EC12-4566-4CE0-B247-A2A993FCE100}" type="datetime1">
               <a:rPr lang="en-US" smtClean="0"/>
               <a:pPr/>
-              <a:t>6/11/2015</a:t>
+              <a:t>6/12/2015</a:t>
             </a:fld>
             <a:endParaRPr lang="en-US"/>
           </a:p>
@@ -1158,7 +1248,7 @@
     </p:spTree>
     <p:extLst>
       <p:ext uri="{BB962C8B-B14F-4D97-AF65-F5344CB8AC3E}">
-        <p14:creationId xmlns:p14="http://schemas.microsoft.com/office/powerpoint/2010/main" xmlns="" val="2571977057"/>
+        <p14:creationId xmlns="" xmlns:p14="http://schemas.microsoft.com/office/powerpoint/2010/main" val="2571977057"/>
       </p:ext>
     </p:extLst>
   </p:cSld>
@@ -1302,7 +1392,7 @@
             <a:fld id="{788685CE-C5FB-40C9-BA61-348FC7272552}" type="datetime1">
               <a:rPr lang="en-US" smtClean="0"/>
               <a:pPr/>
-              <a:t>6/11/2015</a:t>
+              <a:t>6/12/2015</a:t>
             </a:fld>
             <a:endParaRPr lang="en-US"/>
           </a:p>
@@ -1374,7 +1464,7 @@
     </p:spTree>
     <p:extLst>
       <p:ext uri="{BB962C8B-B14F-4D97-AF65-F5344CB8AC3E}">
-        <p14:creationId xmlns:p14="http://schemas.microsoft.com/office/powerpoint/2010/main" xmlns="" val="617593224"/>
+        <p14:creationId xmlns="" xmlns:p14="http://schemas.microsoft.com/office/powerpoint/2010/main" val="617593224"/>
       </p:ext>
     </p:extLst>
   </p:cSld>
@@ -1608,7 +1698,7 @@
           </a:ln>
           <a:extLst>
             <a:ext uri="{909E8E84-426E-40DD-AFC4-6F175D3DCCD1}">
-              <a14:hiddenFill xmlns:a14="http://schemas.microsoft.com/office/drawing/2010/main" xmlns="">
+              <a14:hiddenFill xmlns="" xmlns:a14="http://schemas.microsoft.com/office/drawing/2010/main">
                 <a:noFill/>
               </a14:hiddenFill>
             </a:ext>
@@ -1627,7 +1717,7 @@
           <a:blip r:embed="rId2" cstate="print">
             <a:extLst>
               <a:ext uri="{28A0092B-C50C-407E-A947-70E740481C1C}">
-                <a14:useLocalDpi xmlns:a14="http://schemas.microsoft.com/office/drawing/2010/main" xmlns="" val="0"/>
+                <a14:useLocalDpi xmlns="" xmlns:a14="http://schemas.microsoft.com/office/drawing/2010/main" val="0"/>
               </a:ext>
             </a:extLst>
           </a:blip>
@@ -1648,7 +1738,7 @@
     </p:spTree>
     <p:extLst>
       <p:ext uri="{BB962C8B-B14F-4D97-AF65-F5344CB8AC3E}">
-        <p14:creationId xmlns:p14="http://schemas.microsoft.com/office/powerpoint/2010/main" xmlns="" val="3700226468"/>
+        <p14:creationId xmlns="" xmlns:p14="http://schemas.microsoft.com/office/powerpoint/2010/main" val="3700226468"/>
       </p:ext>
     </p:extLst>
   </p:cSld>
@@ -1792,7 +1882,7 @@
             <a:fld id="{79144205-5CF7-4997-A8A7-73185C3E51BD}" type="datetime1">
               <a:rPr lang="en-US" smtClean="0"/>
               <a:pPr/>
-              <a:t>6/11/2015</a:t>
+              <a:t>6/12/2015</a:t>
             </a:fld>
             <a:endParaRPr lang="en-US"/>
           </a:p>
@@ -1864,7 +1954,7 @@
     </p:spTree>
     <p:extLst>
       <p:ext uri="{BB962C8B-B14F-4D97-AF65-F5344CB8AC3E}">
-        <p14:creationId xmlns:p14="http://schemas.microsoft.com/office/powerpoint/2010/main" xmlns="" val="299337258"/>
+        <p14:creationId xmlns="" xmlns:p14="http://schemas.microsoft.com/office/powerpoint/2010/main" val="299337258"/>
       </p:ext>
     </p:extLst>
   </p:cSld>
@@ -2074,7 +2164,7 @@
             <a:fld id="{62118C28-9CF9-4F09-994F-3AF8E3C8B50E}" type="datetime1">
               <a:rPr lang="en-US" smtClean="0"/>
               <a:pPr/>
-              <a:t>6/11/2015</a:t>
+              <a:t>6/12/2015</a:t>
             </a:fld>
             <a:endParaRPr lang="en-US"/>
           </a:p>
@@ -2146,7 +2236,7 @@
     </p:spTree>
     <p:extLst>
       <p:ext uri="{BB962C8B-B14F-4D97-AF65-F5344CB8AC3E}">
-        <p14:creationId xmlns:p14="http://schemas.microsoft.com/office/powerpoint/2010/main" xmlns="" val="2257051515"/>
+        <p14:creationId xmlns="" xmlns:p14="http://schemas.microsoft.com/office/powerpoint/2010/main" val="2257051515"/>
       </p:ext>
     </p:extLst>
   </p:cSld>
@@ -2406,7 +2496,7 @@
             <a:fld id="{7B91938F-9454-4F6C-ACB2-DD81AA9A83F6}" type="datetime1">
               <a:rPr lang="en-US" smtClean="0"/>
               <a:pPr/>
-              <a:t>6/11/2015</a:t>
+              <a:t>6/12/2015</a:t>
             </a:fld>
             <a:endParaRPr lang="en-US"/>
           </a:p>
@@ -2478,7 +2568,7 @@
     </p:spTree>
     <p:extLst>
       <p:ext uri="{BB962C8B-B14F-4D97-AF65-F5344CB8AC3E}">
-        <p14:creationId xmlns:p14="http://schemas.microsoft.com/office/powerpoint/2010/main" xmlns="" val="2879366825"/>
+        <p14:creationId xmlns="" xmlns:p14="http://schemas.microsoft.com/office/powerpoint/2010/main" val="2879366825"/>
       </p:ext>
     </p:extLst>
   </p:cSld>
@@ -2878,7 +2968,7 @@
             <a:fld id="{B789D24A-2359-461F-AF40-1ADDF63DBEFE}" type="datetime1">
               <a:rPr lang="en-US" smtClean="0"/>
               <a:pPr/>
-              <a:t>6/11/2015</a:t>
+              <a:t>6/12/2015</a:t>
             </a:fld>
             <a:endParaRPr lang="en-US"/>
           </a:p>
@@ -2950,7 +3040,7 @@
     </p:spTree>
     <p:extLst>
       <p:ext uri="{BB962C8B-B14F-4D97-AF65-F5344CB8AC3E}">
-        <p14:creationId xmlns:p14="http://schemas.microsoft.com/office/powerpoint/2010/main" xmlns="" val="691355404"/>
+        <p14:creationId xmlns="" xmlns:p14="http://schemas.microsoft.com/office/powerpoint/2010/main" val="691355404"/>
       </p:ext>
     </p:extLst>
   </p:cSld>
@@ -3034,7 +3124,7 @@
             <a:fld id="{12811A03-8C0D-446E-B071-DE28A83022E6}" type="datetime1">
               <a:rPr lang="en-US" smtClean="0"/>
               <a:pPr/>
-              <a:t>6/11/2015</a:t>
+              <a:t>6/12/2015</a:t>
             </a:fld>
             <a:endParaRPr lang="en-US"/>
           </a:p>
@@ -3106,7 +3196,7 @@
     </p:spTree>
     <p:extLst>
       <p:ext uri="{BB962C8B-B14F-4D97-AF65-F5344CB8AC3E}">
-        <p14:creationId xmlns:p14="http://schemas.microsoft.com/office/powerpoint/2010/main" xmlns="" val="2940481724"/>
+        <p14:creationId xmlns="" xmlns:p14="http://schemas.microsoft.com/office/powerpoint/2010/main" val="2940481724"/>
       </p:ext>
     </p:extLst>
   </p:cSld>
@@ -3159,7 +3249,7 @@
             <a:fld id="{04FCF0CD-5D8E-4B83-9302-B220564DA9C3}" type="datetime1">
               <a:rPr lang="en-US" smtClean="0"/>
               <a:pPr/>
-              <a:t>6/11/2015</a:t>
+              <a:t>6/12/2015</a:t>
             </a:fld>
             <a:endParaRPr lang="en-US"/>
           </a:p>
@@ -3231,7 +3321,7 @@
     </p:spTree>
     <p:extLst>
       <p:ext uri="{BB962C8B-B14F-4D97-AF65-F5344CB8AC3E}">
-        <p14:creationId xmlns:p14="http://schemas.microsoft.com/office/powerpoint/2010/main" xmlns="" val="4228753239"/>
+        <p14:creationId xmlns="" xmlns:p14="http://schemas.microsoft.com/office/powerpoint/2010/main" val="4228753239"/>
       </p:ext>
     </p:extLst>
   </p:cSld>
@@ -3475,7 +3565,7 @@
             <a:fld id="{2C763469-E329-44C8-A8C3-F8F5F3287007}" type="datetime1">
               <a:rPr lang="en-US" smtClean="0"/>
               <a:pPr/>
-              <a:t>6/11/2015</a:t>
+              <a:t>6/12/2015</a:t>
             </a:fld>
             <a:endParaRPr lang="en-US"/>
           </a:p>
@@ -3547,7 +3637,7 @@
     </p:spTree>
     <p:extLst>
       <p:ext uri="{BB962C8B-B14F-4D97-AF65-F5344CB8AC3E}">
-        <p14:creationId xmlns:p14="http://schemas.microsoft.com/office/powerpoint/2010/main" xmlns="" val="593450304"/>
+        <p14:creationId xmlns="" xmlns:p14="http://schemas.microsoft.com/office/powerpoint/2010/main" val="593450304"/>
       </p:ext>
     </p:extLst>
   </p:cSld>
@@ -3767,7 +3857,7 @@
             <a:fld id="{44B2C831-ADF7-4486-8C19-48EB1D12687C}" type="datetime1">
               <a:rPr lang="en-US" smtClean="0"/>
               <a:pPr/>
-              <a:t>6/11/2015</a:t>
+              <a:t>6/12/2015</a:t>
             </a:fld>
             <a:endParaRPr lang="en-US"/>
           </a:p>
@@ -3839,7 +3929,7 @@
     </p:spTree>
     <p:extLst>
       <p:ext uri="{BB962C8B-B14F-4D97-AF65-F5344CB8AC3E}">
-        <p14:creationId xmlns:p14="http://schemas.microsoft.com/office/powerpoint/2010/main" xmlns="" val="3735717587"/>
+        <p14:creationId xmlns="" xmlns:p14="http://schemas.microsoft.com/office/powerpoint/2010/main" val="3735717587"/>
       </p:ext>
     </p:extLst>
   </p:cSld>
@@ -3895,14 +3985,14 @@
           </a:ln>
           <a:extLst>
             <a:ext uri="{909E8E84-426E-40DD-AFC4-6F175D3DCCD1}">
-              <a14:hiddenFill xmlns:a14="http://schemas.microsoft.com/office/drawing/2010/main" xmlns="">
+              <a14:hiddenFill xmlns="" xmlns:a14="http://schemas.microsoft.com/office/drawing/2010/main">
                 <a:solidFill>
                   <a:srgbClr val="FFFFFF"/>
                 </a:solidFill>
               </a14:hiddenFill>
             </a:ext>
             <a:ext uri="{91240B29-F687-4F45-9708-019B960494DF}">
-              <a14:hiddenLine xmlns:a14="http://schemas.microsoft.com/office/drawing/2010/main" xmlns="" w="9525">
+              <a14:hiddenLine xmlns="" xmlns:a14="http://schemas.microsoft.com/office/drawing/2010/main" w="9525">
                 <a:solidFill>
                   <a:srgbClr val="000000"/>
                 </a:solidFill>
@@ -4078,14 +4168,14 @@
           </a:ln>
           <a:extLst>
             <a:ext uri="{909E8E84-426E-40DD-AFC4-6F175D3DCCD1}">
-              <a14:hiddenFill xmlns:a14="http://schemas.microsoft.com/office/drawing/2010/main" xmlns="">
+              <a14:hiddenFill xmlns="" xmlns:a14="http://schemas.microsoft.com/office/drawing/2010/main">
                 <a:solidFill>
                   <a:srgbClr val="FFFFFF"/>
                 </a:solidFill>
               </a14:hiddenFill>
             </a:ext>
             <a:ext uri="{91240B29-F687-4F45-9708-019B960494DF}">
-              <a14:hiddenLine xmlns:a14="http://schemas.microsoft.com/office/drawing/2010/main" xmlns="" w="9525">
+              <a14:hiddenLine xmlns="" xmlns:a14="http://schemas.microsoft.com/office/drawing/2010/main" w="9525">
                 <a:solidFill>
                   <a:srgbClr val="000000"/>
                 </a:solidFill>
@@ -4148,7 +4238,7 @@
           <a:blip r:embed="rId15" cstate="print">
             <a:extLst>
               <a:ext uri="{28A0092B-C50C-407E-A947-70E740481C1C}">
-                <a14:useLocalDpi xmlns:a14="http://schemas.microsoft.com/office/drawing/2010/main" xmlns="" val="0"/>
+                <a14:useLocalDpi xmlns="" xmlns:a14="http://schemas.microsoft.com/office/drawing/2010/main" val="0"/>
               </a:ext>
             </a:extLst>
           </a:blip>
@@ -4178,7 +4268,7 @@
           <a:blip r:embed="rId16" cstate="print">
             <a:extLst>
               <a:ext uri="{28A0092B-C50C-407E-A947-70E740481C1C}">
-                <a14:useLocalDpi xmlns:a14="http://schemas.microsoft.com/office/drawing/2010/main" xmlns="" val="0"/>
+                <a14:useLocalDpi xmlns="" xmlns:a14="http://schemas.microsoft.com/office/drawing/2010/main" val="0"/>
               </a:ext>
             </a:extLst>
           </a:blip>
@@ -4196,7 +4286,7 @@
           <a:noFill/>
           <a:extLst>
             <a:ext uri="{909E8E84-426E-40DD-AFC4-6F175D3DCCD1}">
-              <a14:hiddenFill xmlns:a14="http://schemas.microsoft.com/office/drawing/2010/main" xmlns="">
+              <a14:hiddenFill xmlns="" xmlns:a14="http://schemas.microsoft.com/office/drawing/2010/main">
                 <a:solidFill>
                   <a:srgbClr val="FFFFFF"/>
                 </a:solidFill>
@@ -4217,7 +4307,7 @@
           <a:blip r:embed="rId17" cstate="print">
             <a:extLst>
               <a:ext uri="{28A0092B-C50C-407E-A947-70E740481C1C}">
-                <a14:useLocalDpi xmlns:a14="http://schemas.microsoft.com/office/drawing/2010/main" xmlns="" val="0"/>
+                <a14:useLocalDpi xmlns="" xmlns:a14="http://schemas.microsoft.com/office/drawing/2010/main" val="0"/>
               </a:ext>
             </a:extLst>
           </a:blip>
@@ -4238,7 +4328,7 @@
     </p:spTree>
     <p:extLst>
       <p:ext uri="{BB962C8B-B14F-4D97-AF65-F5344CB8AC3E}">
-        <p14:creationId xmlns:p14="http://schemas.microsoft.com/office/powerpoint/2010/main" xmlns="" val="1623290117"/>
+        <p14:creationId xmlns="" xmlns:p14="http://schemas.microsoft.com/office/powerpoint/2010/main" val="1623290117"/>
       </p:ext>
     </p:extLst>
   </p:cSld>
@@ -4652,7 +4742,7 @@
     </p:spTree>
     <p:extLst>
       <p:ext uri="{BB962C8B-B14F-4D97-AF65-F5344CB8AC3E}">
-        <p14:creationId xmlns:p14="http://schemas.microsoft.com/office/powerpoint/2010/main" xmlns="" val="3210904075"/>
+        <p14:creationId xmlns="" xmlns:p14="http://schemas.microsoft.com/office/powerpoint/2010/main" val="3210904075"/>
       </p:ext>
     </p:extLst>
   </p:cSld>
@@ -4781,7 +4871,7 @@
     </p:spTree>
     <p:extLst>
       <p:ext uri="{BB962C8B-B14F-4D97-AF65-F5344CB8AC3E}">
-        <p14:creationId xmlns:p14="http://schemas.microsoft.com/office/powerpoint/2010/main" xmlns="" val="334203569"/>
+        <p14:creationId xmlns="" xmlns:p14="http://schemas.microsoft.com/office/powerpoint/2010/main" val="334203569"/>
       </p:ext>
     </p:extLst>
   </p:cSld>
@@ -4934,7 +5024,7 @@
     </p:spTree>
     <p:extLst>
       <p:ext uri="{BB962C8B-B14F-4D97-AF65-F5344CB8AC3E}">
-        <p14:creationId xmlns:p14="http://schemas.microsoft.com/office/powerpoint/2010/main" xmlns="" val="955529486"/>
+        <p14:creationId xmlns="" xmlns:p14="http://schemas.microsoft.com/office/powerpoint/2010/main" val="955529486"/>
       </p:ext>
     </p:extLst>
   </p:cSld>
@@ -5057,7 +5147,7 @@
     </p:spTree>
     <p:extLst>
       <p:ext uri="{BB962C8B-B14F-4D97-AF65-F5344CB8AC3E}">
-        <p14:creationId xmlns:p14="http://schemas.microsoft.com/office/powerpoint/2010/main" xmlns="" val="2297075656"/>
+        <p14:creationId xmlns="" xmlns:p14="http://schemas.microsoft.com/office/powerpoint/2010/main" val="2297075656"/>
       </p:ext>
     </p:extLst>
   </p:cSld>
@@ -5180,7 +5270,7 @@
     </p:spTree>
     <p:extLst>
       <p:ext uri="{BB962C8B-B14F-4D97-AF65-F5344CB8AC3E}">
-        <p14:creationId xmlns:p14="http://schemas.microsoft.com/office/powerpoint/2010/main" xmlns="" val="840644089"/>
+        <p14:creationId xmlns="" xmlns:p14="http://schemas.microsoft.com/office/powerpoint/2010/main" val="840644089"/>
       </p:ext>
     </p:extLst>
   </p:cSld>
@@ -5389,7 +5479,7 @@
     </p:spTree>
     <p:extLst>
       <p:ext uri="{BB962C8B-B14F-4D97-AF65-F5344CB8AC3E}">
-        <p14:creationId xmlns:p14="http://schemas.microsoft.com/office/powerpoint/2010/main" xmlns="" val="1167457217"/>
+        <p14:creationId xmlns="" xmlns:p14="http://schemas.microsoft.com/office/powerpoint/2010/main" val="1167457217"/>
       </p:ext>
     </p:extLst>
   </p:cSld>
@@ -5440,7 +5530,7 @@
         </p:txBody>
       </p:sp>
       <mc:AlternateContent xmlns:mc="http://schemas.openxmlformats.org/markup-compatibility/2006">
-        <mc:Choice xmlns:a14="http://schemas.microsoft.com/office/drawing/2010/main" xmlns="" Requires="a14">
+        <mc:Choice xmlns="" xmlns:a14="http://schemas.microsoft.com/office/drawing/2010/main" Requires="a14">
           <p:sp>
             <p:nvSpPr>
               <p:cNvPr id="3" name="Content Placeholder 2"/>
@@ -5728,7 +5818,7 @@
     </p:spTree>
     <p:extLst>
       <p:ext uri="{BB962C8B-B14F-4D97-AF65-F5344CB8AC3E}">
-        <p14:creationId xmlns:p14="http://schemas.microsoft.com/office/powerpoint/2010/main" xmlns="" val="277946741"/>
+        <p14:creationId xmlns="" xmlns:p14="http://schemas.microsoft.com/office/powerpoint/2010/main" val="277946741"/>
       </p:ext>
     </p:extLst>
   </p:cSld>
@@ -5863,7 +5953,7 @@
     </p:spTree>
     <p:extLst>
       <p:ext uri="{BB962C8B-B14F-4D97-AF65-F5344CB8AC3E}">
-        <p14:creationId xmlns:p14="http://schemas.microsoft.com/office/powerpoint/2010/main" xmlns="" val="1473410503"/>
+        <p14:creationId xmlns="" xmlns:p14="http://schemas.microsoft.com/office/powerpoint/2010/main" val="1473410503"/>
       </p:ext>
     </p:extLst>
   </p:cSld>
@@ -6629,7 +6719,7 @@
           </a:ln>
           <a:extLst>
             <a:ext uri="{909E8E84-426E-40DD-AFC4-6F175D3DCCD1}">
-              <a14:hiddenFill xmlns:a14="http://schemas.microsoft.com/office/drawing/2010/main" xmlns="">
+              <a14:hiddenFill xmlns="" xmlns:a14="http://schemas.microsoft.com/office/drawing/2010/main">
                 <a:noFill/>
               </a14:hiddenFill>
             </a:ext>
@@ -6663,7 +6753,7 @@
           </a:ln>
           <a:extLst>
             <a:ext uri="{909E8E84-426E-40DD-AFC4-6F175D3DCCD1}">
-              <a14:hiddenFill xmlns:a14="http://schemas.microsoft.com/office/drawing/2010/main" xmlns="">
+              <a14:hiddenFill xmlns="" xmlns:a14="http://schemas.microsoft.com/office/drawing/2010/main">
                 <a:noFill/>
               </a14:hiddenFill>
             </a:ext>
@@ -6697,7 +6787,7 @@
           </a:ln>
           <a:extLst>
             <a:ext uri="{909E8E84-426E-40DD-AFC4-6F175D3DCCD1}">
-              <a14:hiddenFill xmlns:a14="http://schemas.microsoft.com/office/drawing/2010/main" xmlns="">
+              <a14:hiddenFill xmlns="" xmlns:a14="http://schemas.microsoft.com/office/drawing/2010/main">
                 <a:noFill/>
               </a14:hiddenFill>
             </a:ext>
@@ -7058,7 +7148,7 @@
             </a:ln>
             <a:extLst>
               <a:ext uri="{909E8E84-426E-40DD-AFC4-6F175D3DCCD1}">
-                <a14:hiddenFill xmlns:a14="http://schemas.microsoft.com/office/drawing/2010/main" xmlns="">
+                <a14:hiddenFill xmlns="" xmlns:a14="http://schemas.microsoft.com/office/drawing/2010/main">
                   <a:noFill/>
                 </a14:hiddenFill>
               </a:ext>
@@ -7092,7 +7182,7 @@
             </a:ln>
             <a:extLst>
               <a:ext uri="{909E8E84-426E-40DD-AFC4-6F175D3DCCD1}">
-                <a14:hiddenFill xmlns:a14="http://schemas.microsoft.com/office/drawing/2010/main" xmlns="">
+                <a14:hiddenFill xmlns="" xmlns:a14="http://schemas.microsoft.com/office/drawing/2010/main">
                   <a:noFill/>
                 </a14:hiddenFill>
               </a:ext>
@@ -7126,7 +7216,7 @@
             </a:ln>
             <a:extLst>
               <a:ext uri="{909E8E84-426E-40DD-AFC4-6F175D3DCCD1}">
-                <a14:hiddenFill xmlns:a14="http://schemas.microsoft.com/office/drawing/2010/main" xmlns="">
+                <a14:hiddenFill xmlns="" xmlns:a14="http://schemas.microsoft.com/office/drawing/2010/main">
                   <a:noFill/>
                 </a14:hiddenFill>
               </a:ext>
@@ -7423,7 +7513,7 @@
             </a:ln>
             <a:extLst>
               <a:ext uri="{909E8E84-426E-40DD-AFC4-6F175D3DCCD1}">
-                <a14:hiddenFill xmlns:a14="http://schemas.microsoft.com/office/drawing/2010/main" xmlns="">
+                <a14:hiddenFill xmlns="" xmlns:a14="http://schemas.microsoft.com/office/drawing/2010/main">
                   <a:noFill/>
                 </a14:hiddenFill>
               </a:ext>
@@ -7457,7 +7547,7 @@
             </a:ln>
             <a:extLst>
               <a:ext uri="{909E8E84-426E-40DD-AFC4-6F175D3DCCD1}">
-                <a14:hiddenFill xmlns:a14="http://schemas.microsoft.com/office/drawing/2010/main" xmlns="">
+                <a14:hiddenFill xmlns="" xmlns:a14="http://schemas.microsoft.com/office/drawing/2010/main">
                   <a:noFill/>
                 </a14:hiddenFill>
               </a:ext>
@@ -7491,7 +7581,7 @@
             </a:ln>
             <a:extLst>
               <a:ext uri="{909E8E84-426E-40DD-AFC4-6F175D3DCCD1}">
-                <a14:hiddenFill xmlns:a14="http://schemas.microsoft.com/office/drawing/2010/main" xmlns="">
+                <a14:hiddenFill xmlns="" xmlns:a14="http://schemas.microsoft.com/office/drawing/2010/main">
                   <a:noFill/>
                 </a14:hiddenFill>
               </a:ext>
@@ -7589,7 +7679,7 @@
             </a:ln>
             <a:extLst>
               <a:ext uri="{909E8E84-426E-40DD-AFC4-6F175D3DCCD1}">
-                <a14:hiddenFill xmlns:a14="http://schemas.microsoft.com/office/drawing/2010/main" xmlns="">
+                <a14:hiddenFill xmlns="" xmlns:a14="http://schemas.microsoft.com/office/drawing/2010/main">
                   <a:noFill/>
                 </a14:hiddenFill>
               </a:ext>
@@ -7624,7 +7714,7 @@
           </a:ln>
           <a:extLst>
             <a:ext uri="{909E8E84-426E-40DD-AFC4-6F175D3DCCD1}">
-              <a14:hiddenFill xmlns:a14="http://schemas.microsoft.com/office/drawing/2010/main" xmlns="">
+              <a14:hiddenFill xmlns="" xmlns:a14="http://schemas.microsoft.com/office/drawing/2010/main">
                 <a:noFill/>
               </a14:hiddenFill>
             </a:ext>
@@ -7658,7 +7748,7 @@
           </a:ln>
           <a:extLst>
             <a:ext uri="{909E8E84-426E-40DD-AFC4-6F175D3DCCD1}">
-              <a14:hiddenFill xmlns:a14="http://schemas.microsoft.com/office/drawing/2010/main" xmlns="">
+              <a14:hiddenFill xmlns="" xmlns:a14="http://schemas.microsoft.com/office/drawing/2010/main">
                 <a:noFill/>
               </a14:hiddenFill>
             </a:ext>
@@ -7692,7 +7782,7 @@
           </a:ln>
           <a:extLst>
             <a:ext uri="{909E8E84-426E-40DD-AFC4-6F175D3DCCD1}">
-              <a14:hiddenFill xmlns:a14="http://schemas.microsoft.com/office/drawing/2010/main" xmlns="">
+              <a14:hiddenFill xmlns="" xmlns:a14="http://schemas.microsoft.com/office/drawing/2010/main">
                 <a:noFill/>
               </a14:hiddenFill>
             </a:ext>
@@ -7726,7 +7816,7 @@
           </a:ln>
           <a:extLst>
             <a:ext uri="{909E8E84-426E-40DD-AFC4-6F175D3DCCD1}">
-              <a14:hiddenFill xmlns:a14="http://schemas.microsoft.com/office/drawing/2010/main" xmlns="">
+              <a14:hiddenFill xmlns="" xmlns:a14="http://schemas.microsoft.com/office/drawing/2010/main">
                 <a:noFill/>
               </a14:hiddenFill>
             </a:ext>
@@ -7736,7 +7826,7 @@
     </p:spTree>
     <p:extLst>
       <p:ext uri="{BB962C8B-B14F-4D97-AF65-F5344CB8AC3E}">
-        <p14:creationId xmlns:p14="http://schemas.microsoft.com/office/powerpoint/2010/main" xmlns="" val="2513915860"/>
+        <p14:creationId xmlns="" xmlns:p14="http://schemas.microsoft.com/office/powerpoint/2010/main" val="2513915860"/>
       </p:ext>
     </p:extLst>
   </p:cSld>
@@ -7744,7 +7834,7 @@
     <a:masterClrMapping/>
   </p:clrMapOvr>
   <mc:AlternateContent xmlns:mc="http://schemas.openxmlformats.org/markup-compatibility/2006">
-    <mc:Choice xmlns:p14="http://schemas.microsoft.com/office/powerpoint/2010/main" xmlns="" Requires="p14">
+    <mc:Choice xmlns="" xmlns:p14="http://schemas.microsoft.com/office/powerpoint/2010/main" Requires="p14">
       <p:transition spd="slow" p14:dur="2000" advTm="12614"/>
     </mc:Choice>
     <mc:Fallback>
@@ -7895,11 +7985,7 @@
             </a:r>
             <a:r>
               <a:rPr lang="en-US" dirty="0" smtClean="0"/>
-              <a:t> assigned to each image. These are drawn from a fixed set of labels</a:t>
-            </a:r>
-            <a:r>
-              <a:rPr lang="en-US" dirty="0" smtClean="0"/>
-              <a:t>.</a:t>
+              <a:t> assigned to each image. These are drawn from a fixed set of labels.</a:t>
             </a:r>
           </a:p>
           <a:p>
@@ -7916,7 +8002,6 @@
               <a:rPr lang="en-US" dirty="0" smtClean="0"/>
               <a:t> ecosystem</a:t>
             </a:r>
-            <a:endParaRPr lang="en-US" dirty="0" smtClean="0"/>
           </a:p>
           <a:p>
             <a:r>
@@ -7968,7 +8053,7 @@
           <a:blip r:embed="rId3" cstate="print">
             <a:extLst>
               <a:ext uri="{28A0092B-C50C-407E-A947-70E740481C1C}">
-                <a14:useLocalDpi xmlns:a14="http://schemas.microsoft.com/office/drawing/2010/main" xmlns="" val="0"/>
+                <a14:useLocalDpi xmlns="" xmlns:a14="http://schemas.microsoft.com/office/drawing/2010/main" val="0"/>
               </a:ext>
             </a:extLst>
           </a:blip>
@@ -7991,14 +8076,14 @@
           </a:ln>
           <a:extLst>
             <a:ext uri="{909E8E84-426E-40DD-AFC4-6F175D3DCCD1}">
-              <a14:hiddenFill xmlns:a14="http://schemas.microsoft.com/office/drawing/2010/main" xmlns="">
+              <a14:hiddenFill xmlns="" xmlns:a14="http://schemas.microsoft.com/office/drawing/2010/main">
                 <a:solidFill>
                   <a:schemeClr val="accent1"/>
                 </a:solidFill>
               </a14:hiddenFill>
             </a:ext>
             <a:ext uri="{91240B29-F687-4F45-9708-019B960494DF}">
-              <a14:hiddenLine xmlns:a14="http://schemas.microsoft.com/office/drawing/2010/main" xmlns="" w="9525">
+              <a14:hiddenLine xmlns="" xmlns:a14="http://schemas.microsoft.com/office/drawing/2010/main" w="9525">
                 <a:solidFill>
                   <a:schemeClr val="tx1"/>
                 </a:solidFill>
@@ -8132,7 +8217,7 @@
     </p:spTree>
     <p:extLst>
       <p:ext uri="{BB962C8B-B14F-4D97-AF65-F5344CB8AC3E}">
-        <p14:creationId xmlns:p14="http://schemas.microsoft.com/office/powerpoint/2010/main" xmlns="" val="3961894748"/>
+        <p14:creationId xmlns="" xmlns:p14="http://schemas.microsoft.com/office/powerpoint/2010/main" val="3961894748"/>
       </p:ext>
     </p:extLst>
   </p:cSld>
@@ -8207,7 +8292,7 @@
         </p:txBody>
       </p:sp>
       <mc:AlternateContent xmlns:mc="http://schemas.openxmlformats.org/markup-compatibility/2006">
-        <mc:Choice xmlns:a14="http://schemas.microsoft.com/office/drawing/2010/main" xmlns="" Requires="a14">
+        <mc:Choice xmlns="" xmlns:a14="http://schemas.microsoft.com/office/drawing/2010/main" Requires="a14">
           <p:sp>
             <p:nvSpPr>
               <p:cNvPr id="5" name="Rectangle 4"/>
@@ -8301,7 +8386,7 @@
                 <a:avLst/>
               </a:prstGeom>
               <a:blipFill rotWithShape="1">
-                <a:blip r:embed="rId2" cstate="print"/>
+                <a:blip r:embed="rId3" cstate="print"/>
                 <a:stretch>
                   <a:fillRect/>
                 </a:stretch>
@@ -8323,7 +8408,7 @@
         </mc:Fallback>
       </mc:AlternateContent>
       <mc:AlternateContent xmlns:mc="http://schemas.openxmlformats.org/markup-compatibility/2006">
-        <mc:Choice xmlns:a14="http://schemas.microsoft.com/office/drawing/2010/main" xmlns="" Requires="a14">
+        <mc:Choice xmlns="" xmlns:a14="http://schemas.microsoft.com/office/drawing/2010/main" Requires="a14">
           <p:sp>
             <p:nvSpPr>
               <p:cNvPr id="6" name="Rectangle 5"/>
@@ -8417,7 +8502,7 @@
                 <a:avLst/>
               </a:prstGeom>
               <a:blipFill rotWithShape="1">
-                <a:blip r:embed="rId3" cstate="print"/>
+                <a:blip r:embed="rId4" cstate="print"/>
                 <a:stretch>
                   <a:fillRect/>
                 </a:stretch>
@@ -8439,7 +8524,7 @@
         </mc:Fallback>
       </mc:AlternateContent>
       <mc:AlternateContent xmlns:mc="http://schemas.openxmlformats.org/markup-compatibility/2006">
-        <mc:Choice xmlns:a14="http://schemas.microsoft.com/office/drawing/2010/main" xmlns="" Requires="a14">
+        <mc:Choice xmlns="" xmlns:a14="http://schemas.microsoft.com/office/drawing/2010/main" Requires="a14">
           <p:sp>
             <p:nvSpPr>
               <p:cNvPr id="7" name="Rectangle 6"/>
@@ -8533,7 +8618,7 @@
                 <a:avLst/>
               </a:prstGeom>
               <a:blipFill rotWithShape="1">
-                <a:blip r:embed="rId4" cstate="print"/>
+                <a:blip r:embed="rId5" cstate="print"/>
                 <a:stretch>
                   <a:fillRect/>
                 </a:stretch>
@@ -8555,7 +8640,7 @@
         </mc:Fallback>
       </mc:AlternateContent>
       <mc:AlternateContent xmlns:mc="http://schemas.openxmlformats.org/markup-compatibility/2006">
-        <mc:Choice xmlns:a14="http://schemas.microsoft.com/office/drawing/2010/main" xmlns="" Requires="a14">
+        <mc:Choice xmlns="" xmlns:a14="http://schemas.microsoft.com/office/drawing/2010/main" Requires="a14">
           <p:sp>
             <p:nvSpPr>
               <p:cNvPr id="8" name="Rectangle 7"/>
@@ -8649,7 +8734,7 @@
                 <a:avLst/>
               </a:prstGeom>
               <a:blipFill rotWithShape="1">
-                <a:blip r:embed="rId5" cstate="print"/>
+                <a:blip r:embed="rId6" cstate="print"/>
                 <a:stretch>
                   <a:fillRect/>
                 </a:stretch>
@@ -8671,7 +8756,7 @@
         </mc:Fallback>
       </mc:AlternateContent>
       <mc:AlternateContent xmlns:mc="http://schemas.openxmlformats.org/markup-compatibility/2006">
-        <mc:Choice xmlns:a14="http://schemas.microsoft.com/office/drawing/2010/main" xmlns="" Requires="a14">
+        <mc:Choice xmlns="" xmlns:a14="http://schemas.microsoft.com/office/drawing/2010/main" Requires="a14">
           <p:sp>
             <p:nvSpPr>
               <p:cNvPr id="9" name="Oval 8"/>
@@ -8781,7 +8866,7 @@
                 <a:avLst/>
               </a:prstGeom>
               <a:blipFill rotWithShape="1">
-                <a:blip r:embed="rId6" cstate="print"/>
+                <a:blip r:embed="rId7" cstate="print"/>
                 <a:stretch>
                   <a:fillRect/>
                 </a:stretch>
@@ -8803,7 +8888,7 @@
         </mc:Fallback>
       </mc:AlternateContent>
       <mc:AlternateContent xmlns:mc="http://schemas.openxmlformats.org/markup-compatibility/2006">
-        <mc:Choice xmlns:a14="http://schemas.microsoft.com/office/drawing/2010/main" xmlns="" Requires="a14">
+        <mc:Choice xmlns="" xmlns:a14="http://schemas.microsoft.com/office/drawing/2010/main" Requires="a14">
           <p:sp>
             <p:nvSpPr>
               <p:cNvPr id="10" name="Oval 9"/>
@@ -8911,7 +8996,7 @@
                 <a:avLst/>
               </a:prstGeom>
               <a:blipFill rotWithShape="1">
-                <a:blip r:embed="rId7" cstate="print"/>
+                <a:blip r:embed="rId8" cstate="print"/>
                 <a:stretch>
                   <a:fillRect/>
                 </a:stretch>
@@ -8933,7 +9018,7 @@
         </mc:Fallback>
       </mc:AlternateContent>
       <mc:AlternateContent xmlns:mc="http://schemas.openxmlformats.org/markup-compatibility/2006">
-        <mc:Choice xmlns:a14="http://schemas.microsoft.com/office/drawing/2010/main" xmlns="" Requires="a14">
+        <mc:Choice xmlns="" xmlns:a14="http://schemas.microsoft.com/office/drawing/2010/main" Requires="a14">
           <p:sp>
             <p:nvSpPr>
               <p:cNvPr id="11" name="Oval 10"/>
@@ -9043,7 +9128,7 @@
                 <a:avLst/>
               </a:prstGeom>
               <a:blipFill rotWithShape="1">
-                <a:blip r:embed="rId8" cstate="print"/>
+                <a:blip r:embed="rId9" cstate="print"/>
                 <a:stretch>
                   <a:fillRect/>
                 </a:stretch>
@@ -9065,7 +9150,7 @@
         </mc:Fallback>
       </mc:AlternateContent>
       <mc:AlternateContent xmlns:mc="http://schemas.openxmlformats.org/markup-compatibility/2006">
-        <mc:Choice xmlns:a14="http://schemas.microsoft.com/office/drawing/2010/main" xmlns="" Requires="a14">
+        <mc:Choice xmlns="" xmlns:a14="http://schemas.microsoft.com/office/drawing/2010/main" Requires="a14">
           <p:sp>
             <p:nvSpPr>
               <p:cNvPr id="12" name="Oval 11"/>
@@ -9173,7 +9258,7 @@
                 <a:avLst/>
               </a:prstGeom>
               <a:blipFill rotWithShape="1">
-                <a:blip r:embed="rId9" cstate="print"/>
+                <a:blip r:embed="rId10" cstate="print"/>
                 <a:stretch>
                   <a:fillRect/>
                 </a:stretch>
@@ -9347,7 +9432,7 @@
         </p:style>
       </p:cxnSp>
       <mc:AlternateContent xmlns:mc="http://schemas.openxmlformats.org/markup-compatibility/2006">
-        <mc:Choice xmlns:a14="http://schemas.microsoft.com/office/drawing/2010/main" xmlns="" Requires="a14">
+        <mc:Choice xmlns="" xmlns:a14="http://schemas.microsoft.com/office/drawing/2010/main" Requires="a14">
           <p:sp>
             <p:nvSpPr>
               <p:cNvPr id="25" name="Rectangle 24"/>
@@ -9441,7 +9526,7 @@
                 <a:avLst/>
               </a:prstGeom>
               <a:blipFill rotWithShape="1">
-                <a:blip r:embed="rId10" cstate="print"/>
+                <a:blip r:embed="rId11" cstate="print"/>
                 <a:stretch>
                   <a:fillRect/>
                 </a:stretch>
@@ -9463,7 +9548,7 @@
         </mc:Fallback>
       </mc:AlternateContent>
       <mc:AlternateContent xmlns:mc="http://schemas.openxmlformats.org/markup-compatibility/2006">
-        <mc:Choice xmlns:a14="http://schemas.microsoft.com/office/drawing/2010/main" xmlns="" Requires="a14">
+        <mc:Choice xmlns="" xmlns:a14="http://schemas.microsoft.com/office/drawing/2010/main" Requires="a14">
           <p:sp>
             <p:nvSpPr>
               <p:cNvPr id="26" name="Rectangle 25"/>
@@ -9557,7 +9642,7 @@
                 <a:avLst/>
               </a:prstGeom>
               <a:blipFill rotWithShape="1">
-                <a:blip r:embed="rId11" cstate="print"/>
+                <a:blip r:embed="rId12" cstate="print"/>
                 <a:stretch>
                   <a:fillRect/>
                 </a:stretch>
@@ -9579,7 +9664,7 @@
         </mc:Fallback>
       </mc:AlternateContent>
       <mc:AlternateContent xmlns:mc="http://schemas.openxmlformats.org/markup-compatibility/2006">
-        <mc:Choice xmlns:a14="http://schemas.microsoft.com/office/drawing/2010/main" xmlns="" Requires="a14">
+        <mc:Choice xmlns="" xmlns:a14="http://schemas.microsoft.com/office/drawing/2010/main" Requires="a14">
           <p:sp>
             <p:nvSpPr>
               <p:cNvPr id="27" name="Rectangle 26"/>
@@ -9673,7 +9758,7 @@
                 <a:avLst/>
               </a:prstGeom>
               <a:blipFill rotWithShape="1">
-                <a:blip r:embed="rId12" cstate="print"/>
+                <a:blip r:embed="rId13" cstate="print"/>
                 <a:stretch>
                   <a:fillRect/>
                 </a:stretch>
@@ -9695,7 +9780,7 @@
         </mc:Fallback>
       </mc:AlternateContent>
       <mc:AlternateContent xmlns:mc="http://schemas.openxmlformats.org/markup-compatibility/2006">
-        <mc:Choice xmlns:a14="http://schemas.microsoft.com/office/drawing/2010/main" xmlns="" Requires="a14">
+        <mc:Choice xmlns="" xmlns:a14="http://schemas.microsoft.com/office/drawing/2010/main" Requires="a14">
           <p:sp>
             <p:nvSpPr>
               <p:cNvPr id="28" name="Rectangle 27"/>
@@ -9789,7 +9874,7 @@
                 <a:avLst/>
               </a:prstGeom>
               <a:blipFill rotWithShape="1">
-                <a:blip r:embed="rId13" cstate="print"/>
+                <a:blip r:embed="rId14" cstate="print"/>
                 <a:stretch>
                   <a:fillRect/>
                 </a:stretch>
@@ -10107,7 +10192,7 @@
         </p:txBody>
       </p:sp>
       <mc:AlternateContent xmlns:mc="http://schemas.openxmlformats.org/markup-compatibility/2006">
-        <mc:Choice xmlns:a14="http://schemas.microsoft.com/office/drawing/2010/main" xmlns="" Requires="a14">
+        <mc:Choice xmlns="" xmlns:a14="http://schemas.microsoft.com/office/drawing/2010/main" Requires="a14">
           <p:sp>
             <p:nvSpPr>
               <p:cNvPr id="49" name="Rectangle 48"/>
@@ -10201,7 +10286,7 @@
                 <a:avLst/>
               </a:prstGeom>
               <a:blipFill rotWithShape="1">
-                <a:blip r:embed="rId14" cstate="print"/>
+                <a:blip r:embed="rId15" cstate="print"/>
                 <a:stretch>
                   <a:fillRect/>
                 </a:stretch>
@@ -10223,7 +10308,7 @@
         </mc:Fallback>
       </mc:AlternateContent>
       <mc:AlternateContent xmlns:mc="http://schemas.openxmlformats.org/markup-compatibility/2006">
-        <mc:Choice xmlns:a14="http://schemas.microsoft.com/office/drawing/2010/main" xmlns="" Requires="a14">
+        <mc:Choice xmlns="" xmlns:a14="http://schemas.microsoft.com/office/drawing/2010/main" Requires="a14">
           <p:sp>
             <p:nvSpPr>
               <p:cNvPr id="50" name="Rectangle 49"/>
@@ -10317,7 +10402,7 @@
                 <a:avLst/>
               </a:prstGeom>
               <a:blipFill rotWithShape="1">
-                <a:blip r:embed="rId15" cstate="print"/>
+                <a:blip r:embed="rId16" cstate="print"/>
                 <a:stretch>
                   <a:fillRect/>
                 </a:stretch>
@@ -10513,10 +10598,58 @@
           </a:p>
         </p:txBody>
       </p:sp>
+      <p:sp>
+        <p:nvSpPr>
+          <p:cNvPr id="36" name="Rectangle 35"/>
+          <p:cNvSpPr/>
+          <p:nvPr/>
+        </p:nvSpPr>
+        <p:spPr>
+          <a:xfrm>
+            <a:off x="685800" y="1371600"/>
+            <a:ext cx="1905000" cy="838200"/>
+          </a:xfrm>
+          <a:prstGeom prst="rect">
+            <a:avLst/>
+          </a:prstGeom>
+          <a:solidFill>
+            <a:srgbClr val="C00000">
+              <a:alpha val="42000"/>
+            </a:srgbClr>
+          </a:solidFill>
+          <a:ln>
+            <a:noFill/>
+          </a:ln>
+        </p:spPr>
+        <p:style>
+          <a:lnRef idx="2">
+            <a:schemeClr val="accent1">
+              <a:shade val="50000"/>
+            </a:schemeClr>
+          </a:lnRef>
+          <a:fillRef idx="1">
+            <a:schemeClr val="accent1"/>
+          </a:fillRef>
+          <a:effectRef idx="0">
+            <a:schemeClr val="accent1"/>
+          </a:effectRef>
+          <a:fontRef idx="minor">
+            <a:schemeClr val="lt1"/>
+          </a:fontRef>
+        </p:style>
+        <p:txBody>
+          <a:bodyPr rtlCol="0" anchor="ctr"/>
+          <a:lstStyle/>
+          <a:p>
+            <a:pPr algn="ctr"/>
+            <a:endParaRPr lang="en-US"/>
+          </a:p>
+        </p:txBody>
+      </p:sp>
     </p:spTree>
     <p:extLst>
       <p:ext uri="{BB962C8B-B14F-4D97-AF65-F5344CB8AC3E}">
-        <p14:creationId xmlns:p14="http://schemas.microsoft.com/office/powerpoint/2010/main" xmlns="" val="2857468552"/>
+        <p14:creationId xmlns="" xmlns:p14="http://schemas.microsoft.com/office/powerpoint/2010/main" val="2857468552"/>
       </p:ext>
     </p:extLst>
   </p:cSld>
@@ -10567,7 +10700,7 @@
         </p:txBody>
       </p:sp>
       <mc:AlternateContent xmlns:mc="http://schemas.openxmlformats.org/markup-compatibility/2006">
-        <mc:Choice xmlns:a14="http://schemas.microsoft.com/office/drawing/2010/main" xmlns="" Requires="a14">
+        <mc:Choice xmlns="" xmlns:a14="http://schemas.microsoft.com/office/drawing/2010/main" Requires="a14">
           <p:sp>
             <p:nvSpPr>
               <p:cNvPr id="3" name="Content Placeholder 2"/>
@@ -10944,7 +11077,7 @@
     </p:spTree>
     <p:extLst>
       <p:ext uri="{BB962C8B-B14F-4D97-AF65-F5344CB8AC3E}">
-        <p14:creationId xmlns:p14="http://schemas.microsoft.com/office/powerpoint/2010/main" xmlns="" val="1549022391"/>
+        <p14:creationId xmlns="" xmlns:p14="http://schemas.microsoft.com/office/powerpoint/2010/main" val="1549022391"/>
       </p:ext>
     </p:extLst>
   </p:cSld>
@@ -10995,7 +11128,7 @@
         </p:txBody>
       </p:sp>
       <mc:AlternateContent xmlns:mc="http://schemas.openxmlformats.org/markup-compatibility/2006">
-        <mc:Choice xmlns:a14="http://schemas.microsoft.com/office/drawing/2010/main" xmlns="" Requires="a14">
+        <mc:Choice xmlns="" xmlns:a14="http://schemas.microsoft.com/office/drawing/2010/main" Requires="a14">
           <p:sp>
             <p:nvSpPr>
               <p:cNvPr id="3" name="Content Placeholder 2"/>
@@ -11253,7 +11386,7 @@
     </p:spTree>
     <p:extLst>
       <p:ext uri="{BB962C8B-B14F-4D97-AF65-F5344CB8AC3E}">
-        <p14:creationId xmlns:p14="http://schemas.microsoft.com/office/powerpoint/2010/main" xmlns="" val="2451192601"/>
+        <p14:creationId xmlns="" xmlns:p14="http://schemas.microsoft.com/office/powerpoint/2010/main" val="2451192601"/>
       </p:ext>
     </p:extLst>
   </p:cSld>
@@ -11311,7 +11444,7 @@
         </p:txBody>
       </p:sp>
       <mc:AlternateContent xmlns:mc="http://schemas.openxmlformats.org/markup-compatibility/2006">
-        <mc:Choice xmlns:a14="http://schemas.microsoft.com/office/drawing/2010/main" xmlns="" Requires="a14">
+        <mc:Choice xmlns="" xmlns:a14="http://schemas.microsoft.com/office/drawing/2010/main" Requires="a14">
           <p:sp>
             <p:nvSpPr>
               <p:cNvPr id="3" name="Content Placeholder 2"/>
@@ -11887,7 +12020,7 @@
     </p:spTree>
     <p:extLst>
       <p:ext uri="{BB962C8B-B14F-4D97-AF65-F5344CB8AC3E}">
-        <p14:creationId xmlns:p14="http://schemas.microsoft.com/office/powerpoint/2010/main" xmlns="" val="4200860546"/>
+        <p14:creationId xmlns="" xmlns:p14="http://schemas.microsoft.com/office/powerpoint/2010/main" val="4200860546"/>
       </p:ext>
     </p:extLst>
   </p:cSld>
@@ -11945,7 +12078,7 @@
         </p:txBody>
       </p:sp>
       <mc:AlternateContent xmlns:mc="http://schemas.openxmlformats.org/markup-compatibility/2006">
-        <mc:Choice xmlns:a14="http://schemas.microsoft.com/office/drawing/2010/main" xmlns="" Requires="a14">
+        <mc:Choice xmlns="" xmlns:a14="http://schemas.microsoft.com/office/drawing/2010/main" Requires="a14">
           <p:sp>
             <p:nvSpPr>
               <p:cNvPr id="3" name="Content Placeholder 2"/>
@@ -12950,7 +13083,7 @@
     </p:spTree>
     <p:extLst>
       <p:ext uri="{BB962C8B-B14F-4D97-AF65-F5344CB8AC3E}">
-        <p14:creationId xmlns:p14="http://schemas.microsoft.com/office/powerpoint/2010/main" xmlns="" val="2339978254"/>
+        <p14:creationId xmlns="" xmlns:p14="http://schemas.microsoft.com/office/powerpoint/2010/main" val="2339978254"/>
       </p:ext>
     </p:extLst>
   </p:cSld>
@@ -12985,7 +13118,7 @@
         </a:xfrm>
       </p:grpSpPr>
       <mc:AlternateContent xmlns:mc="http://schemas.openxmlformats.org/markup-compatibility/2006">
-        <mc:Choice xmlns:a14="http://schemas.microsoft.com/office/drawing/2010/main" xmlns="" Requires="a14">
+        <mc:Choice xmlns="" xmlns:a14="http://schemas.microsoft.com/office/drawing/2010/main" Requires="a14">
           <p:sp>
             <p:nvSpPr>
               <p:cNvPr id="2" name="Title 1"/>
@@ -13119,7 +13252,7 @@
         </mc:Fallback>
       </mc:AlternateContent>
       <mc:AlternateContent xmlns:mc="http://schemas.openxmlformats.org/markup-compatibility/2006">
-        <mc:Choice xmlns:a14="http://schemas.microsoft.com/office/drawing/2010/main" xmlns="" Requires="a14">
+        <mc:Choice xmlns="" xmlns:a14="http://schemas.microsoft.com/office/drawing/2010/main" Requires="a14">
           <p:sp>
             <p:nvSpPr>
               <p:cNvPr id="3" name="Content Placeholder 2"/>
@@ -13860,7 +13993,7 @@
     </p:spTree>
     <p:extLst>
       <p:ext uri="{BB962C8B-B14F-4D97-AF65-F5344CB8AC3E}">
-        <p14:creationId xmlns:p14="http://schemas.microsoft.com/office/powerpoint/2010/main" xmlns="" val="2671729980"/>
+        <p14:creationId xmlns="" xmlns:p14="http://schemas.microsoft.com/office/powerpoint/2010/main" val="2671729980"/>
       </p:ext>
     </p:extLst>
   </p:cSld>
@@ -13888,7 +14021,7 @@
         </a:xfrm>
       </p:grpSpPr>
       <mc:AlternateContent xmlns:mc="http://schemas.openxmlformats.org/markup-compatibility/2006">
-        <mc:Choice xmlns:a14="http://schemas.microsoft.com/office/drawing/2010/main" xmlns="" Requires="a14">
+        <mc:Choice xmlns="" xmlns:a14="http://schemas.microsoft.com/office/drawing/2010/main" Requires="a14">
           <p:sp>
             <p:nvSpPr>
               <p:cNvPr id="2" name="Title 1"/>
@@ -13989,7 +14122,7 @@
         </mc:Fallback>
       </mc:AlternateContent>
       <mc:AlternateContent xmlns:mc="http://schemas.openxmlformats.org/markup-compatibility/2006">
-        <mc:Choice xmlns:a14="http://schemas.microsoft.com/office/drawing/2010/main" xmlns="" Requires="a14">
+        <mc:Choice xmlns="" xmlns:a14="http://schemas.microsoft.com/office/drawing/2010/main" Requires="a14">
           <p:sp>
             <p:nvSpPr>
               <p:cNvPr id="3" name="Content Placeholder 2"/>
@@ -15254,7 +15387,7 @@
     </p:spTree>
     <p:extLst>
       <p:ext uri="{BB962C8B-B14F-4D97-AF65-F5344CB8AC3E}">
-        <p14:creationId xmlns:p14="http://schemas.microsoft.com/office/powerpoint/2010/main" xmlns="" val="888210028"/>
+        <p14:creationId xmlns="" xmlns:p14="http://schemas.microsoft.com/office/powerpoint/2010/main" val="888210028"/>
       </p:ext>
     </p:extLst>
   </p:cSld>

</xml_diff>

<commit_message>
Fixed author order on the slides
</commit_message>
<xml_diff>
--- a/problem_statement/Challenge Problem 6.pptx
+++ b/problem_statement/Challenge Problem 6.pptx
@@ -4368,19 +4368,32 @@
           <a:p>
             <a:r>
               <a:rPr lang="en-US" dirty="0" smtClean="0"/>
-              <a:t>Chad Scherrer, Galois</a:t>
-            </a:r>
-          </a:p>
-          <a:p>
+              <a:t>Roddy </a:t>
+            </a:r>
             <a:r>
               <a:rPr lang="en-US" dirty="0" smtClean="0"/>
-              <a:t>Roddy Collins, </a:t>
+              <a:t>Collins, </a:t>
             </a:r>
             <a:r>
               <a:rPr lang="en-US" dirty="0" err="1" smtClean="0"/>
               <a:t>Kitware</a:t>
             </a:r>
-            <a:endParaRPr lang="en-US" dirty="0"/>
+            <a:endParaRPr lang="en-US" dirty="0" smtClean="0"/>
+          </a:p>
+          <a:p>
+            <a:r>
+              <a:rPr lang="en-US"/>
+              <a:t>Chad Scherrer</a:t>
+            </a:r>
+            <a:r>
+              <a:rPr lang="en-US"/>
+              <a:t>, </a:t>
+            </a:r>
+            <a:r>
+              <a:rPr lang="en-US" smtClean="0"/>
+              <a:t>Galois</a:t>
+            </a:r>
+            <a:endParaRPr lang="en-US"/>
           </a:p>
         </p:txBody>
       </p:sp>
@@ -7774,7 +7787,6 @@
               <a:rPr lang="en-US" sz="2400" dirty="0" smtClean="0"/>
               <a:t> </a:t>
             </a:r>
-            <a:endParaRPr lang="en-US" sz="2400" dirty="0" smtClean="0"/>
           </a:p>
           <a:p>
             <a:r>

</xml_diff>

<commit_message>
Updated timetable following Chris' guidance
</commit_message>
<xml_diff>
--- a/problem_statement/Challenge Problem 6.pptx
+++ b/problem_statement/Challenge Problem 6.pptx
@@ -4368,11 +4368,7 @@
           <a:p>
             <a:r>
               <a:rPr lang="en-US" dirty="0" smtClean="0"/>
-              <a:t>Roddy </a:t>
-            </a:r>
-            <a:r>
-              <a:rPr lang="en-US" dirty="0" smtClean="0"/>
-              <a:t>Collins, </a:t>
+              <a:t>Roddy Collins, </a:t>
             </a:r>
             <a:r>
               <a:rPr lang="en-US" dirty="0" err="1" smtClean="0"/>
@@ -4383,11 +4379,7 @@
           <a:p>
             <a:r>
               <a:rPr lang="en-US"/>
-              <a:t>Chad Scherrer</a:t>
-            </a:r>
-            <a:r>
-              <a:rPr lang="en-US"/>
-              <a:t>, </a:t>
+              <a:t>Chad Scherrer, </a:t>
             </a:r>
             <a:r>
               <a:rPr lang="en-US" smtClean="0"/>
@@ -7624,21 +7616,46 @@
             <a:pPr lvl="1"/>
             <a:r>
               <a:rPr lang="en-US" sz="2400" dirty="0" smtClean="0"/>
-              <a:t>Beta Period</a:t>
+              <a:t>October 15-30: Beta </a:t>
+            </a:r>
+            <a:r>
+              <a:rPr lang="en-US" sz="2400" dirty="0" smtClean="0"/>
+              <a:t>Period</a:t>
             </a:r>
           </a:p>
           <a:p>
             <a:pPr lvl="1"/>
             <a:r>
               <a:rPr lang="en-US" sz="2400" dirty="0" smtClean="0"/>
-              <a:t>Final Deadline for CP5 and CP6 solutions</a:t>
-            </a:r>
+              <a:t>45 Days before PI meeting: Final </a:t>
+            </a:r>
+            <a:r>
+              <a:rPr lang="en-US" sz="2400" dirty="0" smtClean="0"/>
+              <a:t>Deadline for CP5 and CP6 </a:t>
+            </a:r>
+            <a:r>
+              <a:rPr lang="en-US" sz="2400" dirty="0" smtClean="0"/>
+              <a:t>solutions</a:t>
+            </a:r>
+            <a:endParaRPr lang="en-US" sz="2400" dirty="0" smtClean="0"/>
           </a:p>
           <a:p>
             <a:pPr lvl="1"/>
             <a:r>
               <a:rPr lang="en-US" sz="2400" dirty="0" smtClean="0"/>
-              <a:t>January ??: PI Meeting (co-located but not conflicting with POPL)</a:t>
+              <a:t>January ??: PI Meeting (</a:t>
+            </a:r>
+            <a:r>
+              <a:rPr lang="en-US" sz="2400" smtClean="0"/>
+              <a:t>co-located </a:t>
+            </a:r>
+            <a:r>
+              <a:rPr lang="en-US" sz="2400" smtClean="0"/>
+              <a:t>but </a:t>
+            </a:r>
+            <a:r>
+              <a:rPr lang="en-US" sz="2400" dirty="0" smtClean="0"/>
+              <a:t>not conflicting with POPL)</a:t>
             </a:r>
             <a:endParaRPr lang="en-US" sz="2400" dirty="0"/>
           </a:p>

</xml_diff>

<commit_message>
Added email list to final slide
</commit_message>
<xml_diff>
--- a/problem_statement/Challenge Problem 6.pptx
+++ b/problem_statement/Challenge Problem 6.pptx
@@ -7616,28 +7616,15 @@
             <a:pPr lvl="1"/>
             <a:r>
               <a:rPr lang="en-US" sz="2400" dirty="0" smtClean="0"/>
-              <a:t>October 15-30: Beta </a:t>
-            </a:r>
+              <a:t>October 15-30: Beta Period</a:t>
+            </a:r>
+          </a:p>
+          <a:p>
+            <a:pPr lvl="1"/>
             <a:r>
               <a:rPr lang="en-US" sz="2400" dirty="0" smtClean="0"/>
-              <a:t>Period</a:t>
-            </a:r>
-          </a:p>
-          <a:p>
-            <a:pPr lvl="1"/>
-            <a:r>
-              <a:rPr lang="en-US" sz="2400" dirty="0" smtClean="0"/>
-              <a:t>45 Days before PI meeting: Final </a:t>
-            </a:r>
-            <a:r>
-              <a:rPr lang="en-US" sz="2400" dirty="0" smtClean="0"/>
-              <a:t>Deadline for CP5 and CP6 </a:t>
-            </a:r>
-            <a:r>
-              <a:rPr lang="en-US" sz="2400" dirty="0" smtClean="0"/>
-              <a:t>solutions</a:t>
-            </a:r>
-            <a:endParaRPr lang="en-US" sz="2400" dirty="0" smtClean="0"/>
+              <a:t>45 Days before PI meeting: Final Deadline for CP5 and CP6 solutions</a:t>
+            </a:r>
           </a:p>
           <a:p>
             <a:pPr lvl="1"/>
@@ -7647,11 +7634,7 @@
             </a:r>
             <a:r>
               <a:rPr lang="en-US" sz="2400" smtClean="0"/>
-              <a:t>co-located </a:t>
-            </a:r>
-            <a:r>
-              <a:rPr lang="en-US" sz="2400" smtClean="0"/>
-              <a:t>but </a:t>
+              <a:t>co-located but </a:t>
             </a:r>
             <a:r>
               <a:rPr lang="en-US" sz="2400" dirty="0" smtClean="0"/>
@@ -7822,6 +7805,40 @@
               <a:rPr lang="en-US" sz="2400" dirty="0" smtClean="0"/>
               <a:t> </a:t>
             </a:r>
+            <a:endParaRPr lang="en-US" sz="2400" dirty="0" smtClean="0"/>
+          </a:p>
+          <a:p>
+            <a:endParaRPr lang="en-US" sz="2400" dirty="0"/>
+          </a:p>
+          <a:p>
+            <a:pPr marL="0" indent="0">
+              <a:buNone/>
+            </a:pPr>
+            <a:r>
+              <a:rPr lang="en-US" sz="2400" dirty="0" smtClean="0"/>
+              <a:t>Email address for questions, issues, etc.:</a:t>
+            </a:r>
+          </a:p>
+          <a:p>
+            <a:pPr marL="0" indent="0">
+              <a:buNone/>
+            </a:pPr>
+            <a:r>
+              <a:rPr lang="en-US" sz="2400"/>
+              <a:t>	</a:t>
+            </a:r>
+            <a:r>
+              <a:rPr lang="en-US" sz="2400" u="sng" smtClean="0">
+                <a:hlinkClick r:id="rId4"/>
+              </a:rPr>
+              <a:t>ppaml-support@community.galois.com</a:t>
+            </a:r>
+            <a:endParaRPr lang="en-US" sz="2400" u="sng" smtClean="0"/>
+          </a:p>
+          <a:p>
+            <a:pPr marL="0" indent="0">
+              <a:buNone/>
+            </a:pPr>
             <a:endParaRPr lang="en-US" sz="2400" dirty="0"/>
           </a:p>
         </p:txBody>

</xml_diff>

<commit_message>
Updates to reflect Roddy's requests
Changes a few details of the input features. Also changed "baseline
model" to "probabilistic model" and added a note on MAP inference.
</commit_message>
<xml_diff>
--- a/problem_statement/Challenge Problem 6.pptx
+++ b/problem_statement/Challenge Problem 6.pptx
@@ -5,7 +5,7 @@
     <p:sldMasterId id="2147483648" r:id="rId1"/>
   </p:sldMasterIdLst>
   <p:notesMasterIdLst>
-    <p:notesMasterId r:id="rId21"/>
+    <p:notesMasterId r:id="rId22"/>
   </p:notesMasterIdLst>
   <p:sldIdLst>
     <p:sldId id="256" r:id="rId2"/>
@@ -27,6 +27,7 @@
     <p:sldId id="273" r:id="rId18"/>
     <p:sldId id="274" r:id="rId19"/>
     <p:sldId id="275" r:id="rId20"/>
+    <p:sldId id="276" r:id="rId21"/>
   </p:sldIdLst>
   <p:sldSz cx="9144000" cy="6858000" type="screen4x3"/>
   <p:notesSz cx="6858000" cy="9144000"/>
@@ -210,7 +211,7 @@
           <a:p>
             <a:fld id="{9E6BD383-960F-4311-92C8-B2CD992ECA1E}" type="datetimeFigureOut">
               <a:rPr lang="en-US" smtClean="0"/>
-              <a:t>7/13/2015</a:t>
+              <a:t>7/14/2015</a:t>
             </a:fld>
             <a:endParaRPr lang="en-US"/>
           </a:p>
@@ -673,7 +674,7 @@
           <a:p>
             <a:fld id="{F3B64B42-97C5-4E7F-A046-9ABFB24F4647}" type="datetime1">
               <a:rPr lang="en-US" smtClean="0"/>
-              <a:t>7/13/2015</a:t>
+              <a:t>7/14/2015</a:t>
             </a:fld>
             <a:endParaRPr lang="en-US"/>
           </a:p>
@@ -887,7 +888,7 @@
           <a:p>
             <a:fld id="{8FA0EC12-4566-4CE0-B247-A2A993FCE100}" type="datetime1">
               <a:rPr lang="en-US" smtClean="0"/>
-              <a:t>7/13/2015</a:t>
+              <a:t>7/14/2015</a:t>
             </a:fld>
             <a:endParaRPr lang="en-US"/>
           </a:p>
@@ -1101,7 +1102,7 @@
           <a:p>
             <a:fld id="{788685CE-C5FB-40C9-BA61-348FC7272552}" type="datetime1">
               <a:rPr lang="en-US" smtClean="0"/>
-              <a:t>7/13/2015</a:t>
+              <a:t>7/14/2015</a:t>
             </a:fld>
             <a:endParaRPr lang="en-US"/>
           </a:p>
@@ -1589,7 +1590,7 @@
           <a:p>
             <a:fld id="{79144205-5CF7-4997-A8A7-73185C3E51BD}" type="datetime1">
               <a:rPr lang="en-US" smtClean="0"/>
-              <a:t>7/13/2015</a:t>
+              <a:t>7/14/2015</a:t>
             </a:fld>
             <a:endParaRPr lang="en-US"/>
           </a:p>
@@ -1869,7 +1870,7 @@
           <a:p>
             <a:fld id="{62118C28-9CF9-4F09-994F-3AF8E3C8B50E}" type="datetime1">
               <a:rPr lang="en-US" smtClean="0"/>
-              <a:t>7/13/2015</a:t>
+              <a:t>7/14/2015</a:t>
             </a:fld>
             <a:endParaRPr lang="en-US"/>
           </a:p>
@@ -2199,7 +2200,7 @@
           <a:p>
             <a:fld id="{7B91938F-9454-4F6C-ACB2-DD81AA9A83F6}" type="datetime1">
               <a:rPr lang="en-US" smtClean="0"/>
-              <a:t>7/13/2015</a:t>
+              <a:t>7/14/2015</a:t>
             </a:fld>
             <a:endParaRPr lang="en-US"/>
           </a:p>
@@ -2669,7 +2670,7 @@
           <a:p>
             <a:fld id="{B789D24A-2359-461F-AF40-1ADDF63DBEFE}" type="datetime1">
               <a:rPr lang="en-US" smtClean="0"/>
-              <a:t>7/13/2015</a:t>
+              <a:t>7/14/2015</a:t>
             </a:fld>
             <a:endParaRPr lang="en-US"/>
           </a:p>
@@ -2823,7 +2824,7 @@
           <a:p>
             <a:fld id="{12811A03-8C0D-446E-B071-DE28A83022E6}" type="datetime1">
               <a:rPr lang="en-US" smtClean="0"/>
-              <a:t>7/13/2015</a:t>
+              <a:t>7/14/2015</a:t>
             </a:fld>
             <a:endParaRPr lang="en-US"/>
           </a:p>
@@ -2946,7 +2947,7 @@
           <a:p>
             <a:fld id="{04FCF0CD-5D8E-4B83-9302-B220564DA9C3}" type="datetime1">
               <a:rPr lang="en-US" smtClean="0"/>
-              <a:t>7/13/2015</a:t>
+              <a:t>7/14/2015</a:t>
             </a:fld>
             <a:endParaRPr lang="en-US"/>
           </a:p>
@@ -3260,7 +3261,7 @@
           <a:p>
             <a:fld id="{2C763469-E329-44C8-A8C3-F8F5F3287007}" type="datetime1">
               <a:rPr lang="en-US" smtClean="0"/>
-              <a:t>7/13/2015</a:t>
+              <a:t>7/14/2015</a:t>
             </a:fld>
             <a:endParaRPr lang="en-US"/>
           </a:p>
@@ -3550,7 +3551,7 @@
           <a:p>
             <a:fld id="{44B2C831-ADF7-4486-8C19-48EB1D12687C}" type="datetime1">
               <a:rPr lang="en-US" smtClean="0"/>
-              <a:t>7/13/2015</a:t>
+              <a:t>7/14/2015</a:t>
             </a:fld>
             <a:endParaRPr lang="en-US"/>
           </a:p>
@@ -4509,9 +4510,28 @@
             </a:r>
           </a:p>
           <a:p>
+            <a:pPr lvl="1"/>
             <a:r>
               <a:rPr lang="en-US" dirty="0" smtClean="0"/>
-              <a:t>Penalized maximum margin</a:t>
+              <a:t>equivalent to MAP with zero-mean Gaussian prior on all parameters</a:t>
+            </a:r>
+            <a:endParaRPr lang="en-US" dirty="0" smtClean="0"/>
+          </a:p>
+          <a:p>
+            <a:r>
+              <a:rPr lang="en-US" dirty="0" smtClean="0"/>
+              <a:t>Penalized maximum </a:t>
+            </a:r>
+            <a:r>
+              <a:rPr lang="en-US" dirty="0" smtClean="0"/>
+              <a:t>margin </a:t>
+            </a:r>
+          </a:p>
+          <a:p>
+            <a:pPr lvl="1"/>
+            <a:r>
+              <a:rPr lang="en-US" dirty="0" smtClean="0"/>
+              <a:t>non-probabilistic baseline</a:t>
             </a:r>
             <a:endParaRPr lang="en-US" dirty="0"/>
           </a:p>
@@ -4661,7 +4681,19 @@
           <a:p>
             <a:r>
               <a:rPr lang="en-US" dirty="0" smtClean="0"/>
-              <a:t>CP6 will use a subset of 12,690 images (due to licensing and logistical issues)</a:t>
+              <a:t>CP6 will use a subset of </a:t>
+            </a:r>
+            <a:r>
+              <a:rPr lang="en-US" dirty="0"/>
+              <a:t>12,889</a:t>
+            </a:r>
+            <a:r>
+              <a:rPr lang="en-US" dirty="0" smtClean="0"/>
+              <a:t> </a:t>
+            </a:r>
+            <a:r>
+              <a:rPr lang="en-US" dirty="0" smtClean="0"/>
+              <a:t>images (due to licensing and logistical issues)</a:t>
             </a:r>
           </a:p>
           <a:p>
@@ -7805,7 +7837,6 @@
               <a:rPr lang="en-US" sz="2400" dirty="0" smtClean="0"/>
               <a:t> </a:t>
             </a:r>
-            <a:endParaRPr lang="en-US" sz="2400" dirty="0" smtClean="0"/>
           </a:p>
           <a:p>
             <a:endParaRPr lang="en-US" sz="2400" dirty="0"/>
@@ -8166,6 +8197,142 @@
     <p:extLst>
       <p:ext uri="{BB962C8B-B14F-4D97-AF65-F5344CB8AC3E}">
         <p14:creationId xmlns:p14="http://schemas.microsoft.com/office/powerpoint/2010/main" val="3961894748"/>
+      </p:ext>
+    </p:extLst>
+  </p:cSld>
+  <p:clrMapOvr>
+    <a:masterClrMapping/>
+  </p:clrMapOvr>
+</p:sld>
+</file>
+
+<file path=ppt/slides/slide20.xml><?xml version="1.0" encoding="utf-8"?>
+<p:sld xmlns:a="http://schemas.openxmlformats.org/drawingml/2006/main" xmlns:r="http://schemas.openxmlformats.org/officeDocument/2006/relationships" xmlns:p="http://schemas.openxmlformats.org/presentationml/2006/main">
+  <p:cSld>
+    <p:spTree>
+      <p:nvGrpSpPr>
+        <p:cNvPr id="1" name=""/>
+        <p:cNvGrpSpPr/>
+        <p:nvPr/>
+      </p:nvGrpSpPr>
+      <p:grpSpPr>
+        <a:xfrm>
+          <a:off x="0" y="0"/>
+          <a:ext cx="0" cy="0"/>
+          <a:chOff x="0" y="0"/>
+          <a:chExt cx="0" cy="0"/>
+        </a:xfrm>
+      </p:grpSpPr>
+      <p:sp>
+        <p:nvSpPr>
+          <p:cNvPr id="2" name="Title 1"/>
+          <p:cNvSpPr>
+            <a:spLocks noGrp="1"/>
+          </p:cNvSpPr>
+          <p:nvPr>
+            <p:ph type="title"/>
+          </p:nvPr>
+        </p:nvSpPr>
+        <p:spPr/>
+        <p:txBody>
+          <a:bodyPr/>
+          <a:lstStyle/>
+          <a:p>
+            <a:r>
+              <a:rPr lang="en-US" dirty="0" smtClean="0"/>
+              <a:t>Future Challenge Problems</a:t>
+            </a:r>
+            <a:endParaRPr lang="en-US" dirty="0"/>
+          </a:p>
+        </p:txBody>
+      </p:sp>
+      <p:sp>
+        <p:nvSpPr>
+          <p:cNvPr id="3" name="Content Placeholder 2"/>
+          <p:cNvSpPr>
+            <a:spLocks noGrp="1"/>
+          </p:cNvSpPr>
+          <p:nvPr>
+            <p:ph idx="1"/>
+          </p:nvPr>
+        </p:nvSpPr>
+        <p:spPr/>
+        <p:txBody>
+          <a:bodyPr>
+            <a:normAutofit lnSpcReduction="10000"/>
+          </a:bodyPr>
+          <a:lstStyle/>
+          <a:p>
+            <a:r>
+              <a:rPr lang="en-US" dirty="0" smtClean="0"/>
+              <a:t>TA1/DARPA are discussing possible changes in future Challenge Problems</a:t>
+            </a:r>
+          </a:p>
+          <a:p>
+            <a:r>
+              <a:rPr lang="en-US" dirty="0" smtClean="0"/>
+              <a:t>One idea is to tackle one or more “Grand Challenge” problems where probabilistic programming has high potential to advance the state of the art</a:t>
+            </a:r>
+          </a:p>
+          <a:p>
+            <a:r>
+              <a:rPr lang="en-US" dirty="0" smtClean="0"/>
+              <a:t>Each TA2-4 team is encouraged to send a representative to the Micro Breakout on this topic</a:t>
+            </a:r>
+            <a:endParaRPr lang="en-US" dirty="0"/>
+          </a:p>
+        </p:txBody>
+      </p:sp>
+      <p:sp>
+        <p:nvSpPr>
+          <p:cNvPr id="4" name="Footer Placeholder 3"/>
+          <p:cNvSpPr>
+            <a:spLocks noGrp="1"/>
+          </p:cNvSpPr>
+          <p:nvPr>
+            <p:ph type="ftr" sz="quarter" idx="11"/>
+          </p:nvPr>
+        </p:nvSpPr>
+        <p:spPr/>
+        <p:txBody>
+          <a:bodyPr/>
+          <a:lstStyle/>
+          <a:p>
+            <a:r>
+              <a:rPr lang="en-US" smtClean="0"/>
+              <a:t>Distribution Unlimited</a:t>
+            </a:r>
+            <a:endParaRPr lang="en-US"/>
+          </a:p>
+        </p:txBody>
+      </p:sp>
+      <p:sp>
+        <p:nvSpPr>
+          <p:cNvPr id="5" name="Slide Number Placeholder 4"/>
+          <p:cNvSpPr>
+            <a:spLocks noGrp="1"/>
+          </p:cNvSpPr>
+          <p:nvPr>
+            <p:ph type="sldNum" sz="quarter" idx="12"/>
+          </p:nvPr>
+        </p:nvSpPr>
+        <p:spPr/>
+        <p:txBody>
+          <a:bodyPr/>
+          <a:lstStyle/>
+          <a:p>
+            <a:fld id="{B7AE4108-064F-4050-AAE5-C40EA46DD43F}" type="slidenum">
+              <a:rPr lang="en-US" smtClean="0"/>
+              <a:t>20</a:t>
+            </a:fld>
+            <a:endParaRPr lang="en-US"/>
+          </a:p>
+        </p:txBody>
+      </p:sp>
+    </p:spTree>
+    <p:extLst>
+      <p:ext uri="{BB962C8B-B14F-4D97-AF65-F5344CB8AC3E}">
+        <p14:creationId xmlns:p14="http://schemas.microsoft.com/office/powerpoint/2010/main" val="668578897"/>
       </p:ext>
     </p:extLst>
   </p:cSld>
@@ -11002,31 +11169,82 @@
           <a:chExt cx="0" cy="0"/>
         </a:xfrm>
       </p:grpSpPr>
-      <p:sp>
-        <p:nvSpPr>
-          <p:cNvPr id="2" name="Title 1"/>
-          <p:cNvSpPr>
-            <a:spLocks noGrp="1"/>
-          </p:cNvSpPr>
-          <p:nvPr>
-            <p:ph type="title"/>
-          </p:nvPr>
-        </p:nvSpPr>
-        <p:spPr/>
-        <p:txBody>
-          <a:bodyPr/>
-          <a:lstStyle/>
-          <a:p>
-            <a:r>
-              <a:rPr lang="en-US" dirty="0" smtClean="0"/>
-              <a:t>Image Encoding</a:t>
-            </a:r>
-            <a:endParaRPr lang="en-US" dirty="0"/>
-          </a:p>
-        </p:txBody>
-      </p:sp>
-      <mc:AlternateContent xmlns:mc="http://schemas.openxmlformats.org/markup-compatibility/2006" xmlns:a14="http://schemas.microsoft.com/office/drawing/2010/main">
-        <mc:Choice Requires="a14">
+      <mc:AlternateContent xmlns:mc="http://schemas.openxmlformats.org/markup-compatibility/2006">
+        <mc:Choice xmlns:a14="http://schemas.microsoft.com/office/drawing/2010/main" Requires="a14">
+          <p:sp>
+            <p:nvSpPr>
+              <p:cNvPr id="2" name="Title 1"/>
+              <p:cNvSpPr>
+                <a:spLocks noGrp="1"/>
+              </p:cNvSpPr>
+              <p:nvPr>
+                <p:ph type="title"/>
+              </p:nvPr>
+            </p:nvSpPr>
+            <p:spPr/>
+            <p:txBody>
+              <a:bodyPr/>
+              <a:lstStyle/>
+              <a:p>
+                <a:r>
+                  <a:rPr lang="en-US" dirty="0" smtClean="0"/>
+                  <a:t>Image Encoding (</a:t>
+                </a:r>
+                <a14:m>
+                  <m:oMath xmlns:m="http://schemas.openxmlformats.org/officeDocument/2006/math">
+                    <m:r>
+                      <a:rPr lang="en-US" b="0" i="1" smtClean="0">
+                        <a:latin typeface="Cambria Math"/>
+                      </a:rPr>
+                      <m:t>𝑥</m:t>
+                    </m:r>
+                  </m:oMath>
+                </a14:m>
+                <a:r>
+                  <a:rPr lang="en-US" dirty="0" smtClean="0"/>
+                  <a:t>)</a:t>
+                </a:r>
+                <a:endParaRPr lang="en-US" dirty="0"/>
+              </a:p>
+            </p:txBody>
+          </p:sp>
+        </mc:Choice>
+        <mc:Fallback>
+          <p:sp>
+            <p:nvSpPr>
+              <p:cNvPr id="2" name="Title 1"/>
+              <p:cNvSpPr>
+                <a:spLocks noGrp="1" noRot="1" noChangeAspect="1" noMove="1" noResize="1" noEditPoints="1" noAdjustHandles="1" noChangeArrowheads="1" noChangeShapeType="1" noTextEdit="1"/>
+              </p:cNvSpPr>
+              <p:nvPr>
+                <p:ph type="title"/>
+              </p:nvPr>
+            </p:nvSpPr>
+            <p:spPr>
+              <a:blipFill rotWithShape="1">
+                <a:blip r:embed="rId2"/>
+                <a:stretch>
+                  <a:fillRect b="-8511"/>
+                </a:stretch>
+              </a:blipFill>
+            </p:spPr>
+            <p:txBody>
+              <a:bodyPr/>
+              <a:lstStyle/>
+              <a:p>
+                <a:r>
+                  <a:rPr lang="en-US">
+                    <a:noFill/>
+                  </a:rPr>
+                  <a:t> </a:t>
+                </a:r>
+              </a:p>
+            </p:txBody>
+          </p:sp>
+        </mc:Fallback>
+      </mc:AlternateContent>
+      <mc:AlternateContent xmlns:mc="http://schemas.openxmlformats.org/markup-compatibility/2006">
+        <mc:Choice xmlns:a14="http://schemas.microsoft.com/office/drawing/2010/main" Requires="a14">
           <p:sp>
             <p:nvSpPr>
               <p:cNvPr id="3" name="Content Placeholder 2"/>
@@ -11101,15 +11319,20 @@
               </a:p>
               <a:p>
                 <a:r>
+                  <a:rPr lang="en-US" dirty="0" err="1" smtClean="0"/>
+                  <a:t>ObjectBank</a:t>
+                </a:r>
+                <a:r>
                   <a:rPr lang="en-US" dirty="0" smtClean="0"/>
-                  <a:t>Classifier outputs: </a:t>
+                  <a:t> detector outputs: </a:t>
                 </a:r>
+                <a:endParaRPr lang="en-US" dirty="0" smtClean="0"/>
               </a:p>
               <a:p>
                 <a:pPr lvl="1"/>
                 <a:r>
                   <a:rPr lang="en-US" dirty="0" smtClean="0"/>
-                  <a:t>24-element vector giving an estimate of </a:t>
+                  <a:t>177-element vector giving an estimate of </a:t>
                 </a:r>
                 <a14:m>
                   <m:oMath xmlns:m="http://schemas.openxmlformats.org/officeDocument/2006/math">
@@ -11119,33 +11342,64 @@
                       </a:rPr>
                       <m:t>𝑃</m:t>
                     </m:r>
-                    <m:d>
-                      <m:dPr>
-                        <m:ctrlPr>
-                          <a:rPr lang="en-US" b="0" i="1" smtClean="0">
-                            <a:latin typeface="Cambria Math"/>
-                          </a:rPr>
-                        </m:ctrlPr>
-                      </m:dPr>
-                      <m:e>
-                        <m:r>
-                          <a:rPr lang="en-US" b="0" i="1" smtClean="0">
-                            <a:latin typeface="Cambria Math"/>
-                          </a:rPr>
-                          <m:t>ℓ</m:t>
-                        </m:r>
-                      </m:e>
-                      <m:e>
-                        <m:r>
-                          <a:rPr lang="en-US" b="0" i="1" smtClean="0">
-                            <a:latin typeface="Cambria Math"/>
-                          </a:rPr>
-                          <m:t>𝐼</m:t>
-                        </m:r>
-                      </m:e>
-                    </m:d>
+                    <m:r>
+                      <a:rPr lang="en-US" b="0" i="1" smtClean="0">
+                        <a:latin typeface="Cambria Math"/>
+                      </a:rPr>
+                      <m:t>(</m:t>
+                    </m:r>
+                    <m:r>
+                      <a:rPr lang="en-US" b="0" i="1" smtClean="0">
+                        <a:latin typeface="Cambria Math"/>
+                      </a:rPr>
+                      <m:t>𝑦</m:t>
+                    </m:r>
+                    <m:r>
+                      <a:rPr lang="en-US" b="0" i="1" smtClean="0">
+                        <a:latin typeface="Cambria Math"/>
+                      </a:rPr>
+                      <m:t>|</m:t>
+                    </m:r>
+                    <m:r>
+                      <a:rPr lang="en-US" b="0" i="1" smtClean="0">
+                        <a:latin typeface="Cambria Math"/>
+                      </a:rPr>
+                      <m:t>𝐼</m:t>
+                    </m:r>
+                    <m:r>
+                      <a:rPr lang="en-US" b="0" i="1" smtClean="0">
+                        <a:latin typeface="Cambria Math"/>
+                      </a:rPr>
+                      <m:t>)</m:t>
+                    </m:r>
                   </m:oMath>
                 </a14:m>
+                <a:r>
+                  <a:rPr lang="en-US" dirty="0" smtClean="0"/>
+                  <a:t> for each of 177 specific object types from Object Bank (</a:t>
+                </a:r>
+                <a:r>
+                  <a:rPr lang="en-US" u="sng" dirty="0" smtClean="0">
+                    <a:hlinkClick r:id="rId3"/>
+                  </a:rPr>
+                  <a:t>http</a:t>
+                </a:r>
+                <a:r>
+                  <a:rPr lang="en-US" u="sng" dirty="0">
+                    <a:hlinkClick r:id="rId3"/>
+                  </a:rPr>
+                  <a:t>://</a:t>
+                </a:r>
+                <a:r>
+                  <a:rPr lang="en-US" u="sng" dirty="0" smtClean="0">
+                    <a:hlinkClick r:id="rId3"/>
+                  </a:rPr>
+                  <a:t>vision.stanford.edu/projects/objectbank/objectlist.txt</a:t>
+                </a:r>
+                <a:r>
+                  <a:rPr lang="en-US" dirty="0" smtClean="0"/>
+                  <a:t>)</a:t>
+                </a:r>
                 <a:endParaRPr lang="en-US" dirty="0" smtClean="0"/>
               </a:p>
               <a:p>
@@ -11155,7 +11409,7 @@
             </p:txBody>
           </p:sp>
         </mc:Choice>
-        <mc:Fallback xmlns="">
+        <mc:Fallback>
           <p:sp>
             <p:nvSpPr>
               <p:cNvPr id="3" name="Content Placeholder 2"/>
@@ -11168,9 +11422,9 @@
             </p:nvSpPr>
             <p:spPr>
               <a:blipFill rotWithShape="1">
-                <a:blip r:embed="rId2"/>
+                <a:blip r:embed="rId4"/>
                 <a:stretch>
-                  <a:fillRect l="-1630" t="-1482"/>
+                  <a:fillRect l="-1630" t="-1482" r="-74" b="-1348"/>
                 </a:stretch>
               </a:blipFill>
             </p:spPr>
@@ -11282,7 +11536,11 @@
           <a:p>
             <a:r>
               <a:rPr lang="en-US" dirty="0" smtClean="0"/>
-              <a:t>Baseline Model: </a:t>
+              <a:t>Probabilistic Model</a:t>
+            </a:r>
+            <a:r>
+              <a:rPr lang="en-US" dirty="0" smtClean="0"/>
+              <a:t>: </a:t>
             </a:r>
             <a:br>
               <a:rPr lang="en-US" dirty="0" smtClean="0"/>

</xml_diff>

<commit_message>
Revised slide 14: data without EXIF goes to training
</commit_message>
<xml_diff>
--- a/problem_statement/Challenge Problem 6.pptx
+++ b/problem_statement/Challenge Problem 6.pptx
@@ -211,6 +211,7 @@
           <a:p>
             <a:fld id="{9E6BD383-960F-4311-92C8-B2CD992ECA1E}" type="datetimeFigureOut">
               <a:rPr lang="en-US" smtClean="0"/>
+              <a:pPr/>
               <a:t>7/14/2015</a:t>
             </a:fld>
             <a:endParaRPr lang="en-US"/>
@@ -370,6 +371,7 @@
           <a:p>
             <a:fld id="{832CC242-A0D7-4B80-A96C-75E8B1ABCB20}" type="slidenum">
               <a:rPr lang="en-US" smtClean="0"/>
+              <a:pPr/>
               <a:t>‹#›</a:t>
             </a:fld>
             <a:endParaRPr lang="en-US"/>
@@ -379,7 +381,7 @@
     </p:spTree>
     <p:extLst>
       <p:ext uri="{BB962C8B-B14F-4D97-AF65-F5344CB8AC3E}">
-        <p14:creationId xmlns:p14="http://schemas.microsoft.com/office/powerpoint/2010/main" val="590526506"/>
+        <p14:creationId xmlns:p14="http://schemas.microsoft.com/office/powerpoint/2010/main" xmlns="" val="590526506"/>
       </p:ext>
     </p:extLst>
   </p:cSld>
@@ -674,6 +676,7 @@
           <a:p>
             <a:fld id="{F3B64B42-97C5-4E7F-A046-9ABFB24F4647}" type="datetime1">
               <a:rPr lang="en-US" smtClean="0"/>
+              <a:pPr/>
               <a:t>7/14/2015</a:t>
             </a:fld>
             <a:endParaRPr lang="en-US"/>
@@ -736,6 +739,7 @@
           <a:p>
             <a:fld id="{B7AE4108-064F-4050-AAE5-C40EA46DD43F}" type="slidenum">
               <a:rPr lang="en-US" smtClean="0"/>
+              <a:pPr/>
               <a:t>‹#›</a:t>
             </a:fld>
             <a:endParaRPr lang="en-US"/>
@@ -745,7 +749,7 @@
     </p:spTree>
     <p:extLst>
       <p:ext uri="{BB962C8B-B14F-4D97-AF65-F5344CB8AC3E}">
-        <p14:creationId xmlns:p14="http://schemas.microsoft.com/office/powerpoint/2010/main" val="4064491439"/>
+        <p14:creationId xmlns:p14="http://schemas.microsoft.com/office/powerpoint/2010/main" xmlns="" val="4064491439"/>
       </p:ext>
     </p:extLst>
   </p:cSld>
@@ -888,6 +892,7 @@
           <a:p>
             <a:fld id="{8FA0EC12-4566-4CE0-B247-A2A993FCE100}" type="datetime1">
               <a:rPr lang="en-US" smtClean="0"/>
+              <a:pPr/>
               <a:t>7/14/2015</a:t>
             </a:fld>
             <a:endParaRPr lang="en-US"/>
@@ -950,6 +955,7 @@
           <a:p>
             <a:fld id="{B7AE4108-064F-4050-AAE5-C40EA46DD43F}" type="slidenum">
               <a:rPr lang="en-US" smtClean="0"/>
+              <a:pPr/>
               <a:t>‹#›</a:t>
             </a:fld>
             <a:endParaRPr lang="en-US"/>
@@ -959,7 +965,7 @@
     </p:spTree>
     <p:extLst>
       <p:ext uri="{BB962C8B-B14F-4D97-AF65-F5344CB8AC3E}">
-        <p14:creationId xmlns:p14="http://schemas.microsoft.com/office/powerpoint/2010/main" val="2571977057"/>
+        <p14:creationId xmlns:p14="http://schemas.microsoft.com/office/powerpoint/2010/main" xmlns="" val="2571977057"/>
       </p:ext>
     </p:extLst>
   </p:cSld>
@@ -1102,6 +1108,7 @@
           <a:p>
             <a:fld id="{788685CE-C5FB-40C9-BA61-348FC7272552}" type="datetime1">
               <a:rPr lang="en-US" smtClean="0"/>
+              <a:pPr/>
               <a:t>7/14/2015</a:t>
             </a:fld>
             <a:endParaRPr lang="en-US"/>
@@ -1164,6 +1171,7 @@
           <a:p>
             <a:fld id="{B7AE4108-064F-4050-AAE5-C40EA46DD43F}" type="slidenum">
               <a:rPr lang="en-US" smtClean="0"/>
+              <a:pPr/>
               <a:t>‹#›</a:t>
             </a:fld>
             <a:endParaRPr lang="en-US"/>
@@ -1173,7 +1181,7 @@
     </p:spTree>
     <p:extLst>
       <p:ext uri="{BB962C8B-B14F-4D97-AF65-F5344CB8AC3E}">
-        <p14:creationId xmlns:p14="http://schemas.microsoft.com/office/powerpoint/2010/main" val="617593224"/>
+        <p14:creationId xmlns:p14="http://schemas.microsoft.com/office/powerpoint/2010/main" xmlns="" val="617593224"/>
       </p:ext>
     </p:extLst>
   </p:cSld>
@@ -1407,7 +1415,7 @@
           </a:ln>
           <a:extLst>
             <a:ext uri="{909E8E84-426E-40DD-AFC4-6F175D3DCCD1}">
-              <a14:hiddenFill xmlns:a14="http://schemas.microsoft.com/office/drawing/2010/main">
+              <a14:hiddenFill xmlns:a14="http://schemas.microsoft.com/office/drawing/2010/main" xmlns="">
                 <a:noFill/>
               </a14:hiddenFill>
             </a:ext>
@@ -1426,7 +1434,7 @@
           <a:blip r:embed="rId2" cstate="print">
             <a:extLst>
               <a:ext uri="{28A0092B-C50C-407E-A947-70E740481C1C}">
-                <a14:useLocalDpi xmlns:a14="http://schemas.microsoft.com/office/drawing/2010/main" val="0"/>
+                <a14:useLocalDpi xmlns:a14="http://schemas.microsoft.com/office/drawing/2010/main" xmlns="" val="0"/>
               </a:ext>
             </a:extLst>
           </a:blip>
@@ -1447,7 +1455,7 @@
     </p:spTree>
     <p:extLst>
       <p:ext uri="{BB962C8B-B14F-4D97-AF65-F5344CB8AC3E}">
-        <p14:creationId xmlns:p14="http://schemas.microsoft.com/office/powerpoint/2010/main" val="3700226468"/>
+        <p14:creationId xmlns:p14="http://schemas.microsoft.com/office/powerpoint/2010/main" xmlns="" val="3700226468"/>
       </p:ext>
     </p:extLst>
   </p:cSld>
@@ -1590,6 +1598,7 @@
           <a:p>
             <a:fld id="{79144205-5CF7-4997-A8A7-73185C3E51BD}" type="datetime1">
               <a:rPr lang="en-US" smtClean="0"/>
+              <a:pPr/>
               <a:t>7/14/2015</a:t>
             </a:fld>
             <a:endParaRPr lang="en-US"/>
@@ -1652,6 +1661,7 @@
           <a:p>
             <a:fld id="{B7AE4108-064F-4050-AAE5-C40EA46DD43F}" type="slidenum">
               <a:rPr lang="en-US" smtClean="0"/>
+              <a:pPr/>
               <a:t>‹#›</a:t>
             </a:fld>
             <a:endParaRPr lang="en-US"/>
@@ -1661,7 +1671,7 @@
     </p:spTree>
     <p:extLst>
       <p:ext uri="{BB962C8B-B14F-4D97-AF65-F5344CB8AC3E}">
-        <p14:creationId xmlns:p14="http://schemas.microsoft.com/office/powerpoint/2010/main" val="299337258"/>
+        <p14:creationId xmlns:p14="http://schemas.microsoft.com/office/powerpoint/2010/main" xmlns="" val="299337258"/>
       </p:ext>
     </p:extLst>
   </p:cSld>
@@ -1870,6 +1880,7 @@
           <a:p>
             <a:fld id="{62118C28-9CF9-4F09-994F-3AF8E3C8B50E}" type="datetime1">
               <a:rPr lang="en-US" smtClean="0"/>
+              <a:pPr/>
               <a:t>7/14/2015</a:t>
             </a:fld>
             <a:endParaRPr lang="en-US"/>
@@ -1932,6 +1943,7 @@
           <a:p>
             <a:fld id="{B7AE4108-064F-4050-AAE5-C40EA46DD43F}" type="slidenum">
               <a:rPr lang="en-US" smtClean="0"/>
+              <a:pPr/>
               <a:t>‹#›</a:t>
             </a:fld>
             <a:endParaRPr lang="en-US"/>
@@ -1941,7 +1953,7 @@
     </p:spTree>
     <p:extLst>
       <p:ext uri="{BB962C8B-B14F-4D97-AF65-F5344CB8AC3E}">
-        <p14:creationId xmlns:p14="http://schemas.microsoft.com/office/powerpoint/2010/main" val="2257051515"/>
+        <p14:creationId xmlns:p14="http://schemas.microsoft.com/office/powerpoint/2010/main" xmlns="" val="2257051515"/>
       </p:ext>
     </p:extLst>
   </p:cSld>
@@ -2200,6 +2212,7 @@
           <a:p>
             <a:fld id="{7B91938F-9454-4F6C-ACB2-DD81AA9A83F6}" type="datetime1">
               <a:rPr lang="en-US" smtClean="0"/>
+              <a:pPr/>
               <a:t>7/14/2015</a:t>
             </a:fld>
             <a:endParaRPr lang="en-US"/>
@@ -2262,6 +2275,7 @@
           <a:p>
             <a:fld id="{B7AE4108-064F-4050-AAE5-C40EA46DD43F}" type="slidenum">
               <a:rPr lang="en-US" smtClean="0"/>
+              <a:pPr/>
               <a:t>‹#›</a:t>
             </a:fld>
             <a:endParaRPr lang="en-US"/>
@@ -2271,7 +2285,7 @@
     </p:spTree>
     <p:extLst>
       <p:ext uri="{BB962C8B-B14F-4D97-AF65-F5344CB8AC3E}">
-        <p14:creationId xmlns:p14="http://schemas.microsoft.com/office/powerpoint/2010/main" val="2879366825"/>
+        <p14:creationId xmlns:p14="http://schemas.microsoft.com/office/powerpoint/2010/main" xmlns="" val="2879366825"/>
       </p:ext>
     </p:extLst>
   </p:cSld>
@@ -2670,6 +2684,7 @@
           <a:p>
             <a:fld id="{B789D24A-2359-461F-AF40-1ADDF63DBEFE}" type="datetime1">
               <a:rPr lang="en-US" smtClean="0"/>
+              <a:pPr/>
               <a:t>7/14/2015</a:t>
             </a:fld>
             <a:endParaRPr lang="en-US"/>
@@ -2732,6 +2747,7 @@
           <a:p>
             <a:fld id="{B7AE4108-064F-4050-AAE5-C40EA46DD43F}" type="slidenum">
               <a:rPr lang="en-US" smtClean="0"/>
+              <a:pPr/>
               <a:t>‹#›</a:t>
             </a:fld>
             <a:endParaRPr lang="en-US"/>
@@ -2741,7 +2757,7 @@
     </p:spTree>
     <p:extLst>
       <p:ext uri="{BB962C8B-B14F-4D97-AF65-F5344CB8AC3E}">
-        <p14:creationId xmlns:p14="http://schemas.microsoft.com/office/powerpoint/2010/main" val="691355404"/>
+        <p14:creationId xmlns:p14="http://schemas.microsoft.com/office/powerpoint/2010/main" xmlns="" val="691355404"/>
       </p:ext>
     </p:extLst>
   </p:cSld>
@@ -2824,6 +2840,7 @@
           <a:p>
             <a:fld id="{12811A03-8C0D-446E-B071-DE28A83022E6}" type="datetime1">
               <a:rPr lang="en-US" smtClean="0"/>
+              <a:pPr/>
               <a:t>7/14/2015</a:t>
             </a:fld>
             <a:endParaRPr lang="en-US"/>
@@ -2886,6 +2903,7 @@
           <a:p>
             <a:fld id="{B7AE4108-064F-4050-AAE5-C40EA46DD43F}" type="slidenum">
               <a:rPr lang="en-US" smtClean="0"/>
+              <a:pPr/>
               <a:t>‹#›</a:t>
             </a:fld>
             <a:endParaRPr lang="en-US"/>
@@ -2895,7 +2913,7 @@
     </p:spTree>
     <p:extLst>
       <p:ext uri="{BB962C8B-B14F-4D97-AF65-F5344CB8AC3E}">
-        <p14:creationId xmlns:p14="http://schemas.microsoft.com/office/powerpoint/2010/main" val="2940481724"/>
+        <p14:creationId xmlns:p14="http://schemas.microsoft.com/office/powerpoint/2010/main" xmlns="" val="2940481724"/>
       </p:ext>
     </p:extLst>
   </p:cSld>
@@ -2947,6 +2965,7 @@
           <a:p>
             <a:fld id="{04FCF0CD-5D8E-4B83-9302-B220564DA9C3}" type="datetime1">
               <a:rPr lang="en-US" smtClean="0"/>
+              <a:pPr/>
               <a:t>7/14/2015</a:t>
             </a:fld>
             <a:endParaRPr lang="en-US"/>
@@ -3009,6 +3028,7 @@
           <a:p>
             <a:fld id="{B7AE4108-064F-4050-AAE5-C40EA46DD43F}" type="slidenum">
               <a:rPr lang="en-US" smtClean="0"/>
+              <a:pPr/>
               <a:t>‹#›</a:t>
             </a:fld>
             <a:endParaRPr lang="en-US"/>
@@ -3018,7 +3038,7 @@
     </p:spTree>
     <p:extLst>
       <p:ext uri="{BB962C8B-B14F-4D97-AF65-F5344CB8AC3E}">
-        <p14:creationId xmlns:p14="http://schemas.microsoft.com/office/powerpoint/2010/main" val="4228753239"/>
+        <p14:creationId xmlns:p14="http://schemas.microsoft.com/office/powerpoint/2010/main" xmlns="" val="4228753239"/>
       </p:ext>
     </p:extLst>
   </p:cSld>
@@ -3261,6 +3281,7 @@
           <a:p>
             <a:fld id="{2C763469-E329-44C8-A8C3-F8F5F3287007}" type="datetime1">
               <a:rPr lang="en-US" smtClean="0"/>
+              <a:pPr/>
               <a:t>7/14/2015</a:t>
             </a:fld>
             <a:endParaRPr lang="en-US"/>
@@ -3323,6 +3344,7 @@
           <a:p>
             <a:fld id="{B7AE4108-064F-4050-AAE5-C40EA46DD43F}" type="slidenum">
               <a:rPr lang="en-US" smtClean="0"/>
+              <a:pPr/>
               <a:t>‹#›</a:t>
             </a:fld>
             <a:endParaRPr lang="en-US"/>
@@ -3332,7 +3354,7 @@
     </p:spTree>
     <p:extLst>
       <p:ext uri="{BB962C8B-B14F-4D97-AF65-F5344CB8AC3E}">
-        <p14:creationId xmlns:p14="http://schemas.microsoft.com/office/powerpoint/2010/main" val="593450304"/>
+        <p14:creationId xmlns:p14="http://schemas.microsoft.com/office/powerpoint/2010/main" xmlns="" val="593450304"/>
       </p:ext>
     </p:extLst>
   </p:cSld>
@@ -3551,6 +3573,7 @@
           <a:p>
             <a:fld id="{44B2C831-ADF7-4486-8C19-48EB1D12687C}" type="datetime1">
               <a:rPr lang="en-US" smtClean="0"/>
+              <a:pPr/>
               <a:t>7/14/2015</a:t>
             </a:fld>
             <a:endParaRPr lang="en-US"/>
@@ -3613,6 +3636,7 @@
           <a:p>
             <a:fld id="{B7AE4108-064F-4050-AAE5-C40EA46DD43F}" type="slidenum">
               <a:rPr lang="en-US" smtClean="0"/>
+              <a:pPr/>
               <a:t>‹#›</a:t>
             </a:fld>
             <a:endParaRPr lang="en-US"/>
@@ -3622,7 +3646,7 @@
     </p:spTree>
     <p:extLst>
       <p:ext uri="{BB962C8B-B14F-4D97-AF65-F5344CB8AC3E}">
-        <p14:creationId xmlns:p14="http://schemas.microsoft.com/office/powerpoint/2010/main" val="3735717587"/>
+        <p14:creationId xmlns:p14="http://schemas.microsoft.com/office/powerpoint/2010/main" xmlns="" val="3735717587"/>
       </p:ext>
     </p:extLst>
   </p:cSld>
@@ -3678,14 +3702,14 @@
           </a:ln>
           <a:extLst>
             <a:ext uri="{909E8E84-426E-40DD-AFC4-6F175D3DCCD1}">
-              <a14:hiddenFill xmlns:a14="http://schemas.microsoft.com/office/drawing/2010/main">
+              <a14:hiddenFill xmlns:a14="http://schemas.microsoft.com/office/drawing/2010/main" xmlns="">
                 <a:solidFill>
                   <a:srgbClr val="FFFFFF"/>
                 </a:solidFill>
               </a14:hiddenFill>
             </a:ext>
             <a:ext uri="{91240B29-F687-4F45-9708-019B960494DF}">
-              <a14:hiddenLine xmlns:a14="http://schemas.microsoft.com/office/drawing/2010/main" w="9525">
+              <a14:hiddenLine xmlns:a14="http://schemas.microsoft.com/office/drawing/2010/main" xmlns="" w="9525">
                 <a:solidFill>
                   <a:srgbClr val="000000"/>
                 </a:solidFill>
@@ -3861,14 +3885,14 @@
           </a:ln>
           <a:extLst>
             <a:ext uri="{909E8E84-426E-40DD-AFC4-6F175D3DCCD1}">
-              <a14:hiddenFill xmlns:a14="http://schemas.microsoft.com/office/drawing/2010/main">
+              <a14:hiddenFill xmlns:a14="http://schemas.microsoft.com/office/drawing/2010/main" xmlns="">
                 <a:solidFill>
                   <a:srgbClr val="FFFFFF"/>
                 </a:solidFill>
               </a14:hiddenFill>
             </a:ext>
             <a:ext uri="{91240B29-F687-4F45-9708-019B960494DF}">
-              <a14:hiddenLine xmlns:a14="http://schemas.microsoft.com/office/drawing/2010/main" w="9525">
+              <a14:hiddenLine xmlns:a14="http://schemas.microsoft.com/office/drawing/2010/main" xmlns="" w="9525">
                 <a:solidFill>
                   <a:srgbClr val="000000"/>
                 </a:solidFill>
@@ -3904,7 +3928,7 @@
           <p:nvPr/>
         </p:nvPicPr>
         <p:blipFill>
-          <a:blip r:embed="rId14"/>
+          <a:blip r:embed="rId14" cstate="print"/>
           <a:stretch>
             <a:fillRect/>
           </a:stretch>
@@ -3931,7 +3955,7 @@
           <a:blip r:embed="rId15" cstate="print">
             <a:extLst>
               <a:ext uri="{28A0092B-C50C-407E-A947-70E740481C1C}">
-                <a14:useLocalDpi xmlns:a14="http://schemas.microsoft.com/office/drawing/2010/main" val="0"/>
+                <a14:useLocalDpi xmlns:a14="http://schemas.microsoft.com/office/drawing/2010/main" xmlns="" val="0"/>
               </a:ext>
             </a:extLst>
           </a:blip>
@@ -3958,10 +3982,10 @@
           <p:nvPr userDrawn="1"/>
         </p:nvPicPr>
         <p:blipFill rotWithShape="1">
-          <a:blip r:embed="rId16">
+          <a:blip r:embed="rId16" cstate="print">
             <a:extLst>
               <a:ext uri="{28A0092B-C50C-407E-A947-70E740481C1C}">
-                <a14:useLocalDpi xmlns:a14="http://schemas.microsoft.com/office/drawing/2010/main" val="0"/>
+                <a14:useLocalDpi xmlns:a14="http://schemas.microsoft.com/office/drawing/2010/main" xmlns="" val="0"/>
               </a:ext>
             </a:extLst>
           </a:blip>
@@ -3979,7 +4003,7 @@
           <a:noFill/>
           <a:extLst>
             <a:ext uri="{909E8E84-426E-40DD-AFC4-6F175D3DCCD1}">
-              <a14:hiddenFill xmlns:a14="http://schemas.microsoft.com/office/drawing/2010/main">
+              <a14:hiddenFill xmlns:a14="http://schemas.microsoft.com/office/drawing/2010/main" xmlns="">
                 <a:solidFill>
                   <a:srgbClr val="FFFFFF"/>
                 </a:solidFill>
@@ -4000,7 +4024,7 @@
           <a:blip r:embed="rId17" cstate="print">
             <a:extLst>
               <a:ext uri="{28A0092B-C50C-407E-A947-70E740481C1C}">
-                <a14:useLocalDpi xmlns:a14="http://schemas.microsoft.com/office/drawing/2010/main" val="0"/>
+                <a14:useLocalDpi xmlns:a14="http://schemas.microsoft.com/office/drawing/2010/main" xmlns="" val="0"/>
               </a:ext>
             </a:extLst>
           </a:blip>
@@ -4021,7 +4045,7 @@
     </p:spTree>
     <p:extLst>
       <p:ext uri="{BB962C8B-B14F-4D97-AF65-F5344CB8AC3E}">
-        <p14:creationId xmlns:p14="http://schemas.microsoft.com/office/powerpoint/2010/main" val="1623290117"/>
+        <p14:creationId xmlns:p14="http://schemas.microsoft.com/office/powerpoint/2010/main" xmlns="" val="1623290117"/>
       </p:ext>
     </p:extLst>
   </p:cSld>
@@ -4407,6 +4431,7 @@
           <a:p>
             <a:fld id="{B7AE4108-064F-4050-AAE5-C40EA46DD43F}" type="slidenum">
               <a:rPr lang="en-US" smtClean="0"/>
+              <a:pPr/>
               <a:t>1</a:t>
             </a:fld>
             <a:endParaRPr lang="en-US"/>
@@ -4439,7 +4464,7 @@
     </p:spTree>
     <p:extLst>
       <p:ext uri="{BB962C8B-B14F-4D97-AF65-F5344CB8AC3E}">
-        <p14:creationId xmlns:p14="http://schemas.microsoft.com/office/powerpoint/2010/main" val="3210904075"/>
+        <p14:creationId xmlns:p14="http://schemas.microsoft.com/office/powerpoint/2010/main" xmlns="" val="3210904075"/>
       </p:ext>
     </p:extLst>
   </p:cSld>
@@ -4515,16 +4540,11 @@
               <a:rPr lang="en-US" dirty="0" smtClean="0"/>
               <a:t>equivalent to MAP with zero-mean Gaussian prior on all parameters</a:t>
             </a:r>
-            <a:endParaRPr lang="en-US" dirty="0" smtClean="0"/>
           </a:p>
           <a:p>
             <a:r>
               <a:rPr lang="en-US" dirty="0" smtClean="0"/>
-              <a:t>Penalized maximum </a:t>
-            </a:r>
-            <a:r>
-              <a:rPr lang="en-US" dirty="0" smtClean="0"/>
-              <a:t>margin </a:t>
+              <a:t>Penalized maximum margin </a:t>
             </a:r>
           </a:p>
           <a:p>
@@ -4554,6 +4574,7 @@
           <a:p>
             <a:fld id="{B7AE4108-064F-4050-AAE5-C40EA46DD43F}" type="slidenum">
               <a:rPr lang="en-US" smtClean="0"/>
+              <a:pPr/>
               <a:t>10</a:t>
             </a:fld>
             <a:endParaRPr lang="en-US"/>
@@ -4586,7 +4607,7 @@
     </p:spTree>
     <p:extLst>
       <p:ext uri="{BB962C8B-B14F-4D97-AF65-F5344CB8AC3E}">
-        <p14:creationId xmlns:p14="http://schemas.microsoft.com/office/powerpoint/2010/main" val="334203569"/>
+        <p14:creationId xmlns:p14="http://schemas.microsoft.com/office/powerpoint/2010/main" xmlns="" val="334203569"/>
       </p:ext>
     </p:extLst>
   </p:cSld>
@@ -4689,11 +4710,7 @@
             </a:r>
             <a:r>
               <a:rPr lang="en-US" dirty="0" smtClean="0"/>
-              <a:t> </a:t>
-            </a:r>
-            <a:r>
-              <a:rPr lang="en-US" dirty="0" smtClean="0"/>
-              <a:t>images (due to licensing and logistical issues)</a:t>
+              <a:t> images (due to licensing and logistical issues)</a:t>
             </a:r>
           </a:p>
           <a:p>
@@ -4718,6 +4735,7 @@
           <a:p>
             <a:fld id="{B7AE4108-064F-4050-AAE5-C40EA46DD43F}" type="slidenum">
               <a:rPr lang="en-US" smtClean="0"/>
+              <a:pPr/>
               <a:t>11</a:t>
             </a:fld>
             <a:endParaRPr lang="en-US"/>
@@ -4750,7 +4768,7 @@
     </p:spTree>
     <p:extLst>
       <p:ext uri="{BB962C8B-B14F-4D97-AF65-F5344CB8AC3E}">
-        <p14:creationId xmlns:p14="http://schemas.microsoft.com/office/powerpoint/2010/main" val="955529486"/>
+        <p14:creationId xmlns:p14="http://schemas.microsoft.com/office/powerpoint/2010/main" xmlns="" val="955529486"/>
       </p:ext>
     </p:extLst>
   </p:cSld>
@@ -4817,6 +4835,7 @@
           <a:p>
             <a:fld id="{B7AE4108-064F-4050-AAE5-C40EA46DD43F}" type="slidenum">
               <a:rPr lang="en-US" smtClean="0"/>
+              <a:pPr/>
               <a:t>12</a:t>
             </a:fld>
             <a:endParaRPr lang="en-US"/>
@@ -4872,7 +4891,7 @@
     </p:spTree>
     <p:extLst>
       <p:ext uri="{BB962C8B-B14F-4D97-AF65-F5344CB8AC3E}">
-        <p14:creationId xmlns:p14="http://schemas.microsoft.com/office/powerpoint/2010/main" val="2297075656"/>
+        <p14:creationId xmlns:p14="http://schemas.microsoft.com/office/powerpoint/2010/main" xmlns="" val="2297075656"/>
       </p:ext>
     </p:extLst>
   </p:cSld>
@@ -4939,6 +4958,7 @@
           <a:p>
             <a:fld id="{B7AE4108-064F-4050-AAE5-C40EA46DD43F}" type="slidenum">
               <a:rPr lang="en-US" smtClean="0"/>
+              <a:pPr/>
               <a:t>13</a:t>
             </a:fld>
             <a:endParaRPr lang="en-US"/>
@@ -4994,7 +5014,7 @@
     </p:spTree>
     <p:extLst>
       <p:ext uri="{BB962C8B-B14F-4D97-AF65-F5344CB8AC3E}">
-        <p14:creationId xmlns:p14="http://schemas.microsoft.com/office/powerpoint/2010/main" val="840644089"/>
+        <p14:creationId xmlns:p14="http://schemas.microsoft.com/office/powerpoint/2010/main" xmlns="" val="840644089"/>
       </p:ext>
     </p:extLst>
   </p:cSld>
@@ -5075,8 +5095,17 @@
             <a:pPr lvl="1"/>
             <a:r>
               <a:rPr lang="en-US" dirty="0" smtClean="0"/>
-              <a:t>Images without date information will be randomly split</a:t>
-            </a:r>
+              <a:t>Images without date information will be </a:t>
+            </a:r>
+            <a:r>
+              <a:rPr lang="en-US" dirty="0" smtClean="0"/>
+              <a:t>used </a:t>
+            </a:r>
+            <a:r>
+              <a:rPr lang="en-US" smtClean="0"/>
+              <a:t>in training</a:t>
+            </a:r>
+            <a:endParaRPr lang="en-US" dirty="0" smtClean="0"/>
           </a:p>
           <a:p>
             <a:r>
@@ -5148,6 +5177,7 @@
           <a:p>
             <a:fld id="{B7AE4108-064F-4050-AAE5-C40EA46DD43F}" type="slidenum">
               <a:rPr lang="en-US" smtClean="0"/>
+              <a:pPr/>
               <a:t>14</a:t>
             </a:fld>
             <a:endParaRPr lang="en-US"/>
@@ -5202,7 +5232,7 @@
     </p:spTree>
     <p:extLst>
       <p:ext uri="{BB962C8B-B14F-4D97-AF65-F5344CB8AC3E}">
-        <p14:creationId xmlns:p14="http://schemas.microsoft.com/office/powerpoint/2010/main" val="1167457217"/>
+        <p14:creationId xmlns:p14="http://schemas.microsoft.com/office/powerpoint/2010/main" xmlns="" val="1167457217"/>
       </p:ext>
     </p:extLst>
   </p:cSld>
@@ -5252,8 +5282,8 @@
           </a:p>
         </p:txBody>
       </p:sp>
-      <mc:AlternateContent xmlns:mc="http://schemas.openxmlformats.org/markup-compatibility/2006" xmlns:a14="http://schemas.microsoft.com/office/drawing/2010/main">
-        <mc:Choice Requires="a14">
+      <mc:AlternateContent xmlns:mc="http://schemas.openxmlformats.org/markup-compatibility/2006">
+        <mc:Choice xmlns:a14="http://schemas.microsoft.com/office/drawing/2010/main" xmlns="" Requires="a14">
           <p:sp>
             <p:nvSpPr>
               <p:cNvPr id="3" name="Content Placeholder 2"/>
@@ -5469,7 +5499,7 @@
             </p:txBody>
           </p:sp>
         </mc:Choice>
-        <mc:Fallback xmlns="">
+        <mc:Fallback>
           <p:sp>
             <p:nvSpPr>
               <p:cNvPr id="3" name="Content Placeholder 2"/>
@@ -5482,7 +5512,7 @@
             </p:nvSpPr>
             <p:spPr>
               <a:blipFill rotWithShape="1">
-                <a:blip r:embed="rId2"/>
+                <a:blip r:embed="rId2" cstate="print"/>
                 <a:stretch>
                   <a:fillRect l="-1185" t="-2695"/>
                 </a:stretch>
@@ -5520,6 +5550,7 @@
           <a:p>
             <a:fld id="{B7AE4108-064F-4050-AAE5-C40EA46DD43F}" type="slidenum">
               <a:rPr lang="en-US" smtClean="0"/>
+              <a:pPr/>
               <a:t>15</a:t>
             </a:fld>
             <a:endParaRPr lang="en-US"/>
@@ -5552,7 +5583,7 @@
     </p:spTree>
     <p:extLst>
       <p:ext uri="{BB962C8B-B14F-4D97-AF65-F5344CB8AC3E}">
-        <p14:creationId xmlns:p14="http://schemas.microsoft.com/office/powerpoint/2010/main" val="277946741"/>
+        <p14:creationId xmlns:p14="http://schemas.microsoft.com/office/powerpoint/2010/main" xmlns="" val="277946741"/>
       </p:ext>
     </p:extLst>
   </p:cSld>
@@ -5654,6 +5685,7 @@
           <a:p>
             <a:fld id="{B7AE4108-064F-4050-AAE5-C40EA46DD43F}" type="slidenum">
               <a:rPr lang="en-US" smtClean="0"/>
+              <a:pPr/>
               <a:t>16</a:t>
             </a:fld>
             <a:endParaRPr lang="en-US"/>
@@ -5686,7 +5718,7 @@
     </p:spTree>
     <p:extLst>
       <p:ext uri="{BB962C8B-B14F-4D97-AF65-F5344CB8AC3E}">
-        <p14:creationId xmlns:p14="http://schemas.microsoft.com/office/powerpoint/2010/main" val="1473410503"/>
+        <p14:creationId xmlns:p14="http://schemas.microsoft.com/office/powerpoint/2010/main" xmlns="" val="1473410503"/>
       </p:ext>
     </p:extLst>
   </p:cSld>
@@ -6452,7 +6484,7 @@
           </a:ln>
           <a:extLst>
             <a:ext uri="{909E8E84-426E-40DD-AFC4-6F175D3DCCD1}">
-              <a14:hiddenFill xmlns:a14="http://schemas.microsoft.com/office/drawing/2010/main">
+              <a14:hiddenFill xmlns:a14="http://schemas.microsoft.com/office/drawing/2010/main" xmlns="">
                 <a:noFill/>
               </a14:hiddenFill>
             </a:ext>
@@ -6486,7 +6518,7 @@
           </a:ln>
           <a:extLst>
             <a:ext uri="{909E8E84-426E-40DD-AFC4-6F175D3DCCD1}">
-              <a14:hiddenFill xmlns:a14="http://schemas.microsoft.com/office/drawing/2010/main">
+              <a14:hiddenFill xmlns:a14="http://schemas.microsoft.com/office/drawing/2010/main" xmlns="">
                 <a:noFill/>
               </a14:hiddenFill>
             </a:ext>
@@ -6520,7 +6552,7 @@
           </a:ln>
           <a:extLst>
             <a:ext uri="{909E8E84-426E-40DD-AFC4-6F175D3DCCD1}">
-              <a14:hiddenFill xmlns:a14="http://schemas.microsoft.com/office/drawing/2010/main">
+              <a14:hiddenFill xmlns:a14="http://schemas.microsoft.com/office/drawing/2010/main" xmlns="">
                 <a:noFill/>
               </a14:hiddenFill>
             </a:ext>
@@ -6881,7 +6913,7 @@
             </a:ln>
             <a:extLst>
               <a:ext uri="{909E8E84-426E-40DD-AFC4-6F175D3DCCD1}">
-                <a14:hiddenFill xmlns:a14="http://schemas.microsoft.com/office/drawing/2010/main">
+                <a14:hiddenFill xmlns:a14="http://schemas.microsoft.com/office/drawing/2010/main" xmlns="">
                   <a:noFill/>
                 </a14:hiddenFill>
               </a:ext>
@@ -6915,7 +6947,7 @@
             </a:ln>
             <a:extLst>
               <a:ext uri="{909E8E84-426E-40DD-AFC4-6F175D3DCCD1}">
-                <a14:hiddenFill xmlns:a14="http://schemas.microsoft.com/office/drawing/2010/main">
+                <a14:hiddenFill xmlns:a14="http://schemas.microsoft.com/office/drawing/2010/main" xmlns="">
                   <a:noFill/>
                 </a14:hiddenFill>
               </a:ext>
@@ -6949,7 +6981,7 @@
             </a:ln>
             <a:extLst>
               <a:ext uri="{909E8E84-426E-40DD-AFC4-6F175D3DCCD1}">
-                <a14:hiddenFill xmlns:a14="http://schemas.microsoft.com/office/drawing/2010/main">
+                <a14:hiddenFill xmlns:a14="http://schemas.microsoft.com/office/drawing/2010/main" xmlns="">
                   <a:noFill/>
                 </a14:hiddenFill>
               </a:ext>
@@ -7246,7 +7278,7 @@
             </a:ln>
             <a:extLst>
               <a:ext uri="{909E8E84-426E-40DD-AFC4-6F175D3DCCD1}">
-                <a14:hiddenFill xmlns:a14="http://schemas.microsoft.com/office/drawing/2010/main">
+                <a14:hiddenFill xmlns:a14="http://schemas.microsoft.com/office/drawing/2010/main" xmlns="">
                   <a:noFill/>
                 </a14:hiddenFill>
               </a:ext>
@@ -7280,7 +7312,7 @@
             </a:ln>
             <a:extLst>
               <a:ext uri="{909E8E84-426E-40DD-AFC4-6F175D3DCCD1}">
-                <a14:hiddenFill xmlns:a14="http://schemas.microsoft.com/office/drawing/2010/main">
+                <a14:hiddenFill xmlns:a14="http://schemas.microsoft.com/office/drawing/2010/main" xmlns="">
                   <a:noFill/>
                 </a14:hiddenFill>
               </a:ext>
@@ -7314,7 +7346,7 @@
             </a:ln>
             <a:extLst>
               <a:ext uri="{909E8E84-426E-40DD-AFC4-6F175D3DCCD1}">
-                <a14:hiddenFill xmlns:a14="http://schemas.microsoft.com/office/drawing/2010/main">
+                <a14:hiddenFill xmlns:a14="http://schemas.microsoft.com/office/drawing/2010/main" xmlns="">
                   <a:noFill/>
                 </a14:hiddenFill>
               </a:ext>
@@ -7412,7 +7444,7 @@
             </a:ln>
             <a:extLst>
               <a:ext uri="{909E8E84-426E-40DD-AFC4-6F175D3DCCD1}">
-                <a14:hiddenFill xmlns:a14="http://schemas.microsoft.com/office/drawing/2010/main">
+                <a14:hiddenFill xmlns:a14="http://schemas.microsoft.com/office/drawing/2010/main" xmlns="">
                   <a:noFill/>
                 </a14:hiddenFill>
               </a:ext>
@@ -7447,7 +7479,7 @@
           </a:ln>
           <a:extLst>
             <a:ext uri="{909E8E84-426E-40DD-AFC4-6F175D3DCCD1}">
-              <a14:hiddenFill xmlns:a14="http://schemas.microsoft.com/office/drawing/2010/main">
+              <a14:hiddenFill xmlns:a14="http://schemas.microsoft.com/office/drawing/2010/main" xmlns="">
                 <a:noFill/>
               </a14:hiddenFill>
             </a:ext>
@@ -7481,7 +7513,7 @@
           </a:ln>
           <a:extLst>
             <a:ext uri="{909E8E84-426E-40DD-AFC4-6F175D3DCCD1}">
-              <a14:hiddenFill xmlns:a14="http://schemas.microsoft.com/office/drawing/2010/main">
+              <a14:hiddenFill xmlns:a14="http://schemas.microsoft.com/office/drawing/2010/main" xmlns="">
                 <a:noFill/>
               </a14:hiddenFill>
             </a:ext>
@@ -7515,7 +7547,7 @@
           </a:ln>
           <a:extLst>
             <a:ext uri="{909E8E84-426E-40DD-AFC4-6F175D3DCCD1}">
-              <a14:hiddenFill xmlns:a14="http://schemas.microsoft.com/office/drawing/2010/main">
+              <a14:hiddenFill xmlns:a14="http://schemas.microsoft.com/office/drawing/2010/main" xmlns="">
                 <a:noFill/>
               </a14:hiddenFill>
             </a:ext>
@@ -7549,7 +7581,7 @@
           </a:ln>
           <a:extLst>
             <a:ext uri="{909E8E84-426E-40DD-AFC4-6F175D3DCCD1}">
-              <a14:hiddenFill xmlns:a14="http://schemas.microsoft.com/office/drawing/2010/main">
+              <a14:hiddenFill xmlns:a14="http://schemas.microsoft.com/office/drawing/2010/main" xmlns="">
                 <a:noFill/>
               </a14:hiddenFill>
             </a:ext>
@@ -7559,18 +7591,18 @@
     </p:spTree>
     <p:extLst>
       <p:ext uri="{BB962C8B-B14F-4D97-AF65-F5344CB8AC3E}">
-        <p14:creationId xmlns:p14="http://schemas.microsoft.com/office/powerpoint/2010/main" val="2513915860"/>
+        <p14:creationId xmlns:p14="http://schemas.microsoft.com/office/powerpoint/2010/main" xmlns="" val="2513915860"/>
       </p:ext>
     </p:extLst>
   </p:cSld>
   <p:clrMapOvr>
     <a:masterClrMapping/>
   </p:clrMapOvr>
-  <mc:AlternateContent xmlns:mc="http://schemas.openxmlformats.org/markup-compatibility/2006" xmlns:p14="http://schemas.microsoft.com/office/powerpoint/2010/main">
-    <mc:Choice Requires="p14">
+  <mc:AlternateContent xmlns:mc="http://schemas.openxmlformats.org/markup-compatibility/2006">
+    <mc:Choice xmlns:p14="http://schemas.microsoft.com/office/powerpoint/2010/main" xmlns="" Requires="p14">
       <p:transition spd="slow" p14:dur="2000" advTm="12614"/>
     </mc:Choice>
-    <mc:Fallback xmlns="">
+    <mc:Fallback>
       <p:transition spd="slow" advTm="12614"/>
     </mc:Fallback>
   </mc:AlternateContent>
@@ -7734,7 +7766,7 @@
     </p:spTree>
     <p:extLst>
       <p:ext uri="{BB962C8B-B14F-4D97-AF65-F5344CB8AC3E}">
-        <p14:creationId xmlns:p14="http://schemas.microsoft.com/office/powerpoint/2010/main" val="1570379314"/>
+        <p14:creationId xmlns:p14="http://schemas.microsoft.com/office/powerpoint/2010/main" xmlns="" val="1570379314"/>
       </p:ext>
     </p:extLst>
   </p:cSld>
@@ -7932,7 +7964,7 @@
     </p:spTree>
     <p:extLst>
       <p:ext uri="{BB962C8B-B14F-4D97-AF65-F5344CB8AC3E}">
-        <p14:creationId xmlns:p14="http://schemas.microsoft.com/office/powerpoint/2010/main" val="1633301739"/>
+        <p14:creationId xmlns:p14="http://schemas.microsoft.com/office/powerpoint/2010/main" xmlns="" val="1633301739"/>
       </p:ext>
     </p:extLst>
   </p:cSld>
@@ -8110,6 +8142,7 @@
           <a:p>
             <a:fld id="{B7AE4108-064F-4050-AAE5-C40EA46DD43F}" type="slidenum">
               <a:rPr lang="en-US" smtClean="0"/>
+              <a:pPr/>
               <a:t>2</a:t>
             </a:fld>
             <a:endParaRPr lang="en-US"/>
@@ -8128,7 +8161,7 @@
           <a:blip r:embed="rId2" cstate="print">
             <a:extLst>
               <a:ext uri="{28A0092B-C50C-407E-A947-70E740481C1C}">
-                <a14:useLocalDpi xmlns:a14="http://schemas.microsoft.com/office/drawing/2010/main" val="0"/>
+                <a14:useLocalDpi xmlns:a14="http://schemas.microsoft.com/office/drawing/2010/main" xmlns="" val="0"/>
               </a:ext>
             </a:extLst>
           </a:blip>
@@ -8151,14 +8184,14 @@
           </a:ln>
           <a:extLst>
             <a:ext uri="{909E8E84-426E-40DD-AFC4-6F175D3DCCD1}">
-              <a14:hiddenFill xmlns:a14="http://schemas.microsoft.com/office/drawing/2010/main">
+              <a14:hiddenFill xmlns:a14="http://schemas.microsoft.com/office/drawing/2010/main" xmlns="">
                 <a:solidFill>
                   <a:schemeClr val="accent1"/>
                 </a:solidFill>
               </a14:hiddenFill>
             </a:ext>
             <a:ext uri="{91240B29-F687-4F45-9708-019B960494DF}">
-              <a14:hiddenLine xmlns:a14="http://schemas.microsoft.com/office/drawing/2010/main" w="9525">
+              <a14:hiddenLine xmlns:a14="http://schemas.microsoft.com/office/drawing/2010/main" xmlns="" w="9525">
                 <a:solidFill>
                   <a:schemeClr val="tx1"/>
                 </a:solidFill>
@@ -8196,7 +8229,7 @@
     </p:spTree>
     <p:extLst>
       <p:ext uri="{BB962C8B-B14F-4D97-AF65-F5344CB8AC3E}">
-        <p14:creationId xmlns:p14="http://schemas.microsoft.com/office/powerpoint/2010/main" val="3961894748"/>
+        <p14:creationId xmlns:p14="http://schemas.microsoft.com/office/powerpoint/2010/main" xmlns="" val="3961894748"/>
       </p:ext>
     </p:extLst>
   </p:cSld>
@@ -8323,6 +8356,7 @@
           <a:p>
             <a:fld id="{B7AE4108-064F-4050-AAE5-C40EA46DD43F}" type="slidenum">
               <a:rPr lang="en-US" smtClean="0"/>
+              <a:pPr/>
               <a:t>20</a:t>
             </a:fld>
             <a:endParaRPr lang="en-US"/>
@@ -8332,7 +8366,7 @@
     </p:spTree>
     <p:extLst>
       <p:ext uri="{BB962C8B-B14F-4D97-AF65-F5344CB8AC3E}">
-        <p14:creationId xmlns:p14="http://schemas.microsoft.com/office/powerpoint/2010/main" val="668578897"/>
+        <p14:creationId xmlns:p14="http://schemas.microsoft.com/office/powerpoint/2010/main" xmlns="" val="668578897"/>
       </p:ext>
     </p:extLst>
   </p:cSld>
@@ -8399,14 +8433,15 @@
           <a:p>
             <a:fld id="{B7AE4108-064F-4050-AAE5-C40EA46DD43F}" type="slidenum">
               <a:rPr lang="en-US" smtClean="0"/>
+              <a:pPr/>
               <a:t>3</a:t>
             </a:fld>
             <a:endParaRPr lang="en-US"/>
           </a:p>
         </p:txBody>
       </p:sp>
-      <mc:AlternateContent xmlns:mc="http://schemas.openxmlformats.org/markup-compatibility/2006" xmlns:a14="http://schemas.microsoft.com/office/drawing/2010/main">
-        <mc:Choice Requires="a14">
+      <mc:AlternateContent xmlns:mc="http://schemas.openxmlformats.org/markup-compatibility/2006">
+        <mc:Choice xmlns:a14="http://schemas.microsoft.com/office/drawing/2010/main" xmlns="" Requires="a14">
           <p:sp>
             <p:nvSpPr>
               <p:cNvPr id="5" name="Rectangle 4"/>
@@ -8482,7 +8517,7 @@
             </p:txBody>
           </p:sp>
         </mc:Choice>
-        <mc:Fallback xmlns="">
+        <mc:Fallback>
           <p:sp>
             <p:nvSpPr>
               <p:cNvPr id="5" name="Rectangle 4"/>
@@ -8500,7 +8535,7 @@
                 <a:avLst/>
               </a:prstGeom>
               <a:blipFill rotWithShape="1">
-                <a:blip r:embed="rId2"/>
+                <a:blip r:embed="rId2" cstate="print"/>
                 <a:stretch>
                   <a:fillRect/>
                 </a:stretch>
@@ -8521,8 +8556,8 @@
           </p:sp>
         </mc:Fallback>
       </mc:AlternateContent>
-      <mc:AlternateContent xmlns:mc="http://schemas.openxmlformats.org/markup-compatibility/2006" xmlns:a14="http://schemas.microsoft.com/office/drawing/2010/main">
-        <mc:Choice Requires="a14">
+      <mc:AlternateContent xmlns:mc="http://schemas.openxmlformats.org/markup-compatibility/2006">
+        <mc:Choice xmlns:a14="http://schemas.microsoft.com/office/drawing/2010/main" xmlns="" Requires="a14">
           <p:sp>
             <p:nvSpPr>
               <p:cNvPr id="6" name="Rectangle 5"/>
@@ -8598,7 +8633,7 @@
             </p:txBody>
           </p:sp>
         </mc:Choice>
-        <mc:Fallback xmlns="">
+        <mc:Fallback>
           <p:sp>
             <p:nvSpPr>
               <p:cNvPr id="6" name="Rectangle 5"/>
@@ -8616,7 +8651,7 @@
                 <a:avLst/>
               </a:prstGeom>
               <a:blipFill rotWithShape="1">
-                <a:blip r:embed="rId3"/>
+                <a:blip r:embed="rId3" cstate="print"/>
                 <a:stretch>
                   <a:fillRect/>
                 </a:stretch>
@@ -8637,8 +8672,8 @@
           </p:sp>
         </mc:Fallback>
       </mc:AlternateContent>
-      <mc:AlternateContent xmlns:mc="http://schemas.openxmlformats.org/markup-compatibility/2006" xmlns:a14="http://schemas.microsoft.com/office/drawing/2010/main">
-        <mc:Choice Requires="a14">
+      <mc:AlternateContent xmlns:mc="http://schemas.openxmlformats.org/markup-compatibility/2006">
+        <mc:Choice xmlns:a14="http://schemas.microsoft.com/office/drawing/2010/main" xmlns="" Requires="a14">
           <p:sp>
             <p:nvSpPr>
               <p:cNvPr id="7" name="Rectangle 6"/>
@@ -8714,7 +8749,7 @@
             </p:txBody>
           </p:sp>
         </mc:Choice>
-        <mc:Fallback xmlns="">
+        <mc:Fallback>
           <p:sp>
             <p:nvSpPr>
               <p:cNvPr id="7" name="Rectangle 6"/>
@@ -8732,7 +8767,7 @@
                 <a:avLst/>
               </a:prstGeom>
               <a:blipFill rotWithShape="1">
-                <a:blip r:embed="rId4"/>
+                <a:blip r:embed="rId4" cstate="print"/>
                 <a:stretch>
                   <a:fillRect/>
                 </a:stretch>
@@ -8753,8 +8788,8 @@
           </p:sp>
         </mc:Fallback>
       </mc:AlternateContent>
-      <mc:AlternateContent xmlns:mc="http://schemas.openxmlformats.org/markup-compatibility/2006" xmlns:a14="http://schemas.microsoft.com/office/drawing/2010/main">
-        <mc:Choice Requires="a14">
+      <mc:AlternateContent xmlns:mc="http://schemas.openxmlformats.org/markup-compatibility/2006">
+        <mc:Choice xmlns:a14="http://schemas.microsoft.com/office/drawing/2010/main" xmlns="" Requires="a14">
           <p:sp>
             <p:nvSpPr>
               <p:cNvPr id="8" name="Rectangle 7"/>
@@ -8830,7 +8865,7 @@
             </p:txBody>
           </p:sp>
         </mc:Choice>
-        <mc:Fallback xmlns="">
+        <mc:Fallback>
           <p:sp>
             <p:nvSpPr>
               <p:cNvPr id="8" name="Rectangle 7"/>
@@ -8848,7 +8883,7 @@
                 <a:avLst/>
               </a:prstGeom>
               <a:blipFill rotWithShape="1">
-                <a:blip r:embed="rId5"/>
+                <a:blip r:embed="rId5" cstate="print"/>
                 <a:stretch>
                   <a:fillRect/>
                 </a:stretch>
@@ -8869,8 +8904,8 @@
           </p:sp>
         </mc:Fallback>
       </mc:AlternateContent>
-      <mc:AlternateContent xmlns:mc="http://schemas.openxmlformats.org/markup-compatibility/2006" xmlns:a14="http://schemas.microsoft.com/office/drawing/2010/main">
-        <mc:Choice Requires="a14">
+      <mc:AlternateContent xmlns:mc="http://schemas.openxmlformats.org/markup-compatibility/2006">
+        <mc:Choice xmlns:a14="http://schemas.microsoft.com/office/drawing/2010/main" xmlns="" Requires="a14">
           <p:sp>
             <p:nvSpPr>
               <p:cNvPr id="9" name="Oval 8"/>
@@ -8962,7 +8997,7 @@
             </p:txBody>
           </p:sp>
         </mc:Choice>
-        <mc:Fallback xmlns="">
+        <mc:Fallback>
           <p:sp>
             <p:nvSpPr>
               <p:cNvPr id="9" name="Oval 8"/>
@@ -8980,7 +9015,7 @@
                 <a:avLst/>
               </a:prstGeom>
               <a:blipFill rotWithShape="1">
-                <a:blip r:embed="rId6"/>
+                <a:blip r:embed="rId6" cstate="print"/>
                 <a:stretch>
                   <a:fillRect/>
                 </a:stretch>
@@ -9001,8 +9036,8 @@
           </p:sp>
         </mc:Fallback>
       </mc:AlternateContent>
-      <mc:AlternateContent xmlns:mc="http://schemas.openxmlformats.org/markup-compatibility/2006" xmlns:a14="http://schemas.microsoft.com/office/drawing/2010/main">
-        <mc:Choice Requires="a14">
+      <mc:AlternateContent xmlns:mc="http://schemas.openxmlformats.org/markup-compatibility/2006">
+        <mc:Choice xmlns:a14="http://schemas.microsoft.com/office/drawing/2010/main" xmlns="" Requires="a14">
           <p:sp>
             <p:nvSpPr>
               <p:cNvPr id="10" name="Oval 9"/>
@@ -9092,7 +9127,7 @@
             </p:txBody>
           </p:sp>
         </mc:Choice>
-        <mc:Fallback xmlns="">
+        <mc:Fallback>
           <p:sp>
             <p:nvSpPr>
               <p:cNvPr id="10" name="Oval 9"/>
@@ -9110,7 +9145,7 @@
                 <a:avLst/>
               </a:prstGeom>
               <a:blipFill rotWithShape="1">
-                <a:blip r:embed="rId7"/>
+                <a:blip r:embed="rId7" cstate="print"/>
                 <a:stretch>
                   <a:fillRect/>
                 </a:stretch>
@@ -9131,8 +9166,8 @@
           </p:sp>
         </mc:Fallback>
       </mc:AlternateContent>
-      <mc:AlternateContent xmlns:mc="http://schemas.openxmlformats.org/markup-compatibility/2006" xmlns:a14="http://schemas.microsoft.com/office/drawing/2010/main">
-        <mc:Choice Requires="a14">
+      <mc:AlternateContent xmlns:mc="http://schemas.openxmlformats.org/markup-compatibility/2006">
+        <mc:Choice xmlns:a14="http://schemas.microsoft.com/office/drawing/2010/main" xmlns="" Requires="a14">
           <p:sp>
             <p:nvSpPr>
               <p:cNvPr id="11" name="Oval 10"/>
@@ -9224,7 +9259,7 @@
             </p:txBody>
           </p:sp>
         </mc:Choice>
-        <mc:Fallback xmlns="">
+        <mc:Fallback>
           <p:sp>
             <p:nvSpPr>
               <p:cNvPr id="11" name="Oval 10"/>
@@ -9242,7 +9277,7 @@
                 <a:avLst/>
               </a:prstGeom>
               <a:blipFill rotWithShape="1">
-                <a:blip r:embed="rId8"/>
+                <a:blip r:embed="rId8" cstate="print"/>
                 <a:stretch>
                   <a:fillRect/>
                 </a:stretch>
@@ -9263,8 +9298,8 @@
           </p:sp>
         </mc:Fallback>
       </mc:AlternateContent>
-      <mc:AlternateContent xmlns:mc="http://schemas.openxmlformats.org/markup-compatibility/2006" xmlns:a14="http://schemas.microsoft.com/office/drawing/2010/main">
-        <mc:Choice Requires="a14">
+      <mc:AlternateContent xmlns:mc="http://schemas.openxmlformats.org/markup-compatibility/2006">
+        <mc:Choice xmlns:a14="http://schemas.microsoft.com/office/drawing/2010/main" xmlns="" Requires="a14">
           <p:sp>
             <p:nvSpPr>
               <p:cNvPr id="12" name="Oval 11"/>
@@ -9354,7 +9389,7 @@
             </p:txBody>
           </p:sp>
         </mc:Choice>
-        <mc:Fallback xmlns="">
+        <mc:Fallback>
           <p:sp>
             <p:nvSpPr>
               <p:cNvPr id="12" name="Oval 11"/>
@@ -9372,7 +9407,7 @@
                 <a:avLst/>
               </a:prstGeom>
               <a:blipFill rotWithShape="1">
-                <a:blip r:embed="rId9"/>
+                <a:blip r:embed="rId9" cstate="print"/>
                 <a:stretch>
                   <a:fillRect/>
                 </a:stretch>
@@ -9545,8 +9580,8 @@
           </a:fontRef>
         </p:style>
       </p:cxnSp>
-      <mc:AlternateContent xmlns:mc="http://schemas.openxmlformats.org/markup-compatibility/2006" xmlns:a14="http://schemas.microsoft.com/office/drawing/2010/main">
-        <mc:Choice Requires="a14">
+      <mc:AlternateContent xmlns:mc="http://schemas.openxmlformats.org/markup-compatibility/2006">
+        <mc:Choice xmlns:a14="http://schemas.microsoft.com/office/drawing/2010/main" xmlns="" Requires="a14">
           <p:sp>
             <p:nvSpPr>
               <p:cNvPr id="25" name="Rectangle 24"/>
@@ -9622,7 +9657,7 @@
             </p:txBody>
           </p:sp>
         </mc:Choice>
-        <mc:Fallback xmlns="">
+        <mc:Fallback>
           <p:sp>
             <p:nvSpPr>
               <p:cNvPr id="25" name="Rectangle 24"/>
@@ -9640,7 +9675,7 @@
                 <a:avLst/>
               </a:prstGeom>
               <a:blipFill rotWithShape="1">
-                <a:blip r:embed="rId10"/>
+                <a:blip r:embed="rId10" cstate="print"/>
                 <a:stretch>
                   <a:fillRect/>
                 </a:stretch>
@@ -9661,8 +9696,8 @@
           </p:sp>
         </mc:Fallback>
       </mc:AlternateContent>
-      <mc:AlternateContent xmlns:mc="http://schemas.openxmlformats.org/markup-compatibility/2006" xmlns:a14="http://schemas.microsoft.com/office/drawing/2010/main">
-        <mc:Choice Requires="a14">
+      <mc:AlternateContent xmlns:mc="http://schemas.openxmlformats.org/markup-compatibility/2006">
+        <mc:Choice xmlns:a14="http://schemas.microsoft.com/office/drawing/2010/main" xmlns="" Requires="a14">
           <p:sp>
             <p:nvSpPr>
               <p:cNvPr id="26" name="Rectangle 25"/>
@@ -9738,7 +9773,7 @@
             </p:txBody>
           </p:sp>
         </mc:Choice>
-        <mc:Fallback xmlns="">
+        <mc:Fallback>
           <p:sp>
             <p:nvSpPr>
               <p:cNvPr id="26" name="Rectangle 25"/>
@@ -9756,7 +9791,7 @@
                 <a:avLst/>
               </a:prstGeom>
               <a:blipFill rotWithShape="1">
-                <a:blip r:embed="rId11"/>
+                <a:blip r:embed="rId11" cstate="print"/>
                 <a:stretch>
                   <a:fillRect/>
                 </a:stretch>
@@ -9777,8 +9812,8 @@
           </p:sp>
         </mc:Fallback>
       </mc:AlternateContent>
-      <mc:AlternateContent xmlns:mc="http://schemas.openxmlformats.org/markup-compatibility/2006" xmlns:a14="http://schemas.microsoft.com/office/drawing/2010/main">
-        <mc:Choice Requires="a14">
+      <mc:AlternateContent xmlns:mc="http://schemas.openxmlformats.org/markup-compatibility/2006">
+        <mc:Choice xmlns:a14="http://schemas.microsoft.com/office/drawing/2010/main" xmlns="" Requires="a14">
           <p:sp>
             <p:nvSpPr>
               <p:cNvPr id="27" name="Rectangle 26"/>
@@ -9854,7 +9889,7 @@
             </p:txBody>
           </p:sp>
         </mc:Choice>
-        <mc:Fallback xmlns="">
+        <mc:Fallback>
           <p:sp>
             <p:nvSpPr>
               <p:cNvPr id="27" name="Rectangle 26"/>
@@ -9872,7 +9907,7 @@
                 <a:avLst/>
               </a:prstGeom>
               <a:blipFill rotWithShape="1">
-                <a:blip r:embed="rId12"/>
+                <a:blip r:embed="rId12" cstate="print"/>
                 <a:stretch>
                   <a:fillRect/>
                 </a:stretch>
@@ -9893,8 +9928,8 @@
           </p:sp>
         </mc:Fallback>
       </mc:AlternateContent>
-      <mc:AlternateContent xmlns:mc="http://schemas.openxmlformats.org/markup-compatibility/2006" xmlns:a14="http://schemas.microsoft.com/office/drawing/2010/main">
-        <mc:Choice Requires="a14">
+      <mc:AlternateContent xmlns:mc="http://schemas.openxmlformats.org/markup-compatibility/2006">
+        <mc:Choice xmlns:a14="http://schemas.microsoft.com/office/drawing/2010/main" xmlns="" Requires="a14">
           <p:sp>
             <p:nvSpPr>
               <p:cNvPr id="28" name="Rectangle 27"/>
@@ -9970,7 +10005,7 @@
             </p:txBody>
           </p:sp>
         </mc:Choice>
-        <mc:Fallback xmlns="">
+        <mc:Fallback>
           <p:sp>
             <p:nvSpPr>
               <p:cNvPr id="28" name="Rectangle 27"/>
@@ -9988,7 +10023,7 @@
                 <a:avLst/>
               </a:prstGeom>
               <a:blipFill rotWithShape="1">
-                <a:blip r:embed="rId13"/>
+                <a:blip r:embed="rId13" cstate="print"/>
                 <a:stretch>
                   <a:fillRect/>
                 </a:stretch>
@@ -10305,8 +10340,8 @@
           </a:p>
         </p:txBody>
       </p:sp>
-      <mc:AlternateContent xmlns:mc="http://schemas.openxmlformats.org/markup-compatibility/2006" xmlns:a14="http://schemas.microsoft.com/office/drawing/2010/main">
-        <mc:Choice Requires="a14">
+      <mc:AlternateContent xmlns:mc="http://schemas.openxmlformats.org/markup-compatibility/2006">
+        <mc:Choice xmlns:a14="http://schemas.microsoft.com/office/drawing/2010/main" xmlns="" Requires="a14">
           <p:sp>
             <p:nvSpPr>
               <p:cNvPr id="49" name="Rectangle 48"/>
@@ -10382,7 +10417,7 @@
             </p:txBody>
           </p:sp>
         </mc:Choice>
-        <mc:Fallback xmlns="">
+        <mc:Fallback>
           <p:sp>
             <p:nvSpPr>
               <p:cNvPr id="49" name="Rectangle 48"/>
@@ -10400,7 +10435,7 @@
                 <a:avLst/>
               </a:prstGeom>
               <a:blipFill rotWithShape="1">
-                <a:blip r:embed="rId14"/>
+                <a:blip r:embed="rId14" cstate="print"/>
                 <a:stretch>
                   <a:fillRect/>
                 </a:stretch>
@@ -10421,8 +10456,8 @@
           </p:sp>
         </mc:Fallback>
       </mc:AlternateContent>
-      <mc:AlternateContent xmlns:mc="http://schemas.openxmlformats.org/markup-compatibility/2006" xmlns:a14="http://schemas.microsoft.com/office/drawing/2010/main">
-        <mc:Choice Requires="a14">
+      <mc:AlternateContent xmlns:mc="http://schemas.openxmlformats.org/markup-compatibility/2006">
+        <mc:Choice xmlns:a14="http://schemas.microsoft.com/office/drawing/2010/main" xmlns="" Requires="a14">
           <p:sp>
             <p:nvSpPr>
               <p:cNvPr id="50" name="Rectangle 49"/>
@@ -10498,7 +10533,7 @@
             </p:txBody>
           </p:sp>
         </mc:Choice>
-        <mc:Fallback xmlns="">
+        <mc:Fallback>
           <p:sp>
             <p:nvSpPr>
               <p:cNvPr id="50" name="Rectangle 49"/>
@@ -10516,7 +10551,7 @@
                 <a:avLst/>
               </a:prstGeom>
               <a:blipFill rotWithShape="1">
-                <a:blip r:embed="rId15"/>
+                <a:blip r:embed="rId15" cstate="print"/>
                 <a:stretch>
                   <a:fillRect/>
                 </a:stretch>
@@ -10715,7 +10750,7 @@
     </p:spTree>
     <p:extLst>
       <p:ext uri="{BB962C8B-B14F-4D97-AF65-F5344CB8AC3E}">
-        <p14:creationId xmlns:p14="http://schemas.microsoft.com/office/powerpoint/2010/main" val="2857468552"/>
+        <p14:creationId xmlns:p14="http://schemas.microsoft.com/office/powerpoint/2010/main" xmlns="" val="2857468552"/>
       </p:ext>
     </p:extLst>
   </p:cSld>
@@ -10765,8 +10800,8 @@
           </a:p>
         </p:txBody>
       </p:sp>
-      <mc:AlternateContent xmlns:mc="http://schemas.openxmlformats.org/markup-compatibility/2006" xmlns:a14="http://schemas.microsoft.com/office/drawing/2010/main">
-        <mc:Choice Requires="a14">
+      <mc:AlternateContent xmlns:mc="http://schemas.openxmlformats.org/markup-compatibility/2006">
+        <mc:Choice xmlns:a14="http://schemas.microsoft.com/office/drawing/2010/main" xmlns="" Requires="a14">
           <p:sp>
             <p:nvSpPr>
               <p:cNvPr id="3" name="Content Placeholder 2"/>
@@ -11059,7 +11094,7 @@
             </p:txBody>
           </p:sp>
         </mc:Choice>
-        <mc:Fallback xmlns="">
+        <mc:Fallback>
           <p:sp>
             <p:nvSpPr>
               <p:cNvPr id="3" name="Content Placeholder 2"/>
@@ -11072,7 +11107,7 @@
             </p:nvSpPr>
             <p:spPr>
               <a:blipFill rotWithShape="1">
-                <a:blip r:embed="rId2"/>
+                <a:blip r:embed="rId2" cstate="print"/>
                 <a:stretch>
                   <a:fillRect l="-1185" t="-2695"/>
                 </a:stretch>
@@ -11110,6 +11145,7 @@
           <a:p>
             <a:fld id="{B7AE4108-064F-4050-AAE5-C40EA46DD43F}" type="slidenum">
               <a:rPr lang="en-US" smtClean="0"/>
+              <a:pPr/>
               <a:t>4</a:t>
             </a:fld>
             <a:endParaRPr lang="en-US"/>
@@ -11142,7 +11178,7 @@
     </p:spTree>
     <p:extLst>
       <p:ext uri="{BB962C8B-B14F-4D97-AF65-F5344CB8AC3E}">
-        <p14:creationId xmlns:p14="http://schemas.microsoft.com/office/powerpoint/2010/main" val="1549022391"/>
+        <p14:creationId xmlns:p14="http://schemas.microsoft.com/office/powerpoint/2010/main" xmlns="" val="1549022391"/>
       </p:ext>
     </p:extLst>
   </p:cSld>
@@ -11170,7 +11206,7 @@
         </a:xfrm>
       </p:grpSpPr>
       <mc:AlternateContent xmlns:mc="http://schemas.openxmlformats.org/markup-compatibility/2006">
-        <mc:Choice xmlns:a14="http://schemas.microsoft.com/office/drawing/2010/main" Requires="a14">
+        <mc:Choice xmlns:a14="http://schemas.microsoft.com/office/drawing/2010/main" xmlns="" Requires="a14">
           <p:sp>
             <p:nvSpPr>
               <p:cNvPr id="2" name="Title 1"/>
@@ -11222,7 +11258,7 @@
             </p:nvSpPr>
             <p:spPr>
               <a:blipFill rotWithShape="1">
-                <a:blip r:embed="rId2"/>
+                <a:blip r:embed="rId2" cstate="print"/>
                 <a:stretch>
                   <a:fillRect b="-8511"/>
                 </a:stretch>
@@ -11244,7 +11280,7 @@
         </mc:Fallback>
       </mc:AlternateContent>
       <mc:AlternateContent xmlns:mc="http://schemas.openxmlformats.org/markup-compatibility/2006">
-        <mc:Choice xmlns:a14="http://schemas.microsoft.com/office/drawing/2010/main" Requires="a14">
+        <mc:Choice xmlns:a14="http://schemas.microsoft.com/office/drawing/2010/main" xmlns="" Requires="a14">
           <p:sp>
             <p:nvSpPr>
               <p:cNvPr id="3" name="Content Placeholder 2"/>
@@ -11422,7 +11458,7 @@
             </p:nvSpPr>
             <p:spPr>
               <a:blipFill rotWithShape="1">
-                <a:blip r:embed="rId4"/>
+                <a:blip r:embed="rId4" cstate="print"/>
                 <a:stretch>
                   <a:fillRect l="-1630" t="-1482" r="-74" b="-1348"/>
                 </a:stretch>
@@ -11460,6 +11496,7 @@
           <a:p>
             <a:fld id="{B7AE4108-064F-4050-AAE5-C40EA46DD43F}" type="slidenum">
               <a:rPr lang="en-US" smtClean="0"/>
+              <a:pPr/>
               <a:t>5</a:t>
             </a:fld>
             <a:endParaRPr lang="en-US"/>
@@ -11492,7 +11529,7 @@
     </p:spTree>
     <p:extLst>
       <p:ext uri="{BB962C8B-B14F-4D97-AF65-F5344CB8AC3E}">
-        <p14:creationId xmlns:p14="http://schemas.microsoft.com/office/powerpoint/2010/main" val="2451192601"/>
+        <p14:creationId xmlns:p14="http://schemas.microsoft.com/office/powerpoint/2010/main" xmlns="" val="2451192601"/>
       </p:ext>
     </p:extLst>
   </p:cSld>
@@ -11536,11 +11573,7 @@
           <a:p>
             <a:r>
               <a:rPr lang="en-US" dirty="0" smtClean="0"/>
-              <a:t>Probabilistic Model</a:t>
-            </a:r>
-            <a:r>
-              <a:rPr lang="en-US" dirty="0" smtClean="0"/>
-              <a:t>: </a:t>
+              <a:t>Probabilistic Model: </a:t>
             </a:r>
             <a:br>
               <a:rPr lang="en-US" dirty="0" smtClean="0"/>
@@ -11553,8 +11586,8 @@
           </a:p>
         </p:txBody>
       </p:sp>
-      <mc:AlternateContent xmlns:mc="http://schemas.openxmlformats.org/markup-compatibility/2006" xmlns:a14="http://schemas.microsoft.com/office/drawing/2010/main">
-        <mc:Choice Requires="a14">
+      <mc:AlternateContent xmlns:mc="http://schemas.openxmlformats.org/markup-compatibility/2006">
+        <mc:Choice xmlns:a14="http://schemas.microsoft.com/office/drawing/2010/main" xmlns="" Requires="a14">
           <p:sp>
             <p:nvSpPr>
               <p:cNvPr id="3" name="Content Placeholder 2"/>
@@ -12037,7 +12070,7 @@
             </p:txBody>
           </p:sp>
         </mc:Choice>
-        <mc:Fallback xmlns="">
+        <mc:Fallback>
           <p:sp>
             <p:nvSpPr>
               <p:cNvPr id="3" name="Content Placeholder 2"/>
@@ -12050,7 +12083,7 @@
             </p:nvSpPr>
             <p:spPr>
               <a:blipFill rotWithShape="1">
-                <a:blip r:embed="rId2"/>
+                <a:blip r:embed="rId2" cstate="print"/>
                 <a:stretch>
                   <a:fillRect l="-1704" r="-889" b="-270"/>
                 </a:stretch>
@@ -12088,6 +12121,7 @@
           <a:p>
             <a:fld id="{B7AE4108-064F-4050-AAE5-C40EA46DD43F}" type="slidenum">
               <a:rPr lang="en-US" smtClean="0"/>
+              <a:pPr/>
               <a:t>6</a:t>
             </a:fld>
             <a:endParaRPr lang="en-US"/>
@@ -12120,7 +12154,7 @@
     </p:spTree>
     <p:extLst>
       <p:ext uri="{BB962C8B-B14F-4D97-AF65-F5344CB8AC3E}">
-        <p14:creationId xmlns:p14="http://schemas.microsoft.com/office/powerpoint/2010/main" val="4200860546"/>
+        <p14:creationId xmlns:p14="http://schemas.microsoft.com/office/powerpoint/2010/main" xmlns="" val="4200860546"/>
       </p:ext>
     </p:extLst>
   </p:cSld>
@@ -12177,8 +12211,8 @@
           </a:p>
         </p:txBody>
       </p:sp>
-      <mc:AlternateContent xmlns:mc="http://schemas.openxmlformats.org/markup-compatibility/2006" xmlns:a14="http://schemas.microsoft.com/office/drawing/2010/main">
-        <mc:Choice Requires="a14">
+      <mc:AlternateContent xmlns:mc="http://schemas.openxmlformats.org/markup-compatibility/2006">
+        <mc:Choice xmlns:a14="http://schemas.microsoft.com/office/drawing/2010/main" xmlns="" Requires="a14">
           <p:sp>
             <p:nvSpPr>
               <p:cNvPr id="3" name="Content Placeholder 2"/>
@@ -13090,7 +13124,7 @@
             </p:txBody>
           </p:sp>
         </mc:Choice>
-        <mc:Fallback xmlns="">
+        <mc:Fallback>
           <p:sp>
             <p:nvSpPr>
               <p:cNvPr id="3" name="Content Placeholder 2"/>
@@ -13107,7 +13141,7 @@
                 <a:ext cx="8686800" cy="4525963"/>
               </a:xfrm>
               <a:blipFill rotWithShape="1">
-                <a:blip r:embed="rId2"/>
+                <a:blip r:embed="rId2" cstate="print"/>
                 <a:stretch>
                   <a:fillRect l="-1263" r="-491"/>
                 </a:stretch>
@@ -13145,6 +13179,7 @@
           <a:p>
             <a:fld id="{B7AE4108-064F-4050-AAE5-C40EA46DD43F}" type="slidenum">
               <a:rPr lang="en-US" smtClean="0"/>
+              <a:pPr/>
               <a:t>7</a:t>
             </a:fld>
             <a:endParaRPr lang="en-US"/>
@@ -13177,7 +13212,7 @@
     </p:spTree>
     <p:extLst>
       <p:ext uri="{BB962C8B-B14F-4D97-AF65-F5344CB8AC3E}">
-        <p14:creationId xmlns:p14="http://schemas.microsoft.com/office/powerpoint/2010/main" val="2339978254"/>
+        <p14:creationId xmlns:p14="http://schemas.microsoft.com/office/powerpoint/2010/main" xmlns="" val="2339978254"/>
       </p:ext>
     </p:extLst>
   </p:cSld>
@@ -13211,8 +13246,8 @@
           <a:chExt cx="0" cy="0"/>
         </a:xfrm>
       </p:grpSpPr>
-      <mc:AlternateContent xmlns:mc="http://schemas.openxmlformats.org/markup-compatibility/2006" xmlns:a14="http://schemas.microsoft.com/office/drawing/2010/main">
-        <mc:Choice Requires="a14">
+      <mc:AlternateContent xmlns:mc="http://schemas.openxmlformats.org/markup-compatibility/2006">
+        <mc:Choice xmlns:a14="http://schemas.microsoft.com/office/drawing/2010/main" xmlns="" Requires="a14">
           <p:sp>
             <p:nvSpPr>
               <p:cNvPr id="2" name="Title 1"/>
@@ -13311,7 +13346,7 @@
             </p:txBody>
           </p:sp>
         </mc:Choice>
-        <mc:Fallback xmlns="">
+        <mc:Fallback>
           <p:sp>
             <p:nvSpPr>
               <p:cNvPr id="2" name="Title 1"/>
@@ -13324,7 +13359,7 @@
             </p:nvSpPr>
             <p:spPr>
               <a:blipFill rotWithShape="1">
-                <a:blip r:embed="rId2"/>
+                <a:blip r:embed="rId2" cstate="print"/>
                 <a:stretch>
                   <a:fillRect b="-7979"/>
                 </a:stretch>
@@ -13345,8 +13380,8 @@
           </p:sp>
         </mc:Fallback>
       </mc:AlternateContent>
-      <mc:AlternateContent xmlns:mc="http://schemas.openxmlformats.org/markup-compatibility/2006" xmlns:a14="http://schemas.microsoft.com/office/drawing/2010/main">
-        <mc:Choice Requires="a14">
+      <mc:AlternateContent xmlns:mc="http://schemas.openxmlformats.org/markup-compatibility/2006">
+        <mc:Choice xmlns:a14="http://schemas.microsoft.com/office/drawing/2010/main" xmlns="" Requires="a14">
           <p:sp>
             <p:nvSpPr>
               <p:cNvPr id="3" name="Content Placeholder 2"/>
@@ -14003,7 +14038,7 @@
             </p:txBody>
           </p:sp>
         </mc:Choice>
-        <mc:Fallback xmlns="">
+        <mc:Fallback>
           <p:sp>
             <p:nvSpPr>
               <p:cNvPr id="3" name="Content Placeholder 2"/>
@@ -14016,7 +14051,7 @@
             </p:nvSpPr>
             <p:spPr>
               <a:blipFill rotWithShape="1">
-                <a:blip r:embed="rId3"/>
+                <a:blip r:embed="rId3" cstate="print"/>
                 <a:stretch>
                   <a:fillRect l="-1852"/>
                 </a:stretch>
@@ -14054,6 +14089,7 @@
           <a:p>
             <a:fld id="{B7AE4108-064F-4050-AAE5-C40EA46DD43F}" type="slidenum">
               <a:rPr lang="en-US" smtClean="0"/>
+              <a:pPr/>
               <a:t>8</a:t>
             </a:fld>
             <a:endParaRPr lang="en-US"/>
@@ -14086,7 +14122,7 @@
     </p:spTree>
     <p:extLst>
       <p:ext uri="{BB962C8B-B14F-4D97-AF65-F5344CB8AC3E}">
-        <p14:creationId xmlns:p14="http://schemas.microsoft.com/office/powerpoint/2010/main" val="2671729980"/>
+        <p14:creationId xmlns:p14="http://schemas.microsoft.com/office/powerpoint/2010/main" xmlns="" val="2671729980"/>
       </p:ext>
     </p:extLst>
   </p:cSld>
@@ -14120,8 +14156,8 @@
           <a:chExt cx="0" cy="0"/>
         </a:xfrm>
       </p:grpSpPr>
-      <mc:AlternateContent xmlns:mc="http://schemas.openxmlformats.org/markup-compatibility/2006" xmlns:a14="http://schemas.microsoft.com/office/drawing/2010/main">
-        <mc:Choice Requires="a14">
+      <mc:AlternateContent xmlns:mc="http://schemas.openxmlformats.org/markup-compatibility/2006">
+        <mc:Choice xmlns:a14="http://schemas.microsoft.com/office/drawing/2010/main" xmlns="" Requires="a14">
           <p:sp>
             <p:nvSpPr>
               <p:cNvPr id="2" name="Title 1"/>
@@ -14187,7 +14223,7 @@
             </p:txBody>
           </p:sp>
         </mc:Choice>
-        <mc:Fallback xmlns="">
+        <mc:Fallback>
           <p:sp>
             <p:nvSpPr>
               <p:cNvPr id="2" name="Title 1"/>
@@ -14200,7 +14236,7 @@
             </p:nvSpPr>
             <p:spPr>
               <a:blipFill rotWithShape="1">
-                <a:blip r:embed="rId2"/>
+                <a:blip r:embed="rId2" cstate="print"/>
                 <a:stretch>
                   <a:fillRect b="-7979"/>
                 </a:stretch>
@@ -14221,8 +14257,8 @@
           </p:sp>
         </mc:Fallback>
       </mc:AlternateContent>
-      <mc:AlternateContent xmlns:mc="http://schemas.openxmlformats.org/markup-compatibility/2006" xmlns:a14="http://schemas.microsoft.com/office/drawing/2010/main">
-        <mc:Choice Requires="a14">
+      <mc:AlternateContent xmlns:mc="http://schemas.openxmlformats.org/markup-compatibility/2006">
+        <mc:Choice xmlns:a14="http://schemas.microsoft.com/office/drawing/2010/main" xmlns="" Requires="a14">
           <p:sp>
             <p:nvSpPr>
               <p:cNvPr id="3" name="Content Placeholder 2"/>
@@ -15403,7 +15439,7 @@
             </p:txBody>
           </p:sp>
         </mc:Choice>
-        <mc:Fallback xmlns="">
+        <mc:Fallback>
           <p:sp>
             <p:nvSpPr>
               <p:cNvPr id="3" name="Content Placeholder 2"/>
@@ -15416,7 +15452,7 @@
             </p:nvSpPr>
             <p:spPr>
               <a:blipFill rotWithShape="1">
-                <a:blip r:embed="rId3"/>
+                <a:blip r:embed="rId3" cstate="print"/>
                 <a:stretch>
                   <a:fillRect l="-889"/>
                 </a:stretch>
@@ -15454,6 +15490,7 @@
           <a:p>
             <a:fld id="{B7AE4108-064F-4050-AAE5-C40EA46DD43F}" type="slidenum">
               <a:rPr lang="en-US" smtClean="0"/>
+              <a:pPr/>
               <a:t>9</a:t>
             </a:fld>
             <a:endParaRPr lang="en-US"/>
@@ -15486,7 +15523,7 @@
     </p:spTree>
     <p:extLst>
       <p:ext uri="{BB962C8B-B14F-4D97-AF65-F5344CB8AC3E}">
-        <p14:creationId xmlns:p14="http://schemas.microsoft.com/office/powerpoint/2010/main" val="888210028"/>
+        <p14:creationId xmlns:p14="http://schemas.microsoft.com/office/powerpoint/2010/main" xmlns="" val="888210028"/>
       </p:ext>
     </p:extLst>
   </p:cSld>

</xml_diff>

<commit_message>
Updated problem description to match the slides
Roddy and I have been updating the slides and the probabilistic model
section of the problem description had become out of date. I have
updated it to match the slides and fixed a few minor errors in the
slides as well.
</commit_message>
<xml_diff>
--- a/problem_statement/Challenge Problem 6.pptx
+++ b/problem_statement/Challenge Problem 6.pptx
@@ -381,7 +381,7 @@
     </p:spTree>
     <p:extLst>
       <p:ext uri="{BB962C8B-B14F-4D97-AF65-F5344CB8AC3E}">
-        <p14:creationId xmlns:p14="http://schemas.microsoft.com/office/powerpoint/2010/main" xmlns="" val="590526506"/>
+        <p14:creationId xmlns:p14="http://schemas.microsoft.com/office/powerpoint/2010/main" val="590526506"/>
       </p:ext>
     </p:extLst>
   </p:cSld>
@@ -749,7 +749,7 @@
     </p:spTree>
     <p:extLst>
       <p:ext uri="{BB962C8B-B14F-4D97-AF65-F5344CB8AC3E}">
-        <p14:creationId xmlns:p14="http://schemas.microsoft.com/office/powerpoint/2010/main" xmlns="" val="4064491439"/>
+        <p14:creationId xmlns:p14="http://schemas.microsoft.com/office/powerpoint/2010/main" val="4064491439"/>
       </p:ext>
     </p:extLst>
   </p:cSld>
@@ -965,7 +965,7 @@
     </p:spTree>
     <p:extLst>
       <p:ext uri="{BB962C8B-B14F-4D97-AF65-F5344CB8AC3E}">
-        <p14:creationId xmlns:p14="http://schemas.microsoft.com/office/powerpoint/2010/main" xmlns="" val="2571977057"/>
+        <p14:creationId xmlns:p14="http://schemas.microsoft.com/office/powerpoint/2010/main" val="2571977057"/>
       </p:ext>
     </p:extLst>
   </p:cSld>
@@ -1181,7 +1181,7 @@
     </p:spTree>
     <p:extLst>
       <p:ext uri="{BB962C8B-B14F-4D97-AF65-F5344CB8AC3E}">
-        <p14:creationId xmlns:p14="http://schemas.microsoft.com/office/powerpoint/2010/main" xmlns="" val="617593224"/>
+        <p14:creationId xmlns:p14="http://schemas.microsoft.com/office/powerpoint/2010/main" val="617593224"/>
       </p:ext>
     </p:extLst>
   </p:cSld>
@@ -1415,7 +1415,7 @@
           </a:ln>
           <a:extLst>
             <a:ext uri="{909E8E84-426E-40DD-AFC4-6F175D3DCCD1}">
-              <a14:hiddenFill xmlns:a14="http://schemas.microsoft.com/office/drawing/2010/main" xmlns="">
+              <a14:hiddenFill xmlns:a14="http://schemas.microsoft.com/office/drawing/2010/main">
                 <a:noFill/>
               </a14:hiddenFill>
             </a:ext>
@@ -1434,7 +1434,7 @@
           <a:blip r:embed="rId2" cstate="print">
             <a:extLst>
               <a:ext uri="{28A0092B-C50C-407E-A947-70E740481C1C}">
-                <a14:useLocalDpi xmlns:a14="http://schemas.microsoft.com/office/drawing/2010/main" xmlns="" val="0"/>
+                <a14:useLocalDpi xmlns:a14="http://schemas.microsoft.com/office/drawing/2010/main" val="0"/>
               </a:ext>
             </a:extLst>
           </a:blip>
@@ -1455,7 +1455,7 @@
     </p:spTree>
     <p:extLst>
       <p:ext uri="{BB962C8B-B14F-4D97-AF65-F5344CB8AC3E}">
-        <p14:creationId xmlns:p14="http://schemas.microsoft.com/office/powerpoint/2010/main" xmlns="" val="3700226468"/>
+        <p14:creationId xmlns:p14="http://schemas.microsoft.com/office/powerpoint/2010/main" val="3700226468"/>
       </p:ext>
     </p:extLst>
   </p:cSld>
@@ -1671,7 +1671,7 @@
     </p:spTree>
     <p:extLst>
       <p:ext uri="{BB962C8B-B14F-4D97-AF65-F5344CB8AC3E}">
-        <p14:creationId xmlns:p14="http://schemas.microsoft.com/office/powerpoint/2010/main" xmlns="" val="299337258"/>
+        <p14:creationId xmlns:p14="http://schemas.microsoft.com/office/powerpoint/2010/main" val="299337258"/>
       </p:ext>
     </p:extLst>
   </p:cSld>
@@ -1953,7 +1953,7 @@
     </p:spTree>
     <p:extLst>
       <p:ext uri="{BB962C8B-B14F-4D97-AF65-F5344CB8AC3E}">
-        <p14:creationId xmlns:p14="http://schemas.microsoft.com/office/powerpoint/2010/main" xmlns="" val="2257051515"/>
+        <p14:creationId xmlns:p14="http://schemas.microsoft.com/office/powerpoint/2010/main" val="2257051515"/>
       </p:ext>
     </p:extLst>
   </p:cSld>
@@ -2285,7 +2285,7 @@
     </p:spTree>
     <p:extLst>
       <p:ext uri="{BB962C8B-B14F-4D97-AF65-F5344CB8AC3E}">
-        <p14:creationId xmlns:p14="http://schemas.microsoft.com/office/powerpoint/2010/main" xmlns="" val="2879366825"/>
+        <p14:creationId xmlns:p14="http://schemas.microsoft.com/office/powerpoint/2010/main" val="2879366825"/>
       </p:ext>
     </p:extLst>
   </p:cSld>
@@ -2757,7 +2757,7 @@
     </p:spTree>
     <p:extLst>
       <p:ext uri="{BB962C8B-B14F-4D97-AF65-F5344CB8AC3E}">
-        <p14:creationId xmlns:p14="http://schemas.microsoft.com/office/powerpoint/2010/main" xmlns="" val="691355404"/>
+        <p14:creationId xmlns:p14="http://schemas.microsoft.com/office/powerpoint/2010/main" val="691355404"/>
       </p:ext>
     </p:extLst>
   </p:cSld>
@@ -2913,7 +2913,7 @@
     </p:spTree>
     <p:extLst>
       <p:ext uri="{BB962C8B-B14F-4D97-AF65-F5344CB8AC3E}">
-        <p14:creationId xmlns:p14="http://schemas.microsoft.com/office/powerpoint/2010/main" xmlns="" val="2940481724"/>
+        <p14:creationId xmlns:p14="http://schemas.microsoft.com/office/powerpoint/2010/main" val="2940481724"/>
       </p:ext>
     </p:extLst>
   </p:cSld>
@@ -3038,7 +3038,7 @@
     </p:spTree>
     <p:extLst>
       <p:ext uri="{BB962C8B-B14F-4D97-AF65-F5344CB8AC3E}">
-        <p14:creationId xmlns:p14="http://schemas.microsoft.com/office/powerpoint/2010/main" xmlns="" val="4228753239"/>
+        <p14:creationId xmlns:p14="http://schemas.microsoft.com/office/powerpoint/2010/main" val="4228753239"/>
       </p:ext>
     </p:extLst>
   </p:cSld>
@@ -3354,7 +3354,7 @@
     </p:spTree>
     <p:extLst>
       <p:ext uri="{BB962C8B-B14F-4D97-AF65-F5344CB8AC3E}">
-        <p14:creationId xmlns:p14="http://schemas.microsoft.com/office/powerpoint/2010/main" xmlns="" val="593450304"/>
+        <p14:creationId xmlns:p14="http://schemas.microsoft.com/office/powerpoint/2010/main" val="593450304"/>
       </p:ext>
     </p:extLst>
   </p:cSld>
@@ -3646,7 +3646,7 @@
     </p:spTree>
     <p:extLst>
       <p:ext uri="{BB962C8B-B14F-4D97-AF65-F5344CB8AC3E}">
-        <p14:creationId xmlns:p14="http://schemas.microsoft.com/office/powerpoint/2010/main" xmlns="" val="3735717587"/>
+        <p14:creationId xmlns:p14="http://schemas.microsoft.com/office/powerpoint/2010/main" val="3735717587"/>
       </p:ext>
     </p:extLst>
   </p:cSld>
@@ -3702,14 +3702,14 @@
           </a:ln>
           <a:extLst>
             <a:ext uri="{909E8E84-426E-40DD-AFC4-6F175D3DCCD1}">
-              <a14:hiddenFill xmlns:a14="http://schemas.microsoft.com/office/drawing/2010/main" xmlns="">
+              <a14:hiddenFill xmlns:a14="http://schemas.microsoft.com/office/drawing/2010/main">
                 <a:solidFill>
                   <a:srgbClr val="FFFFFF"/>
                 </a:solidFill>
               </a14:hiddenFill>
             </a:ext>
             <a:ext uri="{91240B29-F687-4F45-9708-019B960494DF}">
-              <a14:hiddenLine xmlns:a14="http://schemas.microsoft.com/office/drawing/2010/main" xmlns="" w="9525">
+              <a14:hiddenLine xmlns:a14="http://schemas.microsoft.com/office/drawing/2010/main" w="9525">
                 <a:solidFill>
                   <a:srgbClr val="000000"/>
                 </a:solidFill>
@@ -3885,14 +3885,14 @@
           </a:ln>
           <a:extLst>
             <a:ext uri="{909E8E84-426E-40DD-AFC4-6F175D3DCCD1}">
-              <a14:hiddenFill xmlns:a14="http://schemas.microsoft.com/office/drawing/2010/main" xmlns="">
+              <a14:hiddenFill xmlns:a14="http://schemas.microsoft.com/office/drawing/2010/main">
                 <a:solidFill>
                   <a:srgbClr val="FFFFFF"/>
                 </a:solidFill>
               </a14:hiddenFill>
             </a:ext>
             <a:ext uri="{91240B29-F687-4F45-9708-019B960494DF}">
-              <a14:hiddenLine xmlns:a14="http://schemas.microsoft.com/office/drawing/2010/main" xmlns="" w="9525">
+              <a14:hiddenLine xmlns:a14="http://schemas.microsoft.com/office/drawing/2010/main" w="9525">
                 <a:solidFill>
                   <a:srgbClr val="000000"/>
                 </a:solidFill>
@@ -3955,7 +3955,7 @@
           <a:blip r:embed="rId15" cstate="print">
             <a:extLst>
               <a:ext uri="{28A0092B-C50C-407E-A947-70E740481C1C}">
-                <a14:useLocalDpi xmlns:a14="http://schemas.microsoft.com/office/drawing/2010/main" xmlns="" val="0"/>
+                <a14:useLocalDpi xmlns:a14="http://schemas.microsoft.com/office/drawing/2010/main" val="0"/>
               </a:ext>
             </a:extLst>
           </a:blip>
@@ -3985,7 +3985,7 @@
           <a:blip r:embed="rId16" cstate="print">
             <a:extLst>
               <a:ext uri="{28A0092B-C50C-407E-A947-70E740481C1C}">
-                <a14:useLocalDpi xmlns:a14="http://schemas.microsoft.com/office/drawing/2010/main" xmlns="" val="0"/>
+                <a14:useLocalDpi xmlns:a14="http://schemas.microsoft.com/office/drawing/2010/main" val="0"/>
               </a:ext>
             </a:extLst>
           </a:blip>
@@ -4003,7 +4003,7 @@
           <a:noFill/>
           <a:extLst>
             <a:ext uri="{909E8E84-426E-40DD-AFC4-6F175D3DCCD1}">
-              <a14:hiddenFill xmlns:a14="http://schemas.microsoft.com/office/drawing/2010/main" xmlns="">
+              <a14:hiddenFill xmlns:a14="http://schemas.microsoft.com/office/drawing/2010/main">
                 <a:solidFill>
                   <a:srgbClr val="FFFFFF"/>
                 </a:solidFill>
@@ -4024,7 +4024,7 @@
           <a:blip r:embed="rId17" cstate="print">
             <a:extLst>
               <a:ext uri="{28A0092B-C50C-407E-A947-70E740481C1C}">
-                <a14:useLocalDpi xmlns:a14="http://schemas.microsoft.com/office/drawing/2010/main" xmlns="" val="0"/>
+                <a14:useLocalDpi xmlns:a14="http://schemas.microsoft.com/office/drawing/2010/main" val="0"/>
               </a:ext>
             </a:extLst>
           </a:blip>
@@ -4045,7 +4045,7 @@
     </p:spTree>
     <p:extLst>
       <p:ext uri="{BB962C8B-B14F-4D97-AF65-F5344CB8AC3E}">
-        <p14:creationId xmlns:p14="http://schemas.microsoft.com/office/powerpoint/2010/main" xmlns="" val="1623290117"/>
+        <p14:creationId xmlns:p14="http://schemas.microsoft.com/office/powerpoint/2010/main" val="1623290117"/>
       </p:ext>
     </p:extLst>
   </p:cSld>
@@ -4464,13 +4464,28 @@
     </p:spTree>
     <p:extLst>
       <p:ext uri="{BB962C8B-B14F-4D97-AF65-F5344CB8AC3E}">
-        <p14:creationId xmlns:p14="http://schemas.microsoft.com/office/powerpoint/2010/main" xmlns="" val="3210904075"/>
+        <p14:creationId xmlns:p14="http://schemas.microsoft.com/office/powerpoint/2010/main" val="3210904075"/>
       </p:ext>
     </p:extLst>
   </p:cSld>
   <p:clrMapOvr>
     <a:masterClrMapping/>
   </p:clrMapOvr>
+  <mc:AlternateContent xmlns:mc="http://schemas.openxmlformats.org/markup-compatibility/2006">
+    <mc:Choice xmlns:p14="http://schemas.microsoft.com/office/powerpoint/2010/main" Requires="p14">
+      <p:transition spd="slow" p14:dur="2000" advTm="24209"/>
+    </mc:Choice>
+    <mc:Fallback>
+      <p:transition spd="slow" advTm="24209"/>
+    </mc:Fallback>
+  </mc:AlternateContent>
+  <p:timing>
+    <p:tnLst>
+      <p:par>
+        <p:cTn id="1" dur="indefinite" restart="never" nodeType="tmRoot"/>
+      </p:par>
+    </p:tnLst>
+  </p:timing>
 </p:sld>
 </file>
 
@@ -4607,13 +4622,28 @@
     </p:spTree>
     <p:extLst>
       <p:ext uri="{BB962C8B-B14F-4D97-AF65-F5344CB8AC3E}">
-        <p14:creationId xmlns:p14="http://schemas.microsoft.com/office/powerpoint/2010/main" xmlns="" val="334203569"/>
+        <p14:creationId xmlns:p14="http://schemas.microsoft.com/office/powerpoint/2010/main" val="334203569"/>
       </p:ext>
     </p:extLst>
   </p:cSld>
   <p:clrMapOvr>
     <a:masterClrMapping/>
   </p:clrMapOvr>
+  <mc:AlternateContent xmlns:mc="http://schemas.openxmlformats.org/markup-compatibility/2006">
+    <mc:Choice xmlns:p14="http://schemas.microsoft.com/office/powerpoint/2010/main" Requires="p14">
+      <p:transition spd="slow" p14:dur="2000" advTm="38986"/>
+    </mc:Choice>
+    <mc:Fallback>
+      <p:transition spd="slow" advTm="38986"/>
+    </mc:Fallback>
+  </mc:AlternateContent>
+  <p:timing>
+    <p:tnLst>
+      <p:par>
+        <p:cTn id="1" dur="indefinite" restart="never" nodeType="tmRoot"/>
+      </p:par>
+    </p:tnLst>
+  </p:timing>
 </p:sld>
 </file>
 
@@ -4768,13 +4798,28 @@
     </p:spTree>
     <p:extLst>
       <p:ext uri="{BB962C8B-B14F-4D97-AF65-F5344CB8AC3E}">
-        <p14:creationId xmlns:p14="http://schemas.microsoft.com/office/powerpoint/2010/main" xmlns="" val="955529486"/>
+        <p14:creationId xmlns:p14="http://schemas.microsoft.com/office/powerpoint/2010/main" val="955529486"/>
       </p:ext>
     </p:extLst>
   </p:cSld>
   <p:clrMapOvr>
     <a:masterClrMapping/>
   </p:clrMapOvr>
+  <mc:AlternateContent xmlns:mc="http://schemas.openxmlformats.org/markup-compatibility/2006">
+    <mc:Choice xmlns:p14="http://schemas.microsoft.com/office/powerpoint/2010/main" Requires="p14">
+      <p:transition spd="slow" p14:dur="2000" advTm="57241"/>
+    </mc:Choice>
+    <mc:Fallback>
+      <p:transition spd="slow" advTm="57241"/>
+    </mc:Fallback>
+  </mc:AlternateContent>
+  <p:timing>
+    <p:tnLst>
+      <p:par>
+        <p:cTn id="1" dur="indefinite" restart="never" nodeType="tmRoot"/>
+      </p:par>
+    </p:tnLst>
+  </p:timing>
 </p:sld>
 </file>
 
@@ -4891,13 +4936,28 @@
     </p:spTree>
     <p:extLst>
       <p:ext uri="{BB962C8B-B14F-4D97-AF65-F5344CB8AC3E}">
-        <p14:creationId xmlns:p14="http://schemas.microsoft.com/office/powerpoint/2010/main" xmlns="" val="2297075656"/>
+        <p14:creationId xmlns:p14="http://schemas.microsoft.com/office/powerpoint/2010/main" val="2297075656"/>
       </p:ext>
     </p:extLst>
   </p:cSld>
   <p:clrMapOvr>
     <a:masterClrMapping/>
   </p:clrMapOvr>
+  <mc:AlternateContent xmlns:mc="http://schemas.openxmlformats.org/markup-compatibility/2006">
+    <mc:Choice xmlns:p14="http://schemas.microsoft.com/office/powerpoint/2010/main" Requires="p14">
+      <p:transition spd="slow" p14:dur="2000" advTm="26039"/>
+    </mc:Choice>
+    <mc:Fallback>
+      <p:transition spd="slow" advTm="26039"/>
+    </mc:Fallback>
+  </mc:AlternateContent>
+  <p:timing>
+    <p:tnLst>
+      <p:par>
+        <p:cTn id="1" dur="indefinite" restart="never" nodeType="tmRoot"/>
+      </p:par>
+    </p:tnLst>
+  </p:timing>
 </p:sld>
 </file>
 
@@ -5014,13 +5074,28 @@
     </p:spTree>
     <p:extLst>
       <p:ext uri="{BB962C8B-B14F-4D97-AF65-F5344CB8AC3E}">
-        <p14:creationId xmlns:p14="http://schemas.microsoft.com/office/powerpoint/2010/main" xmlns="" val="840644089"/>
+        <p14:creationId xmlns:p14="http://schemas.microsoft.com/office/powerpoint/2010/main" val="840644089"/>
       </p:ext>
     </p:extLst>
   </p:cSld>
   <p:clrMapOvr>
     <a:masterClrMapping/>
   </p:clrMapOvr>
+  <mc:AlternateContent xmlns:mc="http://schemas.openxmlformats.org/markup-compatibility/2006">
+    <mc:Choice xmlns:p14="http://schemas.microsoft.com/office/powerpoint/2010/main" Requires="p14">
+      <p:transition spd="slow" p14:dur="2000" advTm="14594"/>
+    </mc:Choice>
+    <mc:Fallback>
+      <p:transition spd="slow" advTm="14594"/>
+    </mc:Fallback>
+  </mc:AlternateContent>
+  <p:timing>
+    <p:tnLst>
+      <p:par>
+        <p:cTn id="1" dur="indefinite" restart="never" nodeType="tmRoot"/>
+      </p:par>
+    </p:tnLst>
+  </p:timing>
 </p:sld>
 </file>
 
@@ -5095,15 +5170,19 @@
             <a:pPr lvl="1"/>
             <a:r>
               <a:rPr lang="en-US" dirty="0" smtClean="0"/>
-              <a:t>Images without date information will be </a:t>
+              <a:t>Images without </a:t>
             </a:r>
             <a:r>
               <a:rPr lang="en-US" dirty="0" smtClean="0"/>
-              <a:t>used </a:t>
-            </a:r>
-            <a:r>
-              <a:rPr lang="en-US" smtClean="0"/>
-              <a:t>in training</a:t>
+              <a:t>date </a:t>
+            </a:r>
+            <a:r>
+              <a:rPr lang="en-US" dirty="0" smtClean="0"/>
+              <a:t>information will </a:t>
+            </a:r>
+            <a:r>
+              <a:rPr lang="en-US" dirty="0" smtClean="0"/>
+              <a:t>also be placed in the training set</a:t>
             </a:r>
             <a:endParaRPr lang="en-US" dirty="0" smtClean="0"/>
           </a:p>
@@ -5232,13 +5311,28 @@
     </p:spTree>
     <p:extLst>
       <p:ext uri="{BB962C8B-B14F-4D97-AF65-F5344CB8AC3E}">
-        <p14:creationId xmlns:p14="http://schemas.microsoft.com/office/powerpoint/2010/main" xmlns="" val="1167457217"/>
+        <p14:creationId xmlns:p14="http://schemas.microsoft.com/office/powerpoint/2010/main" val="1167457217"/>
       </p:ext>
     </p:extLst>
   </p:cSld>
   <p:clrMapOvr>
     <a:masterClrMapping/>
   </p:clrMapOvr>
+  <mc:AlternateContent xmlns:mc="http://schemas.openxmlformats.org/markup-compatibility/2006">
+    <mc:Choice xmlns:p14="http://schemas.microsoft.com/office/powerpoint/2010/main" Requires="p14">
+      <p:transition spd="slow" p14:dur="2000" advTm="93370"/>
+    </mc:Choice>
+    <mc:Fallback>
+      <p:transition spd="slow" advTm="93370"/>
+    </mc:Fallback>
+  </mc:AlternateContent>
+  <p:timing>
+    <p:tnLst>
+      <p:par>
+        <p:cTn id="1" dur="indefinite" restart="never" nodeType="tmRoot"/>
+      </p:par>
+    </p:tnLst>
+  </p:timing>
 </p:sld>
 </file>
 
@@ -5282,8 +5376,8 @@
           </a:p>
         </p:txBody>
       </p:sp>
-      <mc:AlternateContent xmlns:mc="http://schemas.openxmlformats.org/markup-compatibility/2006">
-        <mc:Choice xmlns:a14="http://schemas.microsoft.com/office/drawing/2010/main" xmlns="" Requires="a14">
+      <mc:AlternateContent xmlns:mc="http://schemas.openxmlformats.org/markup-compatibility/2006" xmlns:a14="http://schemas.microsoft.com/office/drawing/2010/main">
+        <mc:Choice Requires="a14">
           <p:sp>
             <p:nvSpPr>
               <p:cNvPr id="3" name="Content Placeholder 2"/>
@@ -5499,7 +5593,7 @@
             </p:txBody>
           </p:sp>
         </mc:Choice>
-        <mc:Fallback>
+        <mc:Fallback xmlns="">
           <p:sp>
             <p:nvSpPr>
               <p:cNvPr id="3" name="Content Placeholder 2"/>
@@ -5583,13 +5677,28 @@
     </p:spTree>
     <p:extLst>
       <p:ext uri="{BB962C8B-B14F-4D97-AF65-F5344CB8AC3E}">
-        <p14:creationId xmlns:p14="http://schemas.microsoft.com/office/powerpoint/2010/main" xmlns="" val="277946741"/>
+        <p14:creationId xmlns:p14="http://schemas.microsoft.com/office/powerpoint/2010/main" val="277946741"/>
       </p:ext>
     </p:extLst>
   </p:cSld>
   <p:clrMapOvr>
     <a:masterClrMapping/>
   </p:clrMapOvr>
+  <mc:AlternateContent xmlns:mc="http://schemas.openxmlformats.org/markup-compatibility/2006">
+    <mc:Choice xmlns:p14="http://schemas.microsoft.com/office/powerpoint/2010/main" Requires="p14">
+      <p:transition spd="slow" p14:dur="2000" advTm="36570"/>
+    </mc:Choice>
+    <mc:Fallback>
+      <p:transition spd="slow" advTm="36570"/>
+    </mc:Fallback>
+  </mc:AlternateContent>
+  <p:timing>
+    <p:tnLst>
+      <p:par>
+        <p:cTn id="1" dur="indefinite" restart="never" nodeType="tmRoot"/>
+      </p:par>
+    </p:tnLst>
+  </p:timing>
 </p:sld>
 </file>
 
@@ -5718,13 +5827,28 @@
     </p:spTree>
     <p:extLst>
       <p:ext uri="{BB962C8B-B14F-4D97-AF65-F5344CB8AC3E}">
-        <p14:creationId xmlns:p14="http://schemas.microsoft.com/office/powerpoint/2010/main" xmlns="" val="1473410503"/>
+        <p14:creationId xmlns:p14="http://schemas.microsoft.com/office/powerpoint/2010/main" val="1473410503"/>
       </p:ext>
     </p:extLst>
   </p:cSld>
   <p:clrMapOvr>
     <a:masterClrMapping/>
   </p:clrMapOvr>
+  <mc:AlternateContent xmlns:mc="http://schemas.openxmlformats.org/markup-compatibility/2006">
+    <mc:Choice xmlns:p14="http://schemas.microsoft.com/office/powerpoint/2010/main" Requires="p14">
+      <p:transition spd="slow" p14:dur="2000" advTm="6385"/>
+    </mc:Choice>
+    <mc:Fallback>
+      <p:transition spd="slow" advTm="6385"/>
+    </mc:Fallback>
+  </mc:AlternateContent>
+  <p:timing>
+    <p:tnLst>
+      <p:par>
+        <p:cTn id="1" dur="indefinite" restart="never" nodeType="tmRoot"/>
+      </p:par>
+    </p:tnLst>
+  </p:timing>
 </p:sld>
 </file>
 
@@ -6484,7 +6608,7 @@
           </a:ln>
           <a:extLst>
             <a:ext uri="{909E8E84-426E-40DD-AFC4-6F175D3DCCD1}">
-              <a14:hiddenFill xmlns:a14="http://schemas.microsoft.com/office/drawing/2010/main" xmlns="">
+              <a14:hiddenFill xmlns:a14="http://schemas.microsoft.com/office/drawing/2010/main">
                 <a:noFill/>
               </a14:hiddenFill>
             </a:ext>
@@ -6518,7 +6642,7 @@
           </a:ln>
           <a:extLst>
             <a:ext uri="{909E8E84-426E-40DD-AFC4-6F175D3DCCD1}">
-              <a14:hiddenFill xmlns:a14="http://schemas.microsoft.com/office/drawing/2010/main" xmlns="">
+              <a14:hiddenFill xmlns:a14="http://schemas.microsoft.com/office/drawing/2010/main">
                 <a:noFill/>
               </a14:hiddenFill>
             </a:ext>
@@ -6552,7 +6676,7 @@
           </a:ln>
           <a:extLst>
             <a:ext uri="{909E8E84-426E-40DD-AFC4-6F175D3DCCD1}">
-              <a14:hiddenFill xmlns:a14="http://schemas.microsoft.com/office/drawing/2010/main" xmlns="">
+              <a14:hiddenFill xmlns:a14="http://schemas.microsoft.com/office/drawing/2010/main">
                 <a:noFill/>
               </a14:hiddenFill>
             </a:ext>
@@ -6913,7 +7037,7 @@
             </a:ln>
             <a:extLst>
               <a:ext uri="{909E8E84-426E-40DD-AFC4-6F175D3DCCD1}">
-                <a14:hiddenFill xmlns:a14="http://schemas.microsoft.com/office/drawing/2010/main" xmlns="">
+                <a14:hiddenFill xmlns:a14="http://schemas.microsoft.com/office/drawing/2010/main">
                   <a:noFill/>
                 </a14:hiddenFill>
               </a:ext>
@@ -6947,7 +7071,7 @@
             </a:ln>
             <a:extLst>
               <a:ext uri="{909E8E84-426E-40DD-AFC4-6F175D3DCCD1}">
-                <a14:hiddenFill xmlns:a14="http://schemas.microsoft.com/office/drawing/2010/main" xmlns="">
+                <a14:hiddenFill xmlns:a14="http://schemas.microsoft.com/office/drawing/2010/main">
                   <a:noFill/>
                 </a14:hiddenFill>
               </a:ext>
@@ -6981,7 +7105,7 @@
             </a:ln>
             <a:extLst>
               <a:ext uri="{909E8E84-426E-40DD-AFC4-6F175D3DCCD1}">
-                <a14:hiddenFill xmlns:a14="http://schemas.microsoft.com/office/drawing/2010/main" xmlns="">
+                <a14:hiddenFill xmlns:a14="http://schemas.microsoft.com/office/drawing/2010/main">
                   <a:noFill/>
                 </a14:hiddenFill>
               </a:ext>
@@ -7278,7 +7402,7 @@
             </a:ln>
             <a:extLst>
               <a:ext uri="{909E8E84-426E-40DD-AFC4-6F175D3DCCD1}">
-                <a14:hiddenFill xmlns:a14="http://schemas.microsoft.com/office/drawing/2010/main" xmlns="">
+                <a14:hiddenFill xmlns:a14="http://schemas.microsoft.com/office/drawing/2010/main">
                   <a:noFill/>
                 </a14:hiddenFill>
               </a:ext>
@@ -7312,7 +7436,7 @@
             </a:ln>
             <a:extLst>
               <a:ext uri="{909E8E84-426E-40DD-AFC4-6F175D3DCCD1}">
-                <a14:hiddenFill xmlns:a14="http://schemas.microsoft.com/office/drawing/2010/main" xmlns="">
+                <a14:hiddenFill xmlns:a14="http://schemas.microsoft.com/office/drawing/2010/main">
                   <a:noFill/>
                 </a14:hiddenFill>
               </a:ext>
@@ -7346,7 +7470,7 @@
             </a:ln>
             <a:extLst>
               <a:ext uri="{909E8E84-426E-40DD-AFC4-6F175D3DCCD1}">
-                <a14:hiddenFill xmlns:a14="http://schemas.microsoft.com/office/drawing/2010/main" xmlns="">
+                <a14:hiddenFill xmlns:a14="http://schemas.microsoft.com/office/drawing/2010/main">
                   <a:noFill/>
                 </a14:hiddenFill>
               </a:ext>
@@ -7444,7 +7568,7 @@
             </a:ln>
             <a:extLst>
               <a:ext uri="{909E8E84-426E-40DD-AFC4-6F175D3DCCD1}">
-                <a14:hiddenFill xmlns:a14="http://schemas.microsoft.com/office/drawing/2010/main" xmlns="">
+                <a14:hiddenFill xmlns:a14="http://schemas.microsoft.com/office/drawing/2010/main">
                   <a:noFill/>
                 </a14:hiddenFill>
               </a:ext>
@@ -7479,7 +7603,7 @@
           </a:ln>
           <a:extLst>
             <a:ext uri="{909E8E84-426E-40DD-AFC4-6F175D3DCCD1}">
-              <a14:hiddenFill xmlns:a14="http://schemas.microsoft.com/office/drawing/2010/main" xmlns="">
+              <a14:hiddenFill xmlns:a14="http://schemas.microsoft.com/office/drawing/2010/main">
                 <a:noFill/>
               </a14:hiddenFill>
             </a:ext>
@@ -7513,7 +7637,7 @@
           </a:ln>
           <a:extLst>
             <a:ext uri="{909E8E84-426E-40DD-AFC4-6F175D3DCCD1}">
-              <a14:hiddenFill xmlns:a14="http://schemas.microsoft.com/office/drawing/2010/main" xmlns="">
+              <a14:hiddenFill xmlns:a14="http://schemas.microsoft.com/office/drawing/2010/main">
                 <a:noFill/>
               </a14:hiddenFill>
             </a:ext>
@@ -7547,7 +7671,7 @@
           </a:ln>
           <a:extLst>
             <a:ext uri="{909E8E84-426E-40DD-AFC4-6F175D3DCCD1}">
-              <a14:hiddenFill xmlns:a14="http://schemas.microsoft.com/office/drawing/2010/main" xmlns="">
+              <a14:hiddenFill xmlns:a14="http://schemas.microsoft.com/office/drawing/2010/main">
                 <a:noFill/>
               </a14:hiddenFill>
             </a:ext>
@@ -7581,7 +7705,7 @@
           </a:ln>
           <a:extLst>
             <a:ext uri="{909E8E84-426E-40DD-AFC4-6F175D3DCCD1}">
-              <a14:hiddenFill xmlns:a14="http://schemas.microsoft.com/office/drawing/2010/main" xmlns="">
+              <a14:hiddenFill xmlns:a14="http://schemas.microsoft.com/office/drawing/2010/main">
                 <a:noFill/>
               </a14:hiddenFill>
             </a:ext>
@@ -7591,7 +7715,7 @@
     </p:spTree>
     <p:extLst>
       <p:ext uri="{BB962C8B-B14F-4D97-AF65-F5344CB8AC3E}">
-        <p14:creationId xmlns:p14="http://schemas.microsoft.com/office/powerpoint/2010/main" xmlns="" val="2513915860"/>
+        <p14:creationId xmlns:p14="http://schemas.microsoft.com/office/powerpoint/2010/main" val="2513915860"/>
       </p:ext>
     </p:extLst>
   </p:cSld>
@@ -7599,11 +7723,11 @@
     <a:masterClrMapping/>
   </p:clrMapOvr>
   <mc:AlternateContent xmlns:mc="http://schemas.openxmlformats.org/markup-compatibility/2006">
-    <mc:Choice xmlns:p14="http://schemas.microsoft.com/office/powerpoint/2010/main" xmlns="" Requires="p14">
-      <p:transition spd="slow" p14:dur="2000" advTm="12614"/>
+    <mc:Choice xmlns:p14="http://schemas.microsoft.com/office/powerpoint/2010/main" Requires="p14">
+      <p:transition spd="slow" p14:dur="2000" advTm="71306"/>
     </mc:Choice>
     <mc:Fallback>
-      <p:transition spd="slow" advTm="12614"/>
+      <p:transition spd="slow" advTm="71306"/>
     </mc:Fallback>
   </mc:AlternateContent>
   <p:timing>
@@ -7766,13 +7890,28 @@
     </p:spTree>
     <p:extLst>
       <p:ext uri="{BB962C8B-B14F-4D97-AF65-F5344CB8AC3E}">
-        <p14:creationId xmlns:p14="http://schemas.microsoft.com/office/powerpoint/2010/main" xmlns="" val="1570379314"/>
+        <p14:creationId xmlns:p14="http://schemas.microsoft.com/office/powerpoint/2010/main" val="1570379314"/>
       </p:ext>
     </p:extLst>
   </p:cSld>
   <p:clrMapOvr>
     <a:masterClrMapping/>
   </p:clrMapOvr>
+  <mc:AlternateContent xmlns:mc="http://schemas.openxmlformats.org/markup-compatibility/2006">
+    <mc:Choice xmlns:p14="http://schemas.microsoft.com/office/powerpoint/2010/main" Requires="p14">
+      <p:transition spd="slow" p14:dur="2000" advTm="39338"/>
+    </mc:Choice>
+    <mc:Fallback>
+      <p:transition spd="slow" advTm="39338"/>
+    </mc:Fallback>
+  </mc:AlternateContent>
+  <p:timing>
+    <p:tnLst>
+      <p:par>
+        <p:cTn id="1" dur="indefinite" restart="never" nodeType="tmRoot"/>
+      </p:par>
+    </p:tnLst>
+  </p:timing>
 </p:sld>
 </file>
 
@@ -7964,13 +8103,28 @@
     </p:spTree>
     <p:extLst>
       <p:ext uri="{BB962C8B-B14F-4D97-AF65-F5344CB8AC3E}">
-        <p14:creationId xmlns:p14="http://schemas.microsoft.com/office/powerpoint/2010/main" xmlns="" val="1633301739"/>
+        <p14:creationId xmlns:p14="http://schemas.microsoft.com/office/powerpoint/2010/main" val="1633301739"/>
       </p:ext>
     </p:extLst>
   </p:cSld>
   <p:clrMapOvr>
     <a:masterClrMapping/>
   </p:clrMapOvr>
+  <mc:AlternateContent xmlns:mc="http://schemas.openxmlformats.org/markup-compatibility/2006">
+    <mc:Choice xmlns:p14="http://schemas.microsoft.com/office/powerpoint/2010/main" Requires="p14">
+      <p:transition spd="slow" p14:dur="2000" advTm="14439"/>
+    </mc:Choice>
+    <mc:Fallback>
+      <p:transition spd="slow" advTm="14439"/>
+    </mc:Fallback>
+  </mc:AlternateContent>
+  <p:timing>
+    <p:tnLst>
+      <p:par>
+        <p:cTn id="1" dur="indefinite" restart="never" nodeType="tmRoot"/>
+      </p:par>
+    </p:tnLst>
+  </p:timing>
 </p:sld>
 </file>
 
@@ -8161,7 +8315,7 @@
           <a:blip r:embed="rId2" cstate="print">
             <a:extLst>
               <a:ext uri="{28A0092B-C50C-407E-A947-70E740481C1C}">
-                <a14:useLocalDpi xmlns:a14="http://schemas.microsoft.com/office/drawing/2010/main" xmlns="" val="0"/>
+                <a14:useLocalDpi xmlns:a14="http://schemas.microsoft.com/office/drawing/2010/main" val="0"/>
               </a:ext>
             </a:extLst>
           </a:blip>
@@ -8184,14 +8338,14 @@
           </a:ln>
           <a:extLst>
             <a:ext uri="{909E8E84-426E-40DD-AFC4-6F175D3DCCD1}">
-              <a14:hiddenFill xmlns:a14="http://schemas.microsoft.com/office/drawing/2010/main" xmlns="">
+              <a14:hiddenFill xmlns:a14="http://schemas.microsoft.com/office/drawing/2010/main">
                 <a:solidFill>
                   <a:schemeClr val="accent1"/>
                 </a:solidFill>
               </a14:hiddenFill>
             </a:ext>
             <a:ext uri="{91240B29-F687-4F45-9708-019B960494DF}">
-              <a14:hiddenLine xmlns:a14="http://schemas.microsoft.com/office/drawing/2010/main" xmlns="" w="9525">
+              <a14:hiddenLine xmlns:a14="http://schemas.microsoft.com/office/drawing/2010/main" w="9525">
                 <a:solidFill>
                   <a:schemeClr val="tx1"/>
                 </a:solidFill>
@@ -8229,13 +8383,28 @@
     </p:spTree>
     <p:extLst>
       <p:ext uri="{BB962C8B-B14F-4D97-AF65-F5344CB8AC3E}">
-        <p14:creationId xmlns:p14="http://schemas.microsoft.com/office/powerpoint/2010/main" xmlns="" val="3961894748"/>
+        <p14:creationId xmlns:p14="http://schemas.microsoft.com/office/powerpoint/2010/main" val="3961894748"/>
       </p:ext>
     </p:extLst>
   </p:cSld>
   <p:clrMapOvr>
     <a:masterClrMapping/>
   </p:clrMapOvr>
+  <mc:AlternateContent xmlns:mc="http://schemas.openxmlformats.org/markup-compatibility/2006">
+    <mc:Choice xmlns:p14="http://schemas.microsoft.com/office/powerpoint/2010/main" Requires="p14">
+      <p:transition spd="slow" p14:dur="2000" advTm="97711"/>
+    </mc:Choice>
+    <mc:Fallback>
+      <p:transition spd="slow" advTm="97711"/>
+    </mc:Fallback>
+  </mc:AlternateContent>
+  <p:timing>
+    <p:tnLst>
+      <p:par>
+        <p:cTn id="1" dur="indefinite" restart="never" nodeType="tmRoot"/>
+      </p:par>
+    </p:tnLst>
+  </p:timing>
 </p:sld>
 </file>
 
@@ -8366,13 +8535,28 @@
     </p:spTree>
     <p:extLst>
       <p:ext uri="{BB962C8B-B14F-4D97-AF65-F5344CB8AC3E}">
-        <p14:creationId xmlns:p14="http://schemas.microsoft.com/office/powerpoint/2010/main" xmlns="" val="668578897"/>
+        <p14:creationId xmlns:p14="http://schemas.microsoft.com/office/powerpoint/2010/main" val="668578897"/>
       </p:ext>
     </p:extLst>
   </p:cSld>
   <p:clrMapOvr>
     <a:masterClrMapping/>
   </p:clrMapOvr>
+  <mc:AlternateContent xmlns:mc="http://schemas.openxmlformats.org/markup-compatibility/2006">
+    <mc:Choice xmlns:p14="http://schemas.microsoft.com/office/powerpoint/2010/main" Requires="p14">
+      <p:transition spd="slow" p14:dur="2000" advTm="61355"/>
+    </mc:Choice>
+    <mc:Fallback>
+      <p:transition spd="slow" advTm="61355"/>
+    </mc:Fallback>
+  </mc:AlternateContent>
+  <p:timing>
+    <p:tnLst>
+      <p:par>
+        <p:cTn id="1" dur="indefinite" restart="never" nodeType="tmRoot"/>
+      </p:par>
+    </p:tnLst>
+  </p:timing>
 </p:sld>
 </file>
 
@@ -8440,8 +8624,8 @@
           </a:p>
         </p:txBody>
       </p:sp>
-      <mc:AlternateContent xmlns:mc="http://schemas.openxmlformats.org/markup-compatibility/2006">
-        <mc:Choice xmlns:a14="http://schemas.microsoft.com/office/drawing/2010/main" xmlns="" Requires="a14">
+      <mc:AlternateContent xmlns:mc="http://schemas.openxmlformats.org/markup-compatibility/2006" xmlns:a14="http://schemas.microsoft.com/office/drawing/2010/main">
+        <mc:Choice Requires="a14">
           <p:sp>
             <p:nvSpPr>
               <p:cNvPr id="5" name="Rectangle 4"/>
@@ -8517,7 +8701,7 @@
             </p:txBody>
           </p:sp>
         </mc:Choice>
-        <mc:Fallback>
+        <mc:Fallback xmlns="">
           <p:sp>
             <p:nvSpPr>
               <p:cNvPr id="5" name="Rectangle 4"/>
@@ -8556,8 +8740,8 @@
           </p:sp>
         </mc:Fallback>
       </mc:AlternateContent>
-      <mc:AlternateContent xmlns:mc="http://schemas.openxmlformats.org/markup-compatibility/2006">
-        <mc:Choice xmlns:a14="http://schemas.microsoft.com/office/drawing/2010/main" xmlns="" Requires="a14">
+      <mc:AlternateContent xmlns:mc="http://schemas.openxmlformats.org/markup-compatibility/2006" xmlns:a14="http://schemas.microsoft.com/office/drawing/2010/main">
+        <mc:Choice Requires="a14">
           <p:sp>
             <p:nvSpPr>
               <p:cNvPr id="6" name="Rectangle 5"/>
@@ -8633,7 +8817,7 @@
             </p:txBody>
           </p:sp>
         </mc:Choice>
-        <mc:Fallback>
+        <mc:Fallback xmlns="">
           <p:sp>
             <p:nvSpPr>
               <p:cNvPr id="6" name="Rectangle 5"/>
@@ -8672,8 +8856,8 @@
           </p:sp>
         </mc:Fallback>
       </mc:AlternateContent>
-      <mc:AlternateContent xmlns:mc="http://schemas.openxmlformats.org/markup-compatibility/2006">
-        <mc:Choice xmlns:a14="http://schemas.microsoft.com/office/drawing/2010/main" xmlns="" Requires="a14">
+      <mc:AlternateContent xmlns:mc="http://schemas.openxmlformats.org/markup-compatibility/2006" xmlns:a14="http://schemas.microsoft.com/office/drawing/2010/main">
+        <mc:Choice Requires="a14">
           <p:sp>
             <p:nvSpPr>
               <p:cNvPr id="7" name="Rectangle 6"/>
@@ -8749,7 +8933,7 @@
             </p:txBody>
           </p:sp>
         </mc:Choice>
-        <mc:Fallback>
+        <mc:Fallback xmlns="">
           <p:sp>
             <p:nvSpPr>
               <p:cNvPr id="7" name="Rectangle 6"/>
@@ -8788,8 +8972,8 @@
           </p:sp>
         </mc:Fallback>
       </mc:AlternateContent>
-      <mc:AlternateContent xmlns:mc="http://schemas.openxmlformats.org/markup-compatibility/2006">
-        <mc:Choice xmlns:a14="http://schemas.microsoft.com/office/drawing/2010/main" xmlns="" Requires="a14">
+      <mc:AlternateContent xmlns:mc="http://schemas.openxmlformats.org/markup-compatibility/2006" xmlns:a14="http://schemas.microsoft.com/office/drawing/2010/main">
+        <mc:Choice Requires="a14">
           <p:sp>
             <p:nvSpPr>
               <p:cNvPr id="8" name="Rectangle 7"/>
@@ -8865,7 +9049,7 @@
             </p:txBody>
           </p:sp>
         </mc:Choice>
-        <mc:Fallback>
+        <mc:Fallback xmlns="">
           <p:sp>
             <p:nvSpPr>
               <p:cNvPr id="8" name="Rectangle 7"/>
@@ -8904,8 +9088,8 @@
           </p:sp>
         </mc:Fallback>
       </mc:AlternateContent>
-      <mc:AlternateContent xmlns:mc="http://schemas.openxmlformats.org/markup-compatibility/2006">
-        <mc:Choice xmlns:a14="http://schemas.microsoft.com/office/drawing/2010/main" xmlns="" Requires="a14">
+      <mc:AlternateContent xmlns:mc="http://schemas.openxmlformats.org/markup-compatibility/2006" xmlns:a14="http://schemas.microsoft.com/office/drawing/2010/main">
+        <mc:Choice Requires="a14">
           <p:sp>
             <p:nvSpPr>
               <p:cNvPr id="9" name="Oval 8"/>
@@ -8997,7 +9181,7 @@
             </p:txBody>
           </p:sp>
         </mc:Choice>
-        <mc:Fallback>
+        <mc:Fallback xmlns="">
           <p:sp>
             <p:nvSpPr>
               <p:cNvPr id="9" name="Oval 8"/>
@@ -9036,8 +9220,8 @@
           </p:sp>
         </mc:Fallback>
       </mc:AlternateContent>
-      <mc:AlternateContent xmlns:mc="http://schemas.openxmlformats.org/markup-compatibility/2006">
-        <mc:Choice xmlns:a14="http://schemas.microsoft.com/office/drawing/2010/main" xmlns="" Requires="a14">
+      <mc:AlternateContent xmlns:mc="http://schemas.openxmlformats.org/markup-compatibility/2006" xmlns:a14="http://schemas.microsoft.com/office/drawing/2010/main">
+        <mc:Choice Requires="a14">
           <p:sp>
             <p:nvSpPr>
               <p:cNvPr id="10" name="Oval 9"/>
@@ -9127,7 +9311,7 @@
             </p:txBody>
           </p:sp>
         </mc:Choice>
-        <mc:Fallback>
+        <mc:Fallback xmlns="">
           <p:sp>
             <p:nvSpPr>
               <p:cNvPr id="10" name="Oval 9"/>
@@ -9166,8 +9350,8 @@
           </p:sp>
         </mc:Fallback>
       </mc:AlternateContent>
-      <mc:AlternateContent xmlns:mc="http://schemas.openxmlformats.org/markup-compatibility/2006">
-        <mc:Choice xmlns:a14="http://schemas.microsoft.com/office/drawing/2010/main" xmlns="" Requires="a14">
+      <mc:AlternateContent xmlns:mc="http://schemas.openxmlformats.org/markup-compatibility/2006" xmlns:a14="http://schemas.microsoft.com/office/drawing/2010/main">
+        <mc:Choice Requires="a14">
           <p:sp>
             <p:nvSpPr>
               <p:cNvPr id="11" name="Oval 10"/>
@@ -9259,7 +9443,7 @@
             </p:txBody>
           </p:sp>
         </mc:Choice>
-        <mc:Fallback>
+        <mc:Fallback xmlns="">
           <p:sp>
             <p:nvSpPr>
               <p:cNvPr id="11" name="Oval 10"/>
@@ -9298,8 +9482,8 @@
           </p:sp>
         </mc:Fallback>
       </mc:AlternateContent>
-      <mc:AlternateContent xmlns:mc="http://schemas.openxmlformats.org/markup-compatibility/2006">
-        <mc:Choice xmlns:a14="http://schemas.microsoft.com/office/drawing/2010/main" xmlns="" Requires="a14">
+      <mc:AlternateContent xmlns:mc="http://schemas.openxmlformats.org/markup-compatibility/2006" xmlns:a14="http://schemas.microsoft.com/office/drawing/2010/main">
+        <mc:Choice Requires="a14">
           <p:sp>
             <p:nvSpPr>
               <p:cNvPr id="12" name="Oval 11"/>
@@ -9389,7 +9573,7 @@
             </p:txBody>
           </p:sp>
         </mc:Choice>
-        <mc:Fallback>
+        <mc:Fallback xmlns="">
           <p:sp>
             <p:nvSpPr>
               <p:cNvPr id="12" name="Oval 11"/>
@@ -9580,8 +9764,8 @@
           </a:fontRef>
         </p:style>
       </p:cxnSp>
-      <mc:AlternateContent xmlns:mc="http://schemas.openxmlformats.org/markup-compatibility/2006">
-        <mc:Choice xmlns:a14="http://schemas.microsoft.com/office/drawing/2010/main" xmlns="" Requires="a14">
+      <mc:AlternateContent xmlns:mc="http://schemas.openxmlformats.org/markup-compatibility/2006" xmlns:a14="http://schemas.microsoft.com/office/drawing/2010/main">
+        <mc:Choice Requires="a14">
           <p:sp>
             <p:nvSpPr>
               <p:cNvPr id="25" name="Rectangle 24"/>
@@ -9657,7 +9841,7 @@
             </p:txBody>
           </p:sp>
         </mc:Choice>
-        <mc:Fallback>
+        <mc:Fallback xmlns="">
           <p:sp>
             <p:nvSpPr>
               <p:cNvPr id="25" name="Rectangle 24"/>
@@ -9696,8 +9880,8 @@
           </p:sp>
         </mc:Fallback>
       </mc:AlternateContent>
-      <mc:AlternateContent xmlns:mc="http://schemas.openxmlformats.org/markup-compatibility/2006">
-        <mc:Choice xmlns:a14="http://schemas.microsoft.com/office/drawing/2010/main" xmlns="" Requires="a14">
+      <mc:AlternateContent xmlns:mc="http://schemas.openxmlformats.org/markup-compatibility/2006" xmlns:a14="http://schemas.microsoft.com/office/drawing/2010/main">
+        <mc:Choice Requires="a14">
           <p:sp>
             <p:nvSpPr>
               <p:cNvPr id="26" name="Rectangle 25"/>
@@ -9773,7 +9957,7 @@
             </p:txBody>
           </p:sp>
         </mc:Choice>
-        <mc:Fallback>
+        <mc:Fallback xmlns="">
           <p:sp>
             <p:nvSpPr>
               <p:cNvPr id="26" name="Rectangle 25"/>
@@ -9812,8 +9996,8 @@
           </p:sp>
         </mc:Fallback>
       </mc:AlternateContent>
-      <mc:AlternateContent xmlns:mc="http://schemas.openxmlformats.org/markup-compatibility/2006">
-        <mc:Choice xmlns:a14="http://schemas.microsoft.com/office/drawing/2010/main" xmlns="" Requires="a14">
+      <mc:AlternateContent xmlns:mc="http://schemas.openxmlformats.org/markup-compatibility/2006" xmlns:a14="http://schemas.microsoft.com/office/drawing/2010/main">
+        <mc:Choice Requires="a14">
           <p:sp>
             <p:nvSpPr>
               <p:cNvPr id="27" name="Rectangle 26"/>
@@ -9889,7 +10073,7 @@
             </p:txBody>
           </p:sp>
         </mc:Choice>
-        <mc:Fallback>
+        <mc:Fallback xmlns="">
           <p:sp>
             <p:nvSpPr>
               <p:cNvPr id="27" name="Rectangle 26"/>
@@ -9928,8 +10112,8 @@
           </p:sp>
         </mc:Fallback>
       </mc:AlternateContent>
-      <mc:AlternateContent xmlns:mc="http://schemas.openxmlformats.org/markup-compatibility/2006">
-        <mc:Choice xmlns:a14="http://schemas.microsoft.com/office/drawing/2010/main" xmlns="" Requires="a14">
+      <mc:AlternateContent xmlns:mc="http://schemas.openxmlformats.org/markup-compatibility/2006" xmlns:a14="http://schemas.microsoft.com/office/drawing/2010/main">
+        <mc:Choice Requires="a14">
           <p:sp>
             <p:nvSpPr>
               <p:cNvPr id="28" name="Rectangle 27"/>
@@ -10005,7 +10189,7 @@
             </p:txBody>
           </p:sp>
         </mc:Choice>
-        <mc:Fallback>
+        <mc:Fallback xmlns="">
           <p:sp>
             <p:nvSpPr>
               <p:cNvPr id="28" name="Rectangle 27"/>
@@ -10340,8 +10524,8 @@
           </a:p>
         </p:txBody>
       </p:sp>
-      <mc:AlternateContent xmlns:mc="http://schemas.openxmlformats.org/markup-compatibility/2006">
-        <mc:Choice xmlns:a14="http://schemas.microsoft.com/office/drawing/2010/main" xmlns="" Requires="a14">
+      <mc:AlternateContent xmlns:mc="http://schemas.openxmlformats.org/markup-compatibility/2006" xmlns:a14="http://schemas.microsoft.com/office/drawing/2010/main">
+        <mc:Choice Requires="a14">
           <p:sp>
             <p:nvSpPr>
               <p:cNvPr id="49" name="Rectangle 48"/>
@@ -10417,7 +10601,7 @@
             </p:txBody>
           </p:sp>
         </mc:Choice>
-        <mc:Fallback>
+        <mc:Fallback xmlns="">
           <p:sp>
             <p:nvSpPr>
               <p:cNvPr id="49" name="Rectangle 48"/>
@@ -10456,8 +10640,8 @@
           </p:sp>
         </mc:Fallback>
       </mc:AlternateContent>
-      <mc:AlternateContent xmlns:mc="http://schemas.openxmlformats.org/markup-compatibility/2006">
-        <mc:Choice xmlns:a14="http://schemas.microsoft.com/office/drawing/2010/main" xmlns="" Requires="a14">
+      <mc:AlternateContent xmlns:mc="http://schemas.openxmlformats.org/markup-compatibility/2006" xmlns:a14="http://schemas.microsoft.com/office/drawing/2010/main">
+        <mc:Choice Requires="a14">
           <p:sp>
             <p:nvSpPr>
               <p:cNvPr id="50" name="Rectangle 49"/>
@@ -10533,7 +10717,7 @@
             </p:txBody>
           </p:sp>
         </mc:Choice>
-        <mc:Fallback>
+        <mc:Fallback xmlns="">
           <p:sp>
             <p:nvSpPr>
               <p:cNvPr id="50" name="Rectangle 49"/>
@@ -10750,13 +10934,28 @@
     </p:spTree>
     <p:extLst>
       <p:ext uri="{BB962C8B-B14F-4D97-AF65-F5344CB8AC3E}">
-        <p14:creationId xmlns:p14="http://schemas.microsoft.com/office/powerpoint/2010/main" xmlns="" val="2857468552"/>
+        <p14:creationId xmlns:p14="http://schemas.microsoft.com/office/powerpoint/2010/main" val="2857468552"/>
       </p:ext>
     </p:extLst>
   </p:cSld>
   <p:clrMapOvr>
     <a:masterClrMapping/>
   </p:clrMapOvr>
+  <mc:AlternateContent xmlns:mc="http://schemas.openxmlformats.org/markup-compatibility/2006">
+    <mc:Choice xmlns:p14="http://schemas.microsoft.com/office/powerpoint/2010/main" Requires="p14">
+      <p:transition spd="slow" p14:dur="2000" advTm="50553"/>
+    </mc:Choice>
+    <mc:Fallback>
+      <p:transition spd="slow" advTm="50553"/>
+    </mc:Fallback>
+  </mc:AlternateContent>
+  <p:timing>
+    <p:tnLst>
+      <p:par>
+        <p:cTn id="1" dur="indefinite" restart="never" nodeType="tmRoot"/>
+      </p:par>
+    </p:tnLst>
+  </p:timing>
 </p:sld>
 </file>
 
@@ -10800,8 +10999,8 @@
           </a:p>
         </p:txBody>
       </p:sp>
-      <mc:AlternateContent xmlns:mc="http://schemas.openxmlformats.org/markup-compatibility/2006">
-        <mc:Choice xmlns:a14="http://schemas.microsoft.com/office/drawing/2010/main" xmlns="" Requires="a14">
+      <mc:AlternateContent xmlns:mc="http://schemas.openxmlformats.org/markup-compatibility/2006" xmlns:a14="http://schemas.microsoft.com/office/drawing/2010/main">
+        <mc:Choice Requires="a14">
           <p:sp>
             <p:nvSpPr>
               <p:cNvPr id="3" name="Content Placeholder 2"/>
@@ -11094,7 +11293,7 @@
             </p:txBody>
           </p:sp>
         </mc:Choice>
-        <mc:Fallback>
+        <mc:Fallback xmlns="">
           <p:sp>
             <p:nvSpPr>
               <p:cNvPr id="3" name="Content Placeholder 2"/>
@@ -11178,13 +11377,28 @@
     </p:spTree>
     <p:extLst>
       <p:ext uri="{BB962C8B-B14F-4D97-AF65-F5344CB8AC3E}">
-        <p14:creationId xmlns:p14="http://schemas.microsoft.com/office/powerpoint/2010/main" xmlns="" val="1549022391"/>
+        <p14:creationId xmlns:p14="http://schemas.microsoft.com/office/powerpoint/2010/main" val="1549022391"/>
       </p:ext>
     </p:extLst>
   </p:cSld>
   <p:clrMapOvr>
     <a:masterClrMapping/>
   </p:clrMapOvr>
+  <mc:AlternateContent xmlns:mc="http://schemas.openxmlformats.org/markup-compatibility/2006">
+    <mc:Choice xmlns:p14="http://schemas.microsoft.com/office/powerpoint/2010/main" Requires="p14">
+      <p:transition spd="slow" p14:dur="2000" advTm="58020"/>
+    </mc:Choice>
+    <mc:Fallback>
+      <p:transition spd="slow" advTm="58020"/>
+    </mc:Fallback>
+  </mc:AlternateContent>
+  <p:timing>
+    <p:tnLst>
+      <p:par>
+        <p:cTn id="1" dur="indefinite" restart="never" nodeType="tmRoot"/>
+      </p:par>
+    </p:tnLst>
+  </p:timing>
 </p:sld>
 </file>
 
@@ -11205,8 +11419,8 @@
           <a:chExt cx="0" cy="0"/>
         </a:xfrm>
       </p:grpSpPr>
-      <mc:AlternateContent xmlns:mc="http://schemas.openxmlformats.org/markup-compatibility/2006">
-        <mc:Choice xmlns:a14="http://schemas.microsoft.com/office/drawing/2010/main" xmlns="" Requires="a14">
+      <mc:AlternateContent xmlns:mc="http://schemas.openxmlformats.org/markup-compatibility/2006" xmlns:a14="http://schemas.microsoft.com/office/drawing/2010/main">
+        <mc:Choice Requires="a14">
           <p:sp>
             <p:nvSpPr>
               <p:cNvPr id="2" name="Title 1"/>
@@ -11245,7 +11459,7 @@
             </p:txBody>
           </p:sp>
         </mc:Choice>
-        <mc:Fallback>
+        <mc:Fallback xmlns="">
           <p:sp>
             <p:nvSpPr>
               <p:cNvPr id="2" name="Title 1"/>
@@ -11279,8 +11493,8 @@
           </p:sp>
         </mc:Fallback>
       </mc:AlternateContent>
-      <mc:AlternateContent xmlns:mc="http://schemas.openxmlformats.org/markup-compatibility/2006">
-        <mc:Choice xmlns:a14="http://schemas.microsoft.com/office/drawing/2010/main" xmlns="" Requires="a14">
+      <mc:AlternateContent xmlns:mc="http://schemas.openxmlformats.org/markup-compatibility/2006" xmlns:a14="http://schemas.microsoft.com/office/drawing/2010/main">
+        <mc:Choice Requires="a14">
           <p:sp>
             <p:nvSpPr>
               <p:cNvPr id="3" name="Content Placeholder 2"/>
@@ -11362,7 +11576,6 @@
                   <a:rPr lang="en-US" dirty="0" smtClean="0"/>
                   <a:t> detector outputs: </a:t>
                 </a:r>
-                <a:endParaRPr lang="en-US" dirty="0" smtClean="0"/>
               </a:p>
               <a:p>
                 <a:pPr lvl="1"/>
@@ -11436,7 +11649,6 @@
                   <a:rPr lang="en-US" dirty="0" smtClean="0"/>
                   <a:t>)</a:t>
                 </a:r>
-                <a:endParaRPr lang="en-US" dirty="0" smtClean="0"/>
               </a:p>
               <a:p>
                 <a:pPr lvl="1"/>
@@ -11445,7 +11657,7 @@
             </p:txBody>
           </p:sp>
         </mc:Choice>
-        <mc:Fallback>
+        <mc:Fallback xmlns="">
           <p:sp>
             <p:nvSpPr>
               <p:cNvPr id="3" name="Content Placeholder 2"/>
@@ -11529,13 +11741,28 @@
     </p:spTree>
     <p:extLst>
       <p:ext uri="{BB962C8B-B14F-4D97-AF65-F5344CB8AC3E}">
-        <p14:creationId xmlns:p14="http://schemas.microsoft.com/office/powerpoint/2010/main" xmlns="" val="2451192601"/>
+        <p14:creationId xmlns:p14="http://schemas.microsoft.com/office/powerpoint/2010/main" val="2451192601"/>
       </p:ext>
     </p:extLst>
   </p:cSld>
   <p:clrMapOvr>
     <a:masterClrMapping/>
   </p:clrMapOvr>
+  <mc:AlternateContent xmlns:mc="http://schemas.openxmlformats.org/markup-compatibility/2006">
+    <mc:Choice xmlns:p14="http://schemas.microsoft.com/office/powerpoint/2010/main" Requires="p14">
+      <p:transition spd="slow" p14:dur="2000" advTm="54710"/>
+    </mc:Choice>
+    <mc:Fallback>
+      <p:transition spd="slow" advTm="54710"/>
+    </mc:Fallback>
+  </mc:AlternateContent>
+  <p:timing>
+    <p:tnLst>
+      <p:par>
+        <p:cTn id="1" dur="indefinite" restart="never" nodeType="tmRoot"/>
+      </p:par>
+    </p:tnLst>
+  </p:timing>
 </p:sld>
 </file>
 
@@ -11587,7 +11814,7 @@
         </p:txBody>
       </p:sp>
       <mc:AlternateContent xmlns:mc="http://schemas.openxmlformats.org/markup-compatibility/2006">
-        <mc:Choice xmlns:a14="http://schemas.microsoft.com/office/drawing/2010/main" xmlns="" Requires="a14">
+        <mc:Choice xmlns:a14="http://schemas.microsoft.com/office/drawing/2010/main" Requires="a14">
           <p:sp>
             <p:nvSpPr>
               <p:cNvPr id="3" name="Content Placeholder 2"/>
@@ -11601,7 +11828,7 @@
             <p:spPr/>
             <p:txBody>
               <a:bodyPr>
-                <a:normAutofit fontScale="92500"/>
+                <a:normAutofit lnSpcReduction="10000"/>
               </a:bodyPr>
               <a:lstStyle/>
               <a:p>
@@ -11930,24 +12157,12 @@
                 </a:r>
                 <a14:m>
                   <m:oMath xmlns:m="http://schemas.openxmlformats.org/officeDocument/2006/math">
-                    <m:acc>
-                      <m:accPr>
-                        <m:chr m:val="̂"/>
-                        <m:ctrlPr>
-                          <a:rPr lang="en-US" sz="2600" b="0" i="1" dirty="0" smtClean="0">
-                            <a:latin typeface="Cambria Math"/>
-                          </a:rPr>
-                        </m:ctrlPr>
-                      </m:accPr>
-                      <m:e>
-                        <m:r>
-                          <a:rPr lang="en-US" sz="2600" b="0" i="1" dirty="0" smtClean="0">
-                            <a:latin typeface="Cambria Math"/>
-                          </a:rPr>
-                          <m:t>𝑃</m:t>
-                        </m:r>
-                      </m:e>
-                    </m:acc>
+                    <m:r>
+                      <a:rPr lang="en-US" sz="2600" b="0" i="1" dirty="0" smtClean="0">
+                        <a:latin typeface="Cambria Math"/>
+                      </a:rPr>
+                      <m:t>𝑃</m:t>
+                    </m:r>
                     <m:d>
                       <m:dPr>
                         <m:ctrlPr>
@@ -11970,7 +12185,7 @@
                               <a:rPr lang="en-US" sz="2600" b="0" i="1" smtClean="0">
                                 <a:latin typeface="Cambria Math"/>
                               </a:rPr>
-                              <m:t>ℓ</m:t>
+                              <m:t>𝑜</m:t>
                             </m:r>
                           </m:e>
                           <m:sub>
@@ -12001,7 +12216,7 @@
                               <a:rPr lang="en-US" sz="2600" b="0" i="1" smtClean="0">
                                 <a:latin typeface="Cambria Math"/>
                               </a:rPr>
-                              <m:t>ℓ</m:t>
+                              <m:t>𝑜</m:t>
                             </m:r>
                           </m:e>
                           <m:sub>
@@ -12009,7 +12224,7 @@
                               <a:rPr lang="en-US" sz="2600" b="0" i="1" smtClean="0">
                                 <a:latin typeface="Cambria Math"/>
                               </a:rPr>
-                              <m:t>24</m:t>
+                              <m:t>177</m:t>
                             </m:r>
                           </m:sub>
                         </m:sSub>
@@ -12027,8 +12242,17 @@
                 </a14:m>
                 <a:r>
                   <a:rPr lang="en-US" sz="2600" dirty="0" smtClean="0"/>
-                  <a:t> MAP (independent) classifier outputs</a:t>
+                  <a:t> </a:t>
                 </a:r>
+                <a:r>
+                  <a:rPr lang="en-US" sz="2600" dirty="0"/>
+                  <a:t>O</a:t>
+                </a:r>
+                <a:r>
+                  <a:rPr lang="en-US" sz="2600" dirty="0" smtClean="0"/>
+                  <a:t>bject Bank probabilities</a:t>
+                </a:r>
+                <a:endParaRPr lang="en-US" sz="2600" dirty="0" smtClean="0"/>
               </a:p>
               <a:p>
                 <a:pPr marL="400050" lvl="1" indent="0">
@@ -12083,9 +12307,9 @@
             </p:nvSpPr>
             <p:spPr>
               <a:blipFill rotWithShape="1">
-                <a:blip r:embed="rId2" cstate="print"/>
+                <a:blip r:embed="rId2"/>
                 <a:stretch>
-                  <a:fillRect l="-1704" r="-889" b="-270"/>
+                  <a:fillRect l="-1852"/>
                 </a:stretch>
               </a:blipFill>
             </p:spPr>
@@ -12154,13 +12378,21 @@
     </p:spTree>
     <p:extLst>
       <p:ext uri="{BB962C8B-B14F-4D97-AF65-F5344CB8AC3E}">
-        <p14:creationId xmlns:p14="http://schemas.microsoft.com/office/powerpoint/2010/main" xmlns="" val="4200860546"/>
+        <p14:creationId xmlns:p14="http://schemas.microsoft.com/office/powerpoint/2010/main" val="4200860546"/>
       </p:ext>
     </p:extLst>
   </p:cSld>
   <p:clrMapOvr>
     <a:masterClrMapping/>
   </p:clrMapOvr>
+  <mc:AlternateContent xmlns:mc="http://schemas.openxmlformats.org/markup-compatibility/2006">
+    <mc:Choice xmlns:p14="http://schemas.microsoft.com/office/powerpoint/2010/main" Requires="p14">
+      <p:transition spd="slow" p14:dur="2000" advTm="48559"/>
+    </mc:Choice>
+    <mc:Fallback>
+      <p:transition spd="slow" advTm="48559"/>
+    </mc:Fallback>
+  </mc:AlternateContent>
   <p:timing>
     <p:tnLst>
       <p:par>
@@ -12212,7 +12444,7 @@
         </p:txBody>
       </p:sp>
       <mc:AlternateContent xmlns:mc="http://schemas.openxmlformats.org/markup-compatibility/2006">
-        <mc:Choice xmlns:a14="http://schemas.microsoft.com/office/drawing/2010/main" xmlns="" Requires="a14">
+        <mc:Choice xmlns:a14="http://schemas.microsoft.com/office/drawing/2010/main" Requires="a14">
           <p:sp>
             <p:nvSpPr>
               <p:cNvPr id="3" name="Content Placeholder 2"/>
@@ -12655,7 +12887,14 @@
                                         <m:t>)</m:t>
                                       </m:r>
                                     </m:sub>
-                                    <m:sup/>
+                                    <m:sup>
+                                      <m:r>
+                                        <a:rPr lang="en-US" sz="2000" b="0" i="1" smtClean="0">
+                                          <a:latin typeface="Cambria Math"/>
+                                        </a:rPr>
+                                        <m:t> </m:t>
+                                      </m:r>
+                                    </m:sup>
                                     <m:e>
                                       <m:sSub>
                                         <m:sSubPr>
@@ -13141,7 +13380,7 @@
                 <a:ext cx="8686800" cy="4525963"/>
               </a:xfrm>
               <a:blipFill rotWithShape="1">
-                <a:blip r:embed="rId2" cstate="print"/>
+                <a:blip r:embed="rId2"/>
                 <a:stretch>
                   <a:fillRect l="-1263" r="-491"/>
                 </a:stretch>
@@ -13212,13 +13451,21 @@
     </p:spTree>
     <p:extLst>
       <p:ext uri="{BB962C8B-B14F-4D97-AF65-F5344CB8AC3E}">
-        <p14:creationId xmlns:p14="http://schemas.microsoft.com/office/powerpoint/2010/main" xmlns="" val="2339978254"/>
+        <p14:creationId xmlns:p14="http://schemas.microsoft.com/office/powerpoint/2010/main" val="2339978254"/>
       </p:ext>
     </p:extLst>
   </p:cSld>
   <p:clrMapOvr>
     <a:masterClrMapping/>
   </p:clrMapOvr>
+  <mc:AlternateContent xmlns:mc="http://schemas.openxmlformats.org/markup-compatibility/2006">
+    <mc:Choice xmlns:p14="http://schemas.microsoft.com/office/powerpoint/2010/main" Requires="p14">
+      <p:transition spd="slow" p14:dur="2000" advTm="7944"/>
+    </mc:Choice>
+    <mc:Fallback>
+      <p:transition spd="slow" advTm="7944"/>
+    </mc:Fallback>
+  </mc:AlternateContent>
   <p:timing>
     <p:tnLst>
       <p:par>
@@ -13246,8 +13493,8 @@
           <a:chExt cx="0" cy="0"/>
         </a:xfrm>
       </p:grpSpPr>
-      <mc:AlternateContent xmlns:mc="http://schemas.openxmlformats.org/markup-compatibility/2006">
-        <mc:Choice xmlns:a14="http://schemas.microsoft.com/office/drawing/2010/main" xmlns="" Requires="a14">
+      <mc:AlternateContent xmlns:mc="http://schemas.openxmlformats.org/markup-compatibility/2006" xmlns:a14="http://schemas.microsoft.com/office/drawing/2010/main">
+        <mc:Choice Requires="a14">
           <p:sp>
             <p:nvSpPr>
               <p:cNvPr id="2" name="Title 1"/>
@@ -13346,7 +13593,7 @@
             </p:txBody>
           </p:sp>
         </mc:Choice>
-        <mc:Fallback>
+        <mc:Fallback xmlns="">
           <p:sp>
             <p:nvSpPr>
               <p:cNvPr id="2" name="Title 1"/>
@@ -13381,7 +13628,7 @@
         </mc:Fallback>
       </mc:AlternateContent>
       <mc:AlternateContent xmlns:mc="http://schemas.openxmlformats.org/markup-compatibility/2006">
-        <mc:Choice xmlns:a14="http://schemas.microsoft.com/office/drawing/2010/main" xmlns="" Requires="a14">
+        <mc:Choice xmlns:a14="http://schemas.microsoft.com/office/drawing/2010/main" Requires="a14">
           <p:sp>
             <p:nvSpPr>
               <p:cNvPr id="3" name="Content Placeholder 2"/>
@@ -13800,151 +14047,20 @@
                 <a:pPr lvl="2" indent="-342900"/>
                 <a:r>
                   <a:rPr lang="en-US" dirty="0" smtClean="0"/>
-                  <a:t>the vector of classifier outputs </a:t>
+                  <a:t>the vector </a:t>
+                </a:r>
+                <a:r>
+                  <a:rPr lang="en-US" dirty="0" smtClean="0"/>
+                  <a:t>of Object Bank detector outputs </a:t>
                 </a:r>
                 <a14:m>
                   <m:oMath xmlns:m="http://schemas.openxmlformats.org/officeDocument/2006/math">
-                    <m:d>
-                      <m:dPr>
-                        <m:begChr m:val="["/>
-                        <m:endChr m:val="]"/>
-                        <m:ctrlPr>
-                          <a:rPr lang="en-US" b="0" i="1" smtClean="0">
-                            <a:latin typeface="Cambria Math"/>
-                          </a:rPr>
-                        </m:ctrlPr>
-                      </m:dPr>
-                      <m:e>
-                        <m:sSub>
-                          <m:sSubPr>
-                            <m:ctrlPr>
-                              <a:rPr lang="en-US" b="0" i="1" smtClean="0">
-                                <a:latin typeface="Cambria Math"/>
-                              </a:rPr>
-                            </m:ctrlPr>
-                          </m:sSubPr>
-                          <m:e>
-                            <m:r>
-                              <a:rPr lang="en-US" b="0" i="1" smtClean="0">
-                                <a:latin typeface="Cambria Math"/>
-                              </a:rPr>
-                              <m:t>𝑓</m:t>
-                            </m:r>
-                          </m:e>
-                          <m:sub>
-                            <m:r>
-                              <a:rPr lang="en-US" b="0" i="1" smtClean="0">
-                                <a:latin typeface="Cambria Math"/>
-                              </a:rPr>
-                              <m:t>1</m:t>
-                            </m:r>
-                          </m:sub>
-                        </m:sSub>
-                        <m:d>
-                          <m:dPr>
-                            <m:ctrlPr>
-                              <a:rPr lang="en-US" b="0" i="1" smtClean="0">
-                                <a:latin typeface="Cambria Math"/>
-                              </a:rPr>
-                            </m:ctrlPr>
-                          </m:dPr>
-                          <m:e>
-                            <m:sSub>
-                              <m:sSubPr>
-                                <m:ctrlPr>
-                                  <a:rPr lang="en-US" b="0" i="1" smtClean="0">
-                                    <a:latin typeface="Cambria Math"/>
-                                  </a:rPr>
-                                </m:ctrlPr>
-                              </m:sSubPr>
-                              <m:e>
-                                <m:r>
-                                  <a:rPr lang="en-US" b="0" i="1" smtClean="0">
-                                    <a:latin typeface="Cambria Math"/>
-                                  </a:rPr>
-                                  <m:t>𝑥</m:t>
-                                </m:r>
-                              </m:e>
-                              <m:sub>
-                                <m:r>
-                                  <a:rPr lang="en-US" b="0" i="1" smtClean="0">
-                                    <a:latin typeface="Cambria Math"/>
-                                  </a:rPr>
-                                  <m:t>𝑛</m:t>
-                                </m:r>
-                              </m:sub>
-                            </m:sSub>
-                          </m:e>
-                        </m:d>
-                        <m:r>
-                          <a:rPr lang="en-US" b="0" i="1" smtClean="0">
-                            <a:latin typeface="Cambria Math"/>
-                          </a:rPr>
-                          <m:t>,…,</m:t>
-                        </m:r>
-                        <m:sSub>
-                          <m:sSubPr>
-                            <m:ctrlPr>
-                              <a:rPr lang="en-US" b="0" i="1" smtClean="0">
-                                <a:latin typeface="Cambria Math"/>
-                              </a:rPr>
-                            </m:ctrlPr>
-                          </m:sSubPr>
-                          <m:e>
-                            <m:r>
-                              <a:rPr lang="en-US" b="0" i="1" smtClean="0">
-                                <a:latin typeface="Cambria Math"/>
-                              </a:rPr>
-                              <m:t>𝑓</m:t>
-                            </m:r>
-                          </m:e>
-                          <m:sub>
-                            <m:r>
-                              <a:rPr lang="en-US" b="0" i="1" smtClean="0">
-                                <a:latin typeface="Cambria Math"/>
-                              </a:rPr>
-                              <m:t>𝐶</m:t>
-                            </m:r>
-                          </m:sub>
-                        </m:sSub>
-                        <m:d>
-                          <m:dPr>
-                            <m:ctrlPr>
-                              <a:rPr lang="en-US" b="0" i="1" smtClean="0">
-                                <a:latin typeface="Cambria Math"/>
-                              </a:rPr>
-                            </m:ctrlPr>
-                          </m:dPr>
-                          <m:e>
-                            <m:sSub>
-                              <m:sSubPr>
-                                <m:ctrlPr>
-                                  <a:rPr lang="en-US" b="0" i="1" smtClean="0">
-                                    <a:latin typeface="Cambria Math"/>
-                                  </a:rPr>
-                                </m:ctrlPr>
-                              </m:sSubPr>
-                              <m:e>
-                                <m:r>
-                                  <a:rPr lang="en-US" b="0" i="1" smtClean="0">
-                                    <a:latin typeface="Cambria Math"/>
-                                  </a:rPr>
-                                  <m:t>𝑥</m:t>
-                                </m:r>
-                              </m:e>
-                              <m:sub>
-                                <m:r>
-                                  <a:rPr lang="en-US" b="0" i="1" smtClean="0">
-                                    <a:latin typeface="Cambria Math"/>
-                                  </a:rPr>
-                                  <m:t>𝑛</m:t>
-                                </m:r>
-                              </m:sub>
-                            </m:sSub>
-                          </m:e>
-                        </m:d>
-                      </m:e>
-                    </m:d>
+                    <m:r>
+                      <a:rPr lang="en-US" b="0" i="1" smtClean="0">
+                        <a:latin typeface="Cambria Math"/>
+                      </a:rPr>
+                      <m:t>𝑓</m:t>
+                    </m:r>
                   </m:oMath>
                 </a14:m>
                 <a:endParaRPr lang="en-US" b="0" dirty="0" smtClean="0"/>
@@ -14051,7 +14167,7 @@
             </p:nvSpPr>
             <p:spPr>
               <a:blipFill rotWithShape="1">
-                <a:blip r:embed="rId3" cstate="print"/>
+                <a:blip r:embed="rId3"/>
                 <a:stretch>
                   <a:fillRect l="-1852"/>
                 </a:stretch>
@@ -14122,13 +14238,21 @@
     </p:spTree>
     <p:extLst>
       <p:ext uri="{BB962C8B-B14F-4D97-AF65-F5344CB8AC3E}">
-        <p14:creationId xmlns:p14="http://schemas.microsoft.com/office/powerpoint/2010/main" xmlns="" val="2671729980"/>
+        <p14:creationId xmlns:p14="http://schemas.microsoft.com/office/powerpoint/2010/main" val="2671729980"/>
       </p:ext>
     </p:extLst>
   </p:cSld>
   <p:clrMapOvr>
     <a:masterClrMapping/>
   </p:clrMapOvr>
+  <mc:AlternateContent xmlns:mc="http://schemas.openxmlformats.org/markup-compatibility/2006">
+    <mc:Choice xmlns:p14="http://schemas.microsoft.com/office/powerpoint/2010/main" Requires="p14">
+      <p:transition spd="slow" p14:dur="2000" advTm="23733"/>
+    </mc:Choice>
+    <mc:Fallback>
+      <p:transition spd="slow" advTm="23733"/>
+    </mc:Fallback>
+  </mc:AlternateContent>
   <p:timing>
     <p:tnLst>
       <p:par>
@@ -14156,8 +14280,8 @@
           <a:chExt cx="0" cy="0"/>
         </a:xfrm>
       </p:grpSpPr>
-      <mc:AlternateContent xmlns:mc="http://schemas.openxmlformats.org/markup-compatibility/2006">
-        <mc:Choice xmlns:a14="http://schemas.microsoft.com/office/drawing/2010/main" xmlns="" Requires="a14">
+      <mc:AlternateContent xmlns:mc="http://schemas.openxmlformats.org/markup-compatibility/2006" xmlns:a14="http://schemas.microsoft.com/office/drawing/2010/main">
+        <mc:Choice Requires="a14">
           <p:sp>
             <p:nvSpPr>
               <p:cNvPr id="2" name="Title 1"/>
@@ -14223,7 +14347,7 @@
             </p:txBody>
           </p:sp>
         </mc:Choice>
-        <mc:Fallback>
+        <mc:Fallback xmlns="">
           <p:sp>
             <p:nvSpPr>
               <p:cNvPr id="2" name="Title 1"/>
@@ -14258,7 +14382,7 @@
         </mc:Fallback>
       </mc:AlternateContent>
       <mc:AlternateContent xmlns:mc="http://schemas.openxmlformats.org/markup-compatibility/2006">
-        <mc:Choice xmlns:a14="http://schemas.microsoft.com/office/drawing/2010/main" xmlns="" Requires="a14">
+        <mc:Choice xmlns:a14="http://schemas.microsoft.com/office/drawing/2010/main" Requires="a14">
           <p:sp>
             <p:nvSpPr>
               <p:cNvPr id="3" name="Content Placeholder 2"/>
@@ -15411,7 +15535,15 @@
                 </a14:m>
                 <a:r>
                   <a:rPr lang="en-US" sz="2300" dirty="0" smtClean="0"/>
-                  <a:t> the L1 distance between the classifier probability vectors</a:t>
+                  <a:t> the L1 distance between the </a:t>
+                </a:r>
+                <a:r>
+                  <a:rPr lang="en-US" sz="2300" dirty="0" smtClean="0"/>
+                  <a:t>Object Bank probability </a:t>
+                </a:r>
+                <a:r>
+                  <a:rPr lang="en-US" sz="2300" dirty="0" smtClean="0"/>
+                  <a:t>vectors</a:t>
                 </a:r>
               </a:p>
               <a:p>
@@ -15452,9 +15584,9 @@
             </p:nvSpPr>
             <p:spPr>
               <a:blipFill rotWithShape="1">
-                <a:blip r:embed="rId3" cstate="print"/>
+                <a:blip r:embed="rId3"/>
                 <a:stretch>
-                  <a:fillRect l="-889"/>
+                  <a:fillRect l="-889" r="-593"/>
                 </a:stretch>
               </a:blipFill>
             </p:spPr>
@@ -15523,13 +15655,21 @@
     </p:spTree>
     <p:extLst>
       <p:ext uri="{BB962C8B-B14F-4D97-AF65-F5344CB8AC3E}">
-        <p14:creationId xmlns:p14="http://schemas.microsoft.com/office/powerpoint/2010/main" xmlns="" val="888210028"/>
+        <p14:creationId xmlns:p14="http://schemas.microsoft.com/office/powerpoint/2010/main" val="888210028"/>
       </p:ext>
     </p:extLst>
   </p:cSld>
   <p:clrMapOvr>
     <a:masterClrMapping/>
   </p:clrMapOvr>
+  <mc:AlternateContent xmlns:mc="http://schemas.openxmlformats.org/markup-compatibility/2006">
+    <mc:Choice xmlns:p14="http://schemas.microsoft.com/office/powerpoint/2010/main" Requires="p14">
+      <p:transition spd="slow" p14:dur="2000" advTm="37976"/>
+    </mc:Choice>
+    <mc:Fallback>
+      <p:transition spd="slow" advTm="37976"/>
+    </mc:Fallback>
+  </mc:AlternateContent>
   <p:timing>
     <p:tnLst>
       <p:par>

</xml_diff>